<commit_message>
add laravel code snapshot
</commit_message>
<xml_diff>
--- a/Presentation/報告投影片.pptx
+++ b/Presentation/報告投影片.pptx
@@ -5,7 +5,7 @@
     <p:sldMasterId id="2147483660" r:id="rId1"/>
   </p:sldMasterIdLst>
   <p:notesMasterIdLst>
-    <p:notesMasterId r:id="rId38"/>
+    <p:notesMasterId r:id="rId43"/>
   </p:notesMasterIdLst>
   <p:sldIdLst>
     <p:sldId id="256" r:id="rId2"/>
@@ -22,28 +22,33 @@
     <p:sldId id="273" r:id="rId13"/>
     <p:sldId id="274" r:id="rId14"/>
     <p:sldId id="275" r:id="rId15"/>
-    <p:sldId id="276" r:id="rId16"/>
-    <p:sldId id="277" r:id="rId17"/>
-    <p:sldId id="278" r:id="rId18"/>
-    <p:sldId id="280" r:id="rId19"/>
-    <p:sldId id="282" r:id="rId20"/>
-    <p:sldId id="283" r:id="rId21"/>
-    <p:sldId id="284" r:id="rId22"/>
-    <p:sldId id="285" r:id="rId23"/>
-    <p:sldId id="296" r:id="rId24"/>
-    <p:sldId id="297" r:id="rId25"/>
-    <p:sldId id="298" r:id="rId26"/>
-    <p:sldId id="299" r:id="rId27"/>
-    <p:sldId id="300" r:id="rId28"/>
-    <p:sldId id="301" r:id="rId29"/>
-    <p:sldId id="302" r:id="rId30"/>
-    <p:sldId id="303" r:id="rId31"/>
-    <p:sldId id="304" r:id="rId32"/>
-    <p:sldId id="305" r:id="rId33"/>
-    <p:sldId id="306" r:id="rId34"/>
-    <p:sldId id="307" r:id="rId35"/>
-    <p:sldId id="308" r:id="rId36"/>
-    <p:sldId id="295" r:id="rId37"/>
+    <p:sldId id="309" r:id="rId16"/>
+    <p:sldId id="310" r:id="rId17"/>
+    <p:sldId id="311" r:id="rId18"/>
+    <p:sldId id="312" r:id="rId19"/>
+    <p:sldId id="313" r:id="rId20"/>
+    <p:sldId id="276" r:id="rId21"/>
+    <p:sldId id="277" r:id="rId22"/>
+    <p:sldId id="278" r:id="rId23"/>
+    <p:sldId id="280" r:id="rId24"/>
+    <p:sldId id="282" r:id="rId25"/>
+    <p:sldId id="283" r:id="rId26"/>
+    <p:sldId id="284" r:id="rId27"/>
+    <p:sldId id="285" r:id="rId28"/>
+    <p:sldId id="296" r:id="rId29"/>
+    <p:sldId id="297" r:id="rId30"/>
+    <p:sldId id="298" r:id="rId31"/>
+    <p:sldId id="299" r:id="rId32"/>
+    <p:sldId id="300" r:id="rId33"/>
+    <p:sldId id="301" r:id="rId34"/>
+    <p:sldId id="302" r:id="rId35"/>
+    <p:sldId id="303" r:id="rId36"/>
+    <p:sldId id="304" r:id="rId37"/>
+    <p:sldId id="305" r:id="rId38"/>
+    <p:sldId id="306" r:id="rId39"/>
+    <p:sldId id="307" r:id="rId40"/>
+    <p:sldId id="308" r:id="rId41"/>
+    <p:sldId id="295" r:id="rId42"/>
   </p:sldIdLst>
   <p:sldSz cx="9144000" cy="6858000" type="screen4x3"/>
   <p:notesSz cx="6858000" cy="9144000"/>
@@ -144,7 +149,7 @@
   </p:defaultTextStyle>
   <p:extLst>
     <p:ext uri="{EFAFB233-063F-42B5-8137-9DF3F51BA10A}">
-      <p15:sldGuideLst xmlns:p15="http://schemas.microsoft.com/office/powerpoint/2012/main" xmlns="">
+      <p15:sldGuideLst xmlns="" xmlns:p15="http://schemas.microsoft.com/office/powerpoint/2012/main">
         <p15:guide id="1" orient="horz" pos="2160">
           <p15:clr>
             <a:srgbClr val="A4A3A4"/>
@@ -5726,7 +5731,7 @@
           <a:p>
             <a:fld id="{8D3E782C-8BA5-4E75-AB3A-6430B2EE33F5}" type="datetimeFigureOut">
               <a:rPr lang="zh-TW" altLang="en-US" smtClean="0"/>
-              <a:t>2015/5/27</a:t>
+              <a:t>2015/5/28</a:t>
             </a:fld>
             <a:endParaRPr lang="zh-TW" altLang="en-US"/>
           </a:p>
@@ -6196,7 +6201,7 @@
           <a:p>
             <a:fld id="{B23E3EE3-903C-6049-ABF9-CB22CD5F18D1}" type="slidenum">
               <a:rPr kumimoji="1" lang="zh-TW" altLang="en-US" smtClean="0"/>
-              <a:t>28</a:t>
+              <a:t>33</a:t>
             </a:fld>
             <a:endParaRPr kumimoji="1" lang="zh-TW" altLang="en-US"/>
           </a:p>
@@ -6378,7 +6383,7 @@
           <a:p>
             <a:fld id="{B23E3EE3-903C-6049-ABF9-CB22CD5F18D1}" type="slidenum">
               <a:rPr kumimoji="1" lang="zh-TW" altLang="en-US" smtClean="0"/>
-              <a:t>29</a:t>
+              <a:t>34</a:t>
             </a:fld>
             <a:endParaRPr kumimoji="1" lang="zh-TW" altLang="en-US"/>
           </a:p>
@@ -6473,7 +6478,7 @@
           <a:p>
             <a:fld id="{B23E3EE3-903C-6049-ABF9-CB22CD5F18D1}" type="slidenum">
               <a:rPr kumimoji="1" lang="zh-TW" altLang="en-US" smtClean="0"/>
-              <a:t>33</a:t>
+              <a:t>38</a:t>
             </a:fld>
             <a:endParaRPr kumimoji="1" lang="zh-TW" altLang="en-US"/>
           </a:p>
@@ -6568,7 +6573,7 @@
           <a:p>
             <a:fld id="{B23E3EE3-903C-6049-ABF9-CB22CD5F18D1}" type="slidenum">
               <a:rPr kumimoji="1" lang="zh-TW" altLang="en-US" smtClean="0"/>
-              <a:t>35</a:t>
+              <a:t>40</a:t>
             </a:fld>
             <a:endParaRPr kumimoji="1" lang="zh-TW" altLang="en-US"/>
           </a:p>
@@ -6781,7 +6786,7 @@
           <a:p>
             <a:fld id="{630FF765-17E2-4CE6-9E8D-D311E8FC59D5}" type="datetimeFigureOut">
               <a:rPr lang="zh-TW" altLang="en-US" smtClean="0"/>
-              <a:t>2015/5/27</a:t>
+              <a:t>2015/5/28</a:t>
             </a:fld>
             <a:endParaRPr lang="zh-TW" altLang="en-US"/>
           </a:p>
@@ -6946,7 +6951,7 @@
           <a:p>
             <a:fld id="{630FF765-17E2-4CE6-9E8D-D311E8FC59D5}" type="datetimeFigureOut">
               <a:rPr lang="zh-TW" altLang="en-US" smtClean="0"/>
-              <a:t>2015/5/27</a:t>
+              <a:t>2015/5/28</a:t>
             </a:fld>
             <a:endParaRPr lang="zh-TW" altLang="en-US"/>
           </a:p>
@@ -7121,7 +7126,7 @@
           <a:p>
             <a:fld id="{630FF765-17E2-4CE6-9E8D-D311E8FC59D5}" type="datetimeFigureOut">
               <a:rPr lang="zh-TW" altLang="en-US" smtClean="0"/>
-              <a:t>2015/5/27</a:t>
+              <a:t>2015/5/28</a:t>
             </a:fld>
             <a:endParaRPr lang="zh-TW" altLang="en-US"/>
           </a:p>
@@ -7286,7 +7291,7 @@
           <a:p>
             <a:fld id="{630FF765-17E2-4CE6-9E8D-D311E8FC59D5}" type="datetimeFigureOut">
               <a:rPr lang="zh-TW" altLang="en-US" smtClean="0"/>
-              <a:t>2015/5/27</a:t>
+              <a:t>2015/5/28</a:t>
             </a:fld>
             <a:endParaRPr lang="zh-TW" altLang="en-US"/>
           </a:p>
@@ -7527,7 +7532,7 @@
           <a:p>
             <a:fld id="{630FF765-17E2-4CE6-9E8D-D311E8FC59D5}" type="datetimeFigureOut">
               <a:rPr lang="zh-TW" altLang="en-US" smtClean="0"/>
-              <a:t>2015/5/27</a:t>
+              <a:t>2015/5/28</a:t>
             </a:fld>
             <a:endParaRPr lang="zh-TW" altLang="en-US"/>
           </a:p>
@@ -7810,7 +7815,7 @@
           <a:p>
             <a:fld id="{630FF765-17E2-4CE6-9E8D-D311E8FC59D5}" type="datetimeFigureOut">
               <a:rPr lang="zh-TW" altLang="en-US" smtClean="0"/>
-              <a:t>2015/5/27</a:t>
+              <a:t>2015/5/28</a:t>
             </a:fld>
             <a:endParaRPr lang="zh-TW" altLang="en-US"/>
           </a:p>
@@ -8239,7 +8244,7 @@
           <a:p>
             <a:fld id="{630FF765-17E2-4CE6-9E8D-D311E8FC59D5}" type="datetimeFigureOut">
               <a:rPr lang="zh-TW" altLang="en-US" smtClean="0"/>
-              <a:t>2015/5/27</a:t>
+              <a:t>2015/5/28</a:t>
             </a:fld>
             <a:endParaRPr lang="zh-TW" altLang="en-US"/>
           </a:p>
@@ -8352,7 +8357,7 @@
           <a:p>
             <a:fld id="{630FF765-17E2-4CE6-9E8D-D311E8FC59D5}" type="datetimeFigureOut">
               <a:rPr lang="zh-TW" altLang="en-US" smtClean="0"/>
-              <a:t>2015/5/27</a:t>
+              <a:t>2015/5/28</a:t>
             </a:fld>
             <a:endParaRPr lang="zh-TW" altLang="en-US"/>
           </a:p>
@@ -8442,7 +8447,7 @@
           <a:p>
             <a:fld id="{630FF765-17E2-4CE6-9E8D-D311E8FC59D5}" type="datetimeFigureOut">
               <a:rPr lang="zh-TW" altLang="en-US" smtClean="0"/>
-              <a:t>2015/5/27</a:t>
+              <a:t>2015/5/28</a:t>
             </a:fld>
             <a:endParaRPr lang="zh-TW" altLang="en-US"/>
           </a:p>
@@ -8631,7 +8636,7 @@
           <a:p>
             <a:fld id="{630FF765-17E2-4CE6-9E8D-D311E8FC59D5}" type="datetimeFigureOut">
               <a:rPr lang="zh-TW" altLang="en-US" smtClean="0"/>
-              <a:t>2015/5/27</a:t>
+              <a:t>2015/5/28</a:t>
             </a:fld>
             <a:endParaRPr lang="zh-TW" altLang="en-US"/>
           </a:p>
@@ -8949,7 +8954,7 @@
           <a:p>
             <a:fld id="{630FF765-17E2-4CE6-9E8D-D311E8FC59D5}" type="datetimeFigureOut">
               <a:rPr lang="zh-TW" altLang="en-US" smtClean="0"/>
-              <a:t>2015/5/27</a:t>
+              <a:t>2015/5/28</a:t>
             </a:fld>
             <a:endParaRPr lang="zh-TW" altLang="en-US"/>
           </a:p>
@@ -9328,7 +9333,7 @@
           <a:p>
             <a:fld id="{630FF765-17E2-4CE6-9E8D-D311E8FC59D5}" type="datetimeFigureOut">
               <a:rPr lang="zh-TW" altLang="en-US" smtClean="0"/>
-              <a:t>2015/5/27</a:t>
+              <a:t>2015/5/28</a:t>
             </a:fld>
             <a:endParaRPr lang="zh-TW" altLang="en-US"/>
           </a:p>
@@ -10284,7 +10289,18 @@
           <a:p>
             <a:r>
               <a:rPr lang="en-US" altLang="zh-TW" dirty="0" smtClean="0"/>
-              <a:t>Eloquent ORM</a:t>
+              <a:t>Form input</a:t>
+            </a:r>
+            <a:endParaRPr lang="en-US" altLang="zh-TW" dirty="0" smtClean="0"/>
+          </a:p>
+          <a:p>
+            <a:r>
+              <a:rPr lang="en-US" altLang="zh-TW" dirty="0" smtClean="0"/>
+              <a:t>Eloquent </a:t>
+            </a:r>
+            <a:r>
+              <a:rPr lang="en-US" altLang="zh-TW" dirty="0" smtClean="0"/>
+              <a:t>ORM</a:t>
             </a:r>
           </a:p>
           <a:p>
@@ -10302,21 +10318,19 @@
           <a:p>
             <a:r>
               <a:rPr lang="en-US" altLang="zh-TW" dirty="0" smtClean="0"/>
-              <a:t>Templates (Blade)</a:t>
-            </a:r>
-          </a:p>
-          <a:p>
+              <a:t>RESTful</a:t>
+            </a:r>
+          </a:p>
+          <a:p>
+            <a:r>
+              <a:rPr lang="en-US" altLang="zh-TW" dirty="0"/>
+              <a:t>Templates (Blade</a:t>
+            </a:r>
             <a:r>
               <a:rPr lang="en-US" altLang="zh-TW" dirty="0" smtClean="0"/>
-              <a:t>RESTful</a:t>
-            </a:r>
-          </a:p>
-          <a:p>
-            <a:r>
-              <a:rPr lang="en-US" altLang="zh-TW" dirty="0" smtClean="0"/>
-              <a:t>Form</a:t>
-            </a:r>
-            <a:endParaRPr lang="zh-TW" altLang="en-US" dirty="0"/>
+              <a:t>)</a:t>
+            </a:r>
+            <a:endParaRPr lang="en-US" altLang="zh-TW" dirty="0"/>
           </a:p>
         </p:txBody>
       </p:sp>
@@ -10373,94 +10387,79 @@
           <a:lstStyle/>
           <a:p>
             <a:r>
-              <a:rPr lang="en-US" altLang="zh-TW" dirty="0"/>
-              <a:t>C</a:t>
-            </a:r>
-            <a:r>
               <a:rPr lang="en-US" altLang="zh-TW" dirty="0" smtClean="0"/>
-              <a:t>omposer</a:t>
+              <a:t>Input, ORM</a:t>
             </a:r>
             <a:endParaRPr lang="zh-TW" altLang="en-US" dirty="0"/>
           </a:p>
         </p:txBody>
       </p:sp>
-      <p:sp>
-        <p:nvSpPr>
-          <p:cNvPr id="3" name="內容版面配置區 2"/>
-          <p:cNvSpPr>
-            <a:spLocks noGrp="1"/>
-          </p:cNvSpPr>
+      <p:pic>
+        <p:nvPicPr>
+          <p:cNvPr id="1026" name="Picture 2"/>
+          <p:cNvPicPr>
+            <a:picLocks noGrp="1" noChangeAspect="1" noChangeArrowheads="1"/>
+          </p:cNvPicPr>
           <p:nvPr>
             <p:ph idx="1"/>
           </p:nvPr>
-        </p:nvSpPr>
-        <p:spPr/>
-        <p:txBody>
-          <a:bodyPr/>
-          <a:lstStyle/>
-          <a:p>
-            <a:r>
-              <a:rPr lang="en-US" altLang="zh-TW" dirty="0" smtClean="0"/>
-              <a:t>PHP</a:t>
-            </a:r>
-            <a:r>
-              <a:rPr lang="zh-TW" altLang="en-US" dirty="0" smtClean="0"/>
-              <a:t>依賴性</a:t>
-            </a:r>
-            <a:r>
-              <a:rPr lang="zh-TW" altLang="en-US" dirty="0"/>
-              <a:t>管理</a:t>
-            </a:r>
-            <a:r>
-              <a:rPr lang="zh-TW" altLang="en-US" dirty="0" smtClean="0"/>
-              <a:t>工具</a:t>
-            </a:r>
-            <a:endParaRPr lang="en-US" altLang="zh-TW" dirty="0" smtClean="0"/>
-          </a:p>
-          <a:p>
-            <a:r>
-              <a:rPr lang="zh-TW" altLang="en-US" dirty="0" smtClean="0"/>
-              <a:t>安裝專案依賴</a:t>
-            </a:r>
-            <a:r>
-              <a:rPr lang="zh-TW" altLang="en-US" dirty="0"/>
-              <a:t>函式</a:t>
-            </a:r>
-            <a:r>
-              <a:rPr lang="zh-TW" altLang="en-US" dirty="0" smtClean="0"/>
-              <a:t>庫</a:t>
-            </a:r>
-            <a:endParaRPr lang="en-US" altLang="zh-TW" dirty="0" smtClean="0"/>
-          </a:p>
-          <a:p>
-            <a:r>
-              <a:rPr lang="zh-TW" altLang="en-US" dirty="0" smtClean="0"/>
-              <a:t>簡化部署開發環境步驟</a:t>
-            </a:r>
-            <a:br>
-              <a:rPr lang="zh-TW" altLang="en-US" dirty="0" smtClean="0"/>
-            </a:br>
-            <a:endParaRPr lang="zh-TW" altLang="en-US" dirty="0"/>
-          </a:p>
-        </p:txBody>
-      </p:sp>
+        </p:nvPicPr>
+        <p:blipFill>
+          <a:blip r:embed="rId2">
+            <a:extLst>
+              <a:ext uri="{28A0092B-C50C-407E-A947-70E740481C1C}">
+                <a14:useLocalDpi xmlns:a14="http://schemas.microsoft.com/office/drawing/2010/main" val="0"/>
+              </a:ext>
+            </a:extLst>
+          </a:blip>
+          <a:srcRect/>
+          <a:stretch>
+            <a:fillRect/>
+          </a:stretch>
+        </p:blipFill>
+        <p:spPr bwMode="auto">
+          <a:xfrm>
+            <a:off x="827584" y="2636912"/>
+            <a:ext cx="6726784" cy="2370799"/>
+          </a:xfrm>
+          <a:prstGeom prst="rect">
+            <a:avLst/>
+          </a:prstGeom>
+          <a:noFill/>
+          <a:ln>
+            <a:noFill/>
+          </a:ln>
+          <a:extLst>
+            <a:ext uri="{909E8E84-426E-40DD-AFC4-6F175D3DCCD1}">
+              <a14:hiddenFill xmlns:a14="http://schemas.microsoft.com/office/drawing/2010/main">
+                <a:solidFill>
+                  <a:schemeClr val="accent1"/>
+                </a:solidFill>
+              </a14:hiddenFill>
+            </a:ext>
+            <a:ext uri="{91240B29-F687-4F45-9708-019B960494DF}">
+              <a14:hiddenLine xmlns:a14="http://schemas.microsoft.com/office/drawing/2010/main" w="9525">
+                <a:solidFill>
+                  <a:schemeClr val="tx1"/>
+                </a:solidFill>
+                <a:miter lim="800000"/>
+                <a:headEnd/>
+                <a:tailEnd/>
+              </a14:hiddenLine>
+            </a:ext>
+          </a:extLst>
+        </p:spPr>
+      </p:pic>
     </p:spTree>
     <p:extLst>
       <p:ext uri="{BB962C8B-B14F-4D97-AF65-F5344CB8AC3E}">
-        <p14:creationId xmlns:p14="http://schemas.microsoft.com/office/powerpoint/2010/main" val="598198643"/>
+        <p14:creationId xmlns:p14="http://schemas.microsoft.com/office/powerpoint/2010/main" val="2708289476"/>
       </p:ext>
     </p:extLst>
   </p:cSld>
   <p:clrMapOvr>
     <a:masterClrMapping/>
   </p:clrMapOvr>
-  <p:timing>
-    <p:tnLst>
-      <p:par>
-        <p:cTn id="1" dur="indefinite" restart="never" nodeType="tmRoot"/>
-      </p:par>
-    </p:tnLst>
-  </p:timing>
 </p:sld>
 </file>
 
@@ -10497,85 +10496,79 @@
           <a:lstStyle/>
           <a:p>
             <a:r>
-              <a:rPr lang="en-US" altLang="zh-TW" dirty="0" err="1" smtClean="0"/>
-              <a:t>Git</a:t>
+              <a:rPr lang="en-US" altLang="zh-TW" dirty="0" smtClean="0"/>
+              <a:t>Query builder</a:t>
             </a:r>
             <a:endParaRPr lang="zh-TW" altLang="en-US" dirty="0"/>
           </a:p>
         </p:txBody>
       </p:sp>
-      <p:sp>
-        <p:nvSpPr>
-          <p:cNvPr id="3" name="內容版面配置區 2"/>
-          <p:cNvSpPr>
-            <a:spLocks noGrp="1"/>
-          </p:cNvSpPr>
+      <p:pic>
+        <p:nvPicPr>
+          <p:cNvPr id="2050" name="Picture 2"/>
+          <p:cNvPicPr>
+            <a:picLocks noGrp="1" noChangeAspect="1" noChangeArrowheads="1"/>
+          </p:cNvPicPr>
           <p:nvPr>
             <p:ph idx="1"/>
           </p:nvPr>
-        </p:nvSpPr>
-        <p:spPr/>
-        <p:txBody>
-          <a:bodyPr>
-            <a:normAutofit/>
-          </a:bodyPr>
-          <a:lstStyle/>
-          <a:p>
-            <a:r>
-              <a:rPr lang="zh-TW" altLang="en-US" dirty="0" smtClean="0"/>
-              <a:t>分散式</a:t>
-            </a:r>
-            <a:r>
-              <a:rPr lang="zh-TW" altLang="en-US" dirty="0"/>
-              <a:t>版本控制</a:t>
-            </a:r>
-            <a:r>
-              <a:rPr lang="zh-TW" altLang="en-US" dirty="0" smtClean="0"/>
-              <a:t>軟體</a:t>
-            </a:r>
-            <a:endParaRPr lang="en-US" altLang="zh-TW" dirty="0" smtClean="0"/>
-          </a:p>
-          <a:p>
-            <a:r>
-              <a:rPr lang="zh-TW" altLang="en-US" dirty="0" smtClean="0"/>
-              <a:t>合併</a:t>
-            </a:r>
-            <a:r>
-              <a:rPr lang="zh-TW" altLang="en-US" dirty="0"/>
-              <a:t>追蹤（</a:t>
-            </a:r>
-            <a:r>
-              <a:rPr lang="en-US" altLang="zh-TW" dirty="0"/>
-              <a:t>merge tracing</a:t>
-            </a:r>
-            <a:r>
-              <a:rPr lang="zh-TW" altLang="en-US" dirty="0" smtClean="0"/>
-              <a:t>）</a:t>
-            </a:r>
-            <a:br>
-              <a:rPr lang="zh-TW" altLang="en-US" dirty="0" smtClean="0"/>
-            </a:br>
-            <a:endParaRPr lang="zh-TW" altLang="en-US" dirty="0"/>
-          </a:p>
-        </p:txBody>
-      </p:sp>
+        </p:nvPicPr>
+        <p:blipFill>
+          <a:blip r:embed="rId2">
+            <a:extLst>
+              <a:ext uri="{28A0092B-C50C-407E-A947-70E740481C1C}">
+                <a14:useLocalDpi xmlns:a14="http://schemas.microsoft.com/office/drawing/2010/main" val="0"/>
+              </a:ext>
+            </a:extLst>
+          </a:blip>
+          <a:srcRect/>
+          <a:stretch>
+            <a:fillRect/>
+          </a:stretch>
+        </p:blipFill>
+        <p:spPr bwMode="auto">
+          <a:xfrm>
+            <a:off x="539552" y="2780928"/>
+            <a:ext cx="7087294" cy="1934128"/>
+          </a:xfrm>
+          <a:prstGeom prst="rect">
+            <a:avLst/>
+          </a:prstGeom>
+          <a:noFill/>
+          <a:ln>
+            <a:noFill/>
+          </a:ln>
+          <a:extLst>
+            <a:ext uri="{909E8E84-426E-40DD-AFC4-6F175D3DCCD1}">
+              <a14:hiddenFill xmlns:a14="http://schemas.microsoft.com/office/drawing/2010/main">
+                <a:solidFill>
+                  <a:schemeClr val="accent1"/>
+                </a:solidFill>
+              </a14:hiddenFill>
+            </a:ext>
+            <a:ext uri="{91240B29-F687-4F45-9708-019B960494DF}">
+              <a14:hiddenLine xmlns:a14="http://schemas.microsoft.com/office/drawing/2010/main" w="9525">
+                <a:solidFill>
+                  <a:schemeClr val="tx1"/>
+                </a:solidFill>
+                <a:miter lim="800000"/>
+                <a:headEnd/>
+                <a:tailEnd/>
+              </a14:hiddenLine>
+            </a:ext>
+          </a:extLst>
+        </p:spPr>
+      </p:pic>
     </p:spTree>
     <p:extLst>
       <p:ext uri="{BB962C8B-B14F-4D97-AF65-F5344CB8AC3E}">
-        <p14:creationId xmlns:p14="http://schemas.microsoft.com/office/powerpoint/2010/main" val="517783100"/>
+        <p14:creationId xmlns:p14="http://schemas.microsoft.com/office/powerpoint/2010/main" val="2054776145"/>
       </p:ext>
     </p:extLst>
   </p:cSld>
   <p:clrMapOvr>
     <a:masterClrMapping/>
   </p:clrMapOvr>
-  <p:timing>
-    <p:tnLst>
-      <p:par>
-        <p:cTn id="1" dur="indefinite" restart="never" nodeType="tmRoot"/>
-      </p:par>
-    </p:tnLst>
-  </p:timing>
 </p:sld>
 </file>
 
@@ -10612,136 +10605,79 @@
           <a:lstStyle/>
           <a:p>
             <a:r>
-              <a:rPr lang="en-US" altLang="zh-TW" dirty="0" err="1" smtClean="0"/>
-              <a:t>Github</a:t>
+              <a:rPr lang="en-US" altLang="zh-TW" dirty="0" smtClean="0"/>
+              <a:t>RESTful Routing</a:t>
             </a:r>
             <a:endParaRPr lang="zh-TW" altLang="en-US" dirty="0"/>
           </a:p>
         </p:txBody>
       </p:sp>
-      <p:sp>
-        <p:nvSpPr>
-          <p:cNvPr id="3" name="內容版面配置區 2"/>
-          <p:cNvSpPr>
-            <a:spLocks noGrp="1"/>
-          </p:cNvSpPr>
+      <p:pic>
+        <p:nvPicPr>
+          <p:cNvPr id="3076" name="Picture 4"/>
+          <p:cNvPicPr>
+            <a:picLocks noGrp="1" noChangeAspect="1" noChangeArrowheads="1"/>
+          </p:cNvPicPr>
           <p:nvPr>
             <p:ph idx="1"/>
           </p:nvPr>
-        </p:nvSpPr>
-        <p:spPr/>
-        <p:txBody>
-          <a:bodyPr/>
-          <a:lstStyle/>
-          <a:p>
-            <a:r>
-              <a:rPr lang="zh-TW" altLang="en-US" dirty="0" smtClean="0"/>
-              <a:t>共享虛擬主機服務</a:t>
-            </a:r>
-            <a:endParaRPr lang="en-US" altLang="zh-TW" dirty="0" smtClean="0"/>
-          </a:p>
-          <a:p>
-            <a:r>
-              <a:rPr lang="zh-TW" altLang="en-US" dirty="0" smtClean="0"/>
-              <a:t>存放使用</a:t>
-            </a:r>
-            <a:r>
-              <a:rPr lang="en-US" altLang="zh-TW" dirty="0" err="1" smtClean="0"/>
-              <a:t>Git</a:t>
-            </a:r>
-            <a:r>
-              <a:rPr lang="zh-TW" altLang="en-US" dirty="0" smtClean="0"/>
-              <a:t>版本控制的程式、專案</a:t>
-            </a:r>
-            <a:endParaRPr lang="en-US" altLang="zh-TW" dirty="0" smtClean="0"/>
-          </a:p>
-          <a:p>
-            <a:r>
-              <a:rPr lang="zh-TW" altLang="en-US" dirty="0" smtClean="0"/>
-              <a:t>方便社會化軟體開發的功能</a:t>
-            </a:r>
-            <a:endParaRPr lang="en-US" altLang="zh-TW" dirty="0" smtClean="0"/>
-          </a:p>
-          <a:p>
-            <a:pPr lvl="1"/>
-            <a:r>
-              <a:rPr lang="zh-TW" altLang="en-US" dirty="0" smtClean="0"/>
-              <a:t>追蹤其它用戶</a:t>
-            </a:r>
-            <a:endParaRPr lang="en-US" altLang="zh-TW" dirty="0" smtClean="0"/>
-          </a:p>
-          <a:p>
-            <a:pPr lvl="1"/>
-            <a:r>
-              <a:rPr lang="zh-TW" altLang="en-US" dirty="0" smtClean="0"/>
-              <a:t>組織</a:t>
-            </a:r>
-            <a:r>
-              <a:rPr lang="en-US" altLang="zh-TW" dirty="0" smtClean="0"/>
-              <a:t>(group)</a:t>
-            </a:r>
-          </a:p>
-          <a:p>
-            <a:pPr lvl="1"/>
-            <a:r>
-              <a:rPr lang="zh-TW" altLang="en-US" dirty="0" smtClean="0"/>
-              <a:t>軟體</a:t>
-            </a:r>
-            <a:r>
-              <a:rPr lang="zh-TW" altLang="en-US" dirty="0" smtClean="0"/>
-              <a:t>庫</a:t>
-            </a:r>
-            <a:r>
-              <a:rPr lang="en-US" altLang="zh-TW" smtClean="0"/>
-              <a:t>(repository/repo)</a:t>
-            </a:r>
-            <a:r>
-              <a:rPr lang="zh-TW" altLang="en-US" dirty="0" smtClean="0"/>
-              <a:t>的動態</a:t>
-            </a:r>
-            <a:endParaRPr lang="en-US" altLang="zh-TW" dirty="0" smtClean="0"/>
-          </a:p>
-          <a:p>
-            <a:pPr lvl="1"/>
-            <a:r>
-              <a:rPr lang="zh-TW" altLang="en-US" dirty="0" smtClean="0"/>
-              <a:t>對</a:t>
-            </a:r>
-            <a:r>
-              <a:rPr lang="zh-TW" altLang="en-US" dirty="0" smtClean="0"/>
-              <a:t>程式的改動和</a:t>
-            </a:r>
-            <a:r>
-              <a:rPr lang="en-US" altLang="zh-TW" dirty="0" smtClean="0"/>
-              <a:t>bug</a:t>
-            </a:r>
-            <a:r>
-              <a:rPr lang="zh-TW" altLang="en-US" dirty="0" smtClean="0"/>
-              <a:t>提出評論</a:t>
-            </a:r>
-          </a:p>
-          <a:p>
-            <a:endParaRPr lang="zh-TW" altLang="en-US" dirty="0"/>
-          </a:p>
-        </p:txBody>
-      </p:sp>
+        </p:nvPicPr>
+        <p:blipFill>
+          <a:blip r:embed="rId2">
+            <a:extLst>
+              <a:ext uri="{28A0092B-C50C-407E-A947-70E740481C1C}">
+                <a14:useLocalDpi xmlns:a14="http://schemas.microsoft.com/office/drawing/2010/main" val="0"/>
+              </a:ext>
+            </a:extLst>
+          </a:blip>
+          <a:srcRect/>
+          <a:stretch>
+            <a:fillRect/>
+          </a:stretch>
+        </p:blipFill>
+        <p:spPr bwMode="auto">
+          <a:xfrm>
+            <a:off x="467544" y="2132856"/>
+            <a:ext cx="7354577" cy="3480792"/>
+          </a:xfrm>
+          <a:prstGeom prst="rect">
+            <a:avLst/>
+          </a:prstGeom>
+          <a:noFill/>
+          <a:ln>
+            <a:noFill/>
+          </a:ln>
+          <a:extLst>
+            <a:ext uri="{909E8E84-426E-40DD-AFC4-6F175D3DCCD1}">
+              <a14:hiddenFill xmlns:a14="http://schemas.microsoft.com/office/drawing/2010/main">
+                <a:solidFill>
+                  <a:schemeClr val="accent1"/>
+                </a:solidFill>
+              </a14:hiddenFill>
+            </a:ext>
+            <a:ext uri="{91240B29-F687-4F45-9708-019B960494DF}">
+              <a14:hiddenLine xmlns:a14="http://schemas.microsoft.com/office/drawing/2010/main" w="9525">
+                <a:solidFill>
+                  <a:schemeClr val="tx1"/>
+                </a:solidFill>
+                <a:miter lim="800000"/>
+                <a:headEnd/>
+                <a:tailEnd/>
+              </a14:hiddenLine>
+            </a:ext>
+          </a:extLst>
+        </p:spPr>
+      </p:pic>
     </p:spTree>
     <p:extLst>
       <p:ext uri="{BB962C8B-B14F-4D97-AF65-F5344CB8AC3E}">
-        <p14:creationId xmlns:p14="http://schemas.microsoft.com/office/powerpoint/2010/main" val="837447092"/>
+        <p14:creationId xmlns:p14="http://schemas.microsoft.com/office/powerpoint/2010/main" val="440152417"/>
       </p:ext>
     </p:extLst>
   </p:cSld>
   <p:clrMapOvr>
     <a:masterClrMapping/>
   </p:clrMapOvr>
-  <p:timing>
-    <p:tnLst>
-      <p:par>
-        <p:cTn id="1" dur="indefinite" restart="never" nodeType="tmRoot"/>
-      </p:par>
-    </p:tnLst>
-  </p:timing>
 </p:sld>
 </file>
 
@@ -10764,7 +10700,7 @@
       </p:grpSpPr>
       <p:sp>
         <p:nvSpPr>
-          <p:cNvPr id="4" name="標題 3"/>
+          <p:cNvPr id="2" name="標題 1"/>
           <p:cNvSpPr>
             <a:spLocks noGrp="1"/>
           </p:cNvSpPr>
@@ -10772,41 +10708,85 @@
             <p:ph type="title"/>
           </p:nvPr>
         </p:nvSpPr>
-        <p:spPr>
-          <a:xfrm>
-            <a:off x="467544" y="2564904"/>
-            <a:ext cx="8229600" cy="1156990"/>
-          </a:xfrm>
-        </p:spPr>
+        <p:spPr/>
         <p:txBody>
           <a:bodyPr/>
           <a:lstStyle/>
           <a:p>
             <a:r>
-              <a:rPr lang="zh-TW" altLang="en-US" dirty="0" smtClean="0"/>
-              <a:t>系統實作與實驗</a:t>
+              <a:rPr lang="en-US" altLang="zh-TW" dirty="0" smtClean="0"/>
+              <a:t>More routing</a:t>
             </a:r>
             <a:endParaRPr lang="zh-TW" altLang="en-US" dirty="0"/>
           </a:p>
         </p:txBody>
       </p:sp>
+      <p:pic>
+        <p:nvPicPr>
+          <p:cNvPr id="4098" name="Picture 2"/>
+          <p:cNvPicPr>
+            <a:picLocks noGrp="1" noChangeAspect="1" noChangeArrowheads="1"/>
+          </p:cNvPicPr>
+          <p:nvPr>
+            <p:ph idx="1"/>
+          </p:nvPr>
+        </p:nvPicPr>
+        <p:blipFill>
+          <a:blip r:embed="rId2">
+            <a:extLst>
+              <a:ext uri="{28A0092B-C50C-407E-A947-70E740481C1C}">
+                <a14:useLocalDpi xmlns:a14="http://schemas.microsoft.com/office/drawing/2010/main" val="0"/>
+              </a:ext>
+            </a:extLst>
+          </a:blip>
+          <a:srcRect/>
+          <a:stretch>
+            <a:fillRect/>
+          </a:stretch>
+        </p:blipFill>
+        <p:spPr bwMode="auto">
+          <a:xfrm>
+            <a:off x="1115616" y="1700808"/>
+            <a:ext cx="6242069" cy="4670077"/>
+          </a:xfrm>
+          <a:prstGeom prst="rect">
+            <a:avLst/>
+          </a:prstGeom>
+          <a:noFill/>
+          <a:ln>
+            <a:noFill/>
+          </a:ln>
+          <a:extLst>
+            <a:ext uri="{909E8E84-426E-40DD-AFC4-6F175D3DCCD1}">
+              <a14:hiddenFill xmlns:a14="http://schemas.microsoft.com/office/drawing/2010/main">
+                <a:solidFill>
+                  <a:schemeClr val="accent1"/>
+                </a:solidFill>
+              </a14:hiddenFill>
+            </a:ext>
+            <a:ext uri="{91240B29-F687-4F45-9708-019B960494DF}">
+              <a14:hiddenLine xmlns:a14="http://schemas.microsoft.com/office/drawing/2010/main" w="9525">
+                <a:solidFill>
+                  <a:schemeClr val="tx1"/>
+                </a:solidFill>
+                <a:miter lim="800000"/>
+                <a:headEnd/>
+                <a:tailEnd/>
+              </a14:hiddenLine>
+            </a:ext>
+          </a:extLst>
+        </p:spPr>
+      </p:pic>
     </p:spTree>
     <p:extLst>
       <p:ext uri="{BB962C8B-B14F-4D97-AF65-F5344CB8AC3E}">
-        <p14:creationId xmlns:p14="http://schemas.microsoft.com/office/powerpoint/2010/main" val="829056583"/>
+        <p14:creationId xmlns:p14="http://schemas.microsoft.com/office/powerpoint/2010/main" val="4233179468"/>
       </p:ext>
     </p:extLst>
   </p:cSld>
   <p:clrMapOvr>
     <a:masterClrMapping/>
   </p:clrMapOvr>
-  <p:timing>
-    <p:tnLst>
-      <p:par>
-        <p:cTn id="1" dur="indefinite" restart="never" nodeType="tmRoot"/>
-      </p:par>
-    </p:tnLst>
-  </p:timing>
 </p:sld>
 </file>
 
@@ -10843,178 +10823,79 @@
           <a:lstStyle/>
           <a:p>
             <a:r>
-              <a:rPr lang="zh-TW" altLang="en-US" dirty="0" smtClean="0"/>
-              <a:t>稽核事件、任務</a:t>
+              <a:rPr lang="en-US" altLang="zh-TW" dirty="0" smtClean="0"/>
+              <a:t>Blade</a:t>
             </a:r>
             <a:endParaRPr lang="zh-TW" altLang="en-US" dirty="0"/>
           </a:p>
         </p:txBody>
       </p:sp>
-      <p:sp>
-        <p:nvSpPr>
-          <p:cNvPr id="3" name="內容版面配置區 2"/>
-          <p:cNvSpPr>
-            <a:spLocks noGrp="1"/>
-          </p:cNvSpPr>
+      <p:pic>
+        <p:nvPicPr>
+          <p:cNvPr id="5122" name="Picture 2"/>
+          <p:cNvPicPr>
+            <a:picLocks noGrp="1" noChangeAspect="1" noChangeArrowheads="1"/>
+          </p:cNvPicPr>
           <p:nvPr>
             <p:ph idx="1"/>
           </p:nvPr>
-        </p:nvSpPr>
-        <p:spPr/>
-        <p:txBody>
-          <a:bodyPr>
-            <a:normAutofit/>
-          </a:bodyPr>
-          <a:lstStyle/>
-          <a:p>
-            <a:r>
-              <a:rPr lang="zh-TW" altLang="en-US" dirty="0" smtClean="0"/>
-              <a:t>持續一段時間</a:t>
-            </a:r>
-            <a:endParaRPr lang="en-US" altLang="zh-TW" dirty="0" smtClean="0"/>
-          </a:p>
-          <a:p>
-            <a:r>
-              <a:rPr lang="zh-TW" altLang="en-US" dirty="0" smtClean="0"/>
-              <a:t>期間</a:t>
-            </a:r>
-            <a:r>
-              <a:rPr lang="zh-TW" altLang="en-US" dirty="0"/>
-              <a:t>可以指派多筆稽核</a:t>
-            </a:r>
-            <a:r>
-              <a:rPr lang="zh-TW" altLang="en-US" dirty="0" smtClean="0"/>
-              <a:t>任務</a:t>
-            </a:r>
-            <a:endParaRPr lang="en-US" altLang="zh-TW" dirty="0" smtClean="0"/>
-          </a:p>
-          <a:p>
-            <a:r>
-              <a:rPr lang="zh-TW" altLang="en-US" dirty="0" smtClean="0"/>
-              <a:t>一</a:t>
-            </a:r>
-            <a:r>
-              <a:rPr lang="zh-TW" altLang="en-US" dirty="0"/>
-              <a:t>筆稽核</a:t>
-            </a:r>
-            <a:r>
-              <a:rPr lang="zh-TW" altLang="en-US" dirty="0" smtClean="0"/>
-              <a:t>任務由</a:t>
-            </a:r>
-            <a:r>
-              <a:rPr lang="zh-TW" altLang="en-US" dirty="0"/>
-              <a:t>一名稽核</a:t>
-            </a:r>
-            <a:r>
-              <a:rPr lang="zh-TW" altLang="en-US" dirty="0" smtClean="0"/>
-              <a:t>人員完成稽核、填寫回報</a:t>
-            </a:r>
-            <a:endParaRPr lang="en-US" altLang="zh-TW" dirty="0" smtClean="0"/>
-          </a:p>
-          <a:p>
-            <a:r>
-              <a:rPr lang="zh-TW" altLang="en-US" dirty="0" smtClean="0"/>
-              <a:t>填寫完成後寄信至主管信箱</a:t>
-            </a:r>
-            <a:endParaRPr lang="en-US" altLang="zh-TW" dirty="0" smtClean="0"/>
-          </a:p>
-          <a:p>
-            <a:r>
-              <a:rPr lang="zh-TW" altLang="en-US" dirty="0" smtClean="0"/>
-              <a:t>主管</a:t>
-            </a:r>
-            <a:r>
-              <a:rPr lang="zh-TW" altLang="en-US" dirty="0"/>
-              <a:t>簽署</a:t>
-            </a:r>
-            <a:r>
-              <a:rPr lang="zh-TW" altLang="en-US" dirty="0" smtClean="0"/>
-              <a:t>後寄信</a:t>
-            </a:r>
-            <a:r>
-              <a:rPr lang="zh-TW" altLang="en-US" dirty="0"/>
-              <a:t>至稽核小組</a:t>
-            </a:r>
-            <a:r>
-              <a:rPr lang="zh-TW" altLang="en-US" dirty="0" smtClean="0"/>
-              <a:t>信箱</a:t>
-            </a:r>
-            <a:endParaRPr lang="en-US" altLang="zh-TW" dirty="0" smtClean="0"/>
-          </a:p>
-          <a:p>
-            <a:r>
-              <a:rPr lang="zh-TW" altLang="en-US" dirty="0" smtClean="0"/>
-              <a:t>簽署結束＝回報完成</a:t>
-            </a:r>
-            <a:endParaRPr lang="en-US" altLang="zh-TW" dirty="0" smtClean="0"/>
-          </a:p>
-          <a:p>
-            <a:r>
-              <a:rPr lang="zh-TW" altLang="en-US" dirty="0" smtClean="0"/>
-              <a:t>由</a:t>
-            </a:r>
-            <a:r>
-              <a:rPr lang="zh-TW" altLang="en-US" dirty="0"/>
-              <a:t>受稽機關進行矯正預防</a:t>
-            </a:r>
-            <a:r>
-              <a:rPr lang="zh-TW" altLang="en-US" dirty="0" smtClean="0"/>
-              <a:t>處理、填寫</a:t>
-            </a:r>
-            <a:r>
-              <a:rPr lang="zh-TW" altLang="en-US" dirty="0"/>
-              <a:t>矯正預防</a:t>
-            </a:r>
-            <a:r>
-              <a:rPr lang="zh-TW" altLang="en-US" dirty="0" smtClean="0"/>
-              <a:t>結果</a:t>
-            </a:r>
-            <a:endParaRPr lang="en-US" altLang="zh-TW" dirty="0" smtClean="0"/>
-          </a:p>
-          <a:p>
-            <a:r>
-              <a:rPr lang="zh-TW" altLang="en-US" dirty="0" smtClean="0"/>
-              <a:t>填寫完成寄信</a:t>
-            </a:r>
-            <a:r>
-              <a:rPr lang="zh-TW" altLang="en-US" dirty="0"/>
-              <a:t>至主管</a:t>
-            </a:r>
-            <a:r>
-              <a:rPr lang="zh-TW" altLang="en-US" dirty="0" smtClean="0"/>
-              <a:t>信箱</a:t>
-            </a:r>
-            <a:endParaRPr lang="en-US" altLang="zh-TW" dirty="0" smtClean="0"/>
-          </a:p>
-          <a:p>
-            <a:r>
-              <a:rPr lang="zh-TW" altLang="en-US" dirty="0" smtClean="0"/>
-              <a:t>簽署成功＝矯正完成＝一筆稽核完成。</a:t>
-            </a:r>
-            <a:br>
-              <a:rPr lang="zh-TW" altLang="en-US" dirty="0" smtClean="0"/>
-            </a:br>
-            <a:endParaRPr lang="zh-TW" altLang="en-US" dirty="0"/>
-          </a:p>
-        </p:txBody>
-      </p:sp>
+        </p:nvPicPr>
+        <p:blipFill>
+          <a:blip r:embed="rId2">
+            <a:extLst>
+              <a:ext uri="{28A0092B-C50C-407E-A947-70E740481C1C}">
+                <a14:useLocalDpi xmlns:a14="http://schemas.microsoft.com/office/drawing/2010/main" val="0"/>
+              </a:ext>
+            </a:extLst>
+          </a:blip>
+          <a:srcRect/>
+          <a:stretch>
+            <a:fillRect/>
+          </a:stretch>
+        </p:blipFill>
+        <p:spPr bwMode="auto">
+          <a:xfrm>
+            <a:off x="467544" y="2492896"/>
+            <a:ext cx="7668648" cy="2864938"/>
+          </a:xfrm>
+          <a:prstGeom prst="rect">
+            <a:avLst/>
+          </a:prstGeom>
+          <a:noFill/>
+          <a:ln>
+            <a:noFill/>
+          </a:ln>
+          <a:extLst>
+            <a:ext uri="{909E8E84-426E-40DD-AFC4-6F175D3DCCD1}">
+              <a14:hiddenFill xmlns:a14="http://schemas.microsoft.com/office/drawing/2010/main">
+                <a:solidFill>
+                  <a:schemeClr val="accent1"/>
+                </a:solidFill>
+              </a14:hiddenFill>
+            </a:ext>
+            <a:ext uri="{91240B29-F687-4F45-9708-019B960494DF}">
+              <a14:hiddenLine xmlns:a14="http://schemas.microsoft.com/office/drawing/2010/main" w="9525">
+                <a:solidFill>
+                  <a:schemeClr val="tx1"/>
+                </a:solidFill>
+                <a:miter lim="800000"/>
+                <a:headEnd/>
+                <a:tailEnd/>
+              </a14:hiddenLine>
+            </a:ext>
+          </a:extLst>
+        </p:spPr>
+      </p:pic>
     </p:spTree>
     <p:extLst>
       <p:ext uri="{BB962C8B-B14F-4D97-AF65-F5344CB8AC3E}">
-        <p14:creationId xmlns:p14="http://schemas.microsoft.com/office/powerpoint/2010/main" val="2879552582"/>
+        <p14:creationId xmlns:p14="http://schemas.microsoft.com/office/powerpoint/2010/main" val="3743397231"/>
       </p:ext>
     </p:extLst>
   </p:cSld>
   <p:clrMapOvr>
     <a:masterClrMapping/>
   </p:clrMapOvr>
-  <p:timing>
-    <p:tnLst>
-      <p:par>
-        <p:cTn id="1" dur="indefinite" restart="never" nodeType="tmRoot"/>
-      </p:par>
-    </p:tnLst>
-  </p:timing>
 </p:sld>
 </file>
 
@@ -11204,6 +11085,676 @@
           <a:lstStyle/>
           <a:p>
             <a:r>
+              <a:rPr lang="en-US" altLang="zh-TW" dirty="0"/>
+              <a:t>C</a:t>
+            </a:r>
+            <a:r>
+              <a:rPr lang="en-US" altLang="zh-TW" dirty="0" smtClean="0"/>
+              <a:t>omposer</a:t>
+            </a:r>
+            <a:endParaRPr lang="zh-TW" altLang="en-US" dirty="0"/>
+          </a:p>
+        </p:txBody>
+      </p:sp>
+      <p:sp>
+        <p:nvSpPr>
+          <p:cNvPr id="3" name="內容版面配置區 2"/>
+          <p:cNvSpPr>
+            <a:spLocks noGrp="1"/>
+          </p:cNvSpPr>
+          <p:nvPr>
+            <p:ph idx="1"/>
+          </p:nvPr>
+        </p:nvSpPr>
+        <p:spPr/>
+        <p:txBody>
+          <a:bodyPr/>
+          <a:lstStyle/>
+          <a:p>
+            <a:r>
+              <a:rPr lang="en-US" altLang="zh-TW" dirty="0" smtClean="0"/>
+              <a:t>PHP</a:t>
+            </a:r>
+            <a:r>
+              <a:rPr lang="zh-TW" altLang="en-US" dirty="0" smtClean="0"/>
+              <a:t>依賴性</a:t>
+            </a:r>
+            <a:r>
+              <a:rPr lang="zh-TW" altLang="en-US" dirty="0"/>
+              <a:t>管理</a:t>
+            </a:r>
+            <a:r>
+              <a:rPr lang="zh-TW" altLang="en-US" dirty="0" smtClean="0"/>
+              <a:t>工具</a:t>
+            </a:r>
+            <a:endParaRPr lang="en-US" altLang="zh-TW" dirty="0" smtClean="0"/>
+          </a:p>
+          <a:p>
+            <a:r>
+              <a:rPr lang="zh-TW" altLang="en-US" dirty="0" smtClean="0"/>
+              <a:t>安裝專案依賴</a:t>
+            </a:r>
+            <a:r>
+              <a:rPr lang="zh-TW" altLang="en-US" dirty="0"/>
+              <a:t>函式</a:t>
+            </a:r>
+            <a:r>
+              <a:rPr lang="zh-TW" altLang="en-US" dirty="0" smtClean="0"/>
+              <a:t>庫</a:t>
+            </a:r>
+            <a:endParaRPr lang="en-US" altLang="zh-TW" dirty="0" smtClean="0"/>
+          </a:p>
+          <a:p>
+            <a:r>
+              <a:rPr lang="zh-TW" altLang="en-US" dirty="0" smtClean="0"/>
+              <a:t>簡化部署開發環境步驟</a:t>
+            </a:r>
+            <a:br>
+              <a:rPr lang="zh-TW" altLang="en-US" dirty="0" smtClean="0"/>
+            </a:br>
+            <a:endParaRPr lang="zh-TW" altLang="en-US" dirty="0"/>
+          </a:p>
+        </p:txBody>
+      </p:sp>
+    </p:spTree>
+    <p:extLst>
+      <p:ext uri="{BB962C8B-B14F-4D97-AF65-F5344CB8AC3E}">
+        <p14:creationId xmlns:p14="http://schemas.microsoft.com/office/powerpoint/2010/main" val="598198643"/>
+      </p:ext>
+    </p:extLst>
+  </p:cSld>
+  <p:clrMapOvr>
+    <a:masterClrMapping/>
+  </p:clrMapOvr>
+  <p:timing>
+    <p:tnLst>
+      <p:par>
+        <p:cTn id="1" dur="indefinite" restart="never" nodeType="tmRoot"/>
+      </p:par>
+    </p:tnLst>
+  </p:timing>
+</p:sld>
+</file>
+
+<file path=ppt/slides/slide21.xml><?xml version="1.0" encoding="utf-8"?>
+<p:sld xmlns:a="http://schemas.openxmlformats.org/drawingml/2006/main" xmlns:r="http://schemas.openxmlformats.org/officeDocument/2006/relationships" xmlns:p="http://schemas.openxmlformats.org/presentationml/2006/main">
+  <p:cSld>
+    <p:spTree>
+      <p:nvGrpSpPr>
+        <p:cNvPr id="1" name=""/>
+        <p:cNvGrpSpPr/>
+        <p:nvPr/>
+      </p:nvGrpSpPr>
+      <p:grpSpPr>
+        <a:xfrm>
+          <a:off x="0" y="0"/>
+          <a:ext cx="0" cy="0"/>
+          <a:chOff x="0" y="0"/>
+          <a:chExt cx="0" cy="0"/>
+        </a:xfrm>
+      </p:grpSpPr>
+      <p:sp>
+        <p:nvSpPr>
+          <p:cNvPr id="2" name="標題 1"/>
+          <p:cNvSpPr>
+            <a:spLocks noGrp="1"/>
+          </p:cNvSpPr>
+          <p:nvPr>
+            <p:ph type="title"/>
+          </p:nvPr>
+        </p:nvSpPr>
+        <p:spPr/>
+        <p:txBody>
+          <a:bodyPr/>
+          <a:lstStyle/>
+          <a:p>
+            <a:r>
+              <a:rPr lang="en-US" altLang="zh-TW" dirty="0" err="1" smtClean="0"/>
+              <a:t>Git</a:t>
+            </a:r>
+            <a:endParaRPr lang="zh-TW" altLang="en-US" dirty="0"/>
+          </a:p>
+        </p:txBody>
+      </p:sp>
+      <p:sp>
+        <p:nvSpPr>
+          <p:cNvPr id="3" name="內容版面配置區 2"/>
+          <p:cNvSpPr>
+            <a:spLocks noGrp="1"/>
+          </p:cNvSpPr>
+          <p:nvPr>
+            <p:ph idx="1"/>
+          </p:nvPr>
+        </p:nvSpPr>
+        <p:spPr/>
+        <p:txBody>
+          <a:bodyPr>
+            <a:normAutofit/>
+          </a:bodyPr>
+          <a:lstStyle/>
+          <a:p>
+            <a:r>
+              <a:rPr lang="zh-TW" altLang="en-US" dirty="0" smtClean="0"/>
+              <a:t>分散式</a:t>
+            </a:r>
+            <a:r>
+              <a:rPr lang="zh-TW" altLang="en-US" dirty="0"/>
+              <a:t>版本控制</a:t>
+            </a:r>
+            <a:r>
+              <a:rPr lang="zh-TW" altLang="en-US" dirty="0" smtClean="0"/>
+              <a:t>軟體</a:t>
+            </a:r>
+            <a:endParaRPr lang="en-US" altLang="zh-TW" dirty="0" smtClean="0"/>
+          </a:p>
+          <a:p>
+            <a:r>
+              <a:rPr lang="zh-TW" altLang="en-US" dirty="0" smtClean="0"/>
+              <a:t>合併</a:t>
+            </a:r>
+            <a:r>
+              <a:rPr lang="zh-TW" altLang="en-US" dirty="0"/>
+              <a:t>追蹤（</a:t>
+            </a:r>
+            <a:r>
+              <a:rPr lang="en-US" altLang="zh-TW" dirty="0"/>
+              <a:t>merge tracing</a:t>
+            </a:r>
+            <a:r>
+              <a:rPr lang="zh-TW" altLang="en-US" dirty="0" smtClean="0"/>
+              <a:t>）</a:t>
+            </a:r>
+            <a:br>
+              <a:rPr lang="zh-TW" altLang="en-US" dirty="0" smtClean="0"/>
+            </a:br>
+            <a:endParaRPr lang="zh-TW" altLang="en-US" dirty="0"/>
+          </a:p>
+        </p:txBody>
+      </p:sp>
+    </p:spTree>
+    <p:extLst>
+      <p:ext uri="{BB962C8B-B14F-4D97-AF65-F5344CB8AC3E}">
+        <p14:creationId xmlns:p14="http://schemas.microsoft.com/office/powerpoint/2010/main" val="517783100"/>
+      </p:ext>
+    </p:extLst>
+  </p:cSld>
+  <p:clrMapOvr>
+    <a:masterClrMapping/>
+  </p:clrMapOvr>
+  <p:timing>
+    <p:tnLst>
+      <p:par>
+        <p:cTn id="1" dur="indefinite" restart="never" nodeType="tmRoot"/>
+      </p:par>
+    </p:tnLst>
+  </p:timing>
+</p:sld>
+</file>
+
+<file path=ppt/slides/slide22.xml><?xml version="1.0" encoding="utf-8"?>
+<p:sld xmlns:a="http://schemas.openxmlformats.org/drawingml/2006/main" xmlns:r="http://schemas.openxmlformats.org/officeDocument/2006/relationships" xmlns:p="http://schemas.openxmlformats.org/presentationml/2006/main">
+  <p:cSld>
+    <p:spTree>
+      <p:nvGrpSpPr>
+        <p:cNvPr id="1" name=""/>
+        <p:cNvGrpSpPr/>
+        <p:nvPr/>
+      </p:nvGrpSpPr>
+      <p:grpSpPr>
+        <a:xfrm>
+          <a:off x="0" y="0"/>
+          <a:ext cx="0" cy="0"/>
+          <a:chOff x="0" y="0"/>
+          <a:chExt cx="0" cy="0"/>
+        </a:xfrm>
+      </p:grpSpPr>
+      <p:sp>
+        <p:nvSpPr>
+          <p:cNvPr id="2" name="標題 1"/>
+          <p:cNvSpPr>
+            <a:spLocks noGrp="1"/>
+          </p:cNvSpPr>
+          <p:nvPr>
+            <p:ph type="title"/>
+          </p:nvPr>
+        </p:nvSpPr>
+        <p:spPr/>
+        <p:txBody>
+          <a:bodyPr/>
+          <a:lstStyle/>
+          <a:p>
+            <a:r>
+              <a:rPr lang="en-US" altLang="zh-TW" dirty="0" err="1" smtClean="0"/>
+              <a:t>Github</a:t>
+            </a:r>
+            <a:endParaRPr lang="zh-TW" altLang="en-US" dirty="0"/>
+          </a:p>
+        </p:txBody>
+      </p:sp>
+      <p:sp>
+        <p:nvSpPr>
+          <p:cNvPr id="3" name="內容版面配置區 2"/>
+          <p:cNvSpPr>
+            <a:spLocks noGrp="1"/>
+          </p:cNvSpPr>
+          <p:nvPr>
+            <p:ph idx="1"/>
+          </p:nvPr>
+        </p:nvSpPr>
+        <p:spPr/>
+        <p:txBody>
+          <a:bodyPr/>
+          <a:lstStyle/>
+          <a:p>
+            <a:r>
+              <a:rPr lang="zh-TW" altLang="en-US" dirty="0" smtClean="0"/>
+              <a:t>共享虛擬主機服務</a:t>
+            </a:r>
+            <a:endParaRPr lang="en-US" altLang="zh-TW" dirty="0" smtClean="0"/>
+          </a:p>
+          <a:p>
+            <a:r>
+              <a:rPr lang="zh-TW" altLang="en-US" dirty="0" smtClean="0"/>
+              <a:t>存放使用</a:t>
+            </a:r>
+            <a:r>
+              <a:rPr lang="en-US" altLang="zh-TW" dirty="0" err="1" smtClean="0"/>
+              <a:t>Git</a:t>
+            </a:r>
+            <a:r>
+              <a:rPr lang="zh-TW" altLang="en-US" dirty="0" smtClean="0"/>
+              <a:t>版本控制的程式、專案</a:t>
+            </a:r>
+            <a:endParaRPr lang="en-US" altLang="zh-TW" dirty="0" smtClean="0"/>
+          </a:p>
+          <a:p>
+            <a:r>
+              <a:rPr lang="zh-TW" altLang="en-US" dirty="0" smtClean="0"/>
+              <a:t>方便社會化軟體開發的功能</a:t>
+            </a:r>
+            <a:endParaRPr lang="en-US" altLang="zh-TW" dirty="0" smtClean="0"/>
+          </a:p>
+          <a:p>
+            <a:pPr lvl="1"/>
+            <a:r>
+              <a:rPr lang="zh-TW" altLang="en-US" dirty="0" smtClean="0"/>
+              <a:t>追蹤其它用戶</a:t>
+            </a:r>
+            <a:endParaRPr lang="en-US" altLang="zh-TW" dirty="0" smtClean="0"/>
+          </a:p>
+          <a:p>
+            <a:pPr lvl="1"/>
+            <a:r>
+              <a:rPr lang="zh-TW" altLang="en-US" dirty="0" smtClean="0"/>
+              <a:t>組織</a:t>
+            </a:r>
+            <a:r>
+              <a:rPr lang="en-US" altLang="zh-TW" dirty="0" smtClean="0"/>
+              <a:t>(group)</a:t>
+            </a:r>
+          </a:p>
+          <a:p>
+            <a:pPr lvl="1"/>
+            <a:r>
+              <a:rPr lang="zh-TW" altLang="en-US" dirty="0" smtClean="0"/>
+              <a:t>軟體庫</a:t>
+            </a:r>
+            <a:r>
+              <a:rPr lang="en-US" altLang="zh-TW" smtClean="0"/>
+              <a:t>(repository/repo)</a:t>
+            </a:r>
+            <a:r>
+              <a:rPr lang="zh-TW" altLang="en-US" dirty="0" smtClean="0"/>
+              <a:t>的動態</a:t>
+            </a:r>
+            <a:endParaRPr lang="en-US" altLang="zh-TW" dirty="0" smtClean="0"/>
+          </a:p>
+          <a:p>
+            <a:pPr lvl="1"/>
+            <a:r>
+              <a:rPr lang="zh-TW" altLang="en-US" dirty="0" smtClean="0"/>
+              <a:t>對程式的改動和</a:t>
+            </a:r>
+            <a:r>
+              <a:rPr lang="en-US" altLang="zh-TW" dirty="0" smtClean="0"/>
+              <a:t>bug</a:t>
+            </a:r>
+            <a:r>
+              <a:rPr lang="zh-TW" altLang="en-US" dirty="0" smtClean="0"/>
+              <a:t>提出評論</a:t>
+            </a:r>
+          </a:p>
+          <a:p>
+            <a:endParaRPr lang="zh-TW" altLang="en-US" dirty="0"/>
+          </a:p>
+        </p:txBody>
+      </p:sp>
+    </p:spTree>
+    <p:extLst>
+      <p:ext uri="{BB962C8B-B14F-4D97-AF65-F5344CB8AC3E}">
+        <p14:creationId xmlns:p14="http://schemas.microsoft.com/office/powerpoint/2010/main" val="837447092"/>
+      </p:ext>
+    </p:extLst>
+  </p:cSld>
+  <p:clrMapOvr>
+    <a:masterClrMapping/>
+  </p:clrMapOvr>
+  <p:timing>
+    <p:tnLst>
+      <p:par>
+        <p:cTn id="1" dur="indefinite" restart="never" nodeType="tmRoot"/>
+      </p:par>
+    </p:tnLst>
+  </p:timing>
+</p:sld>
+</file>
+
+<file path=ppt/slides/slide23.xml><?xml version="1.0" encoding="utf-8"?>
+<p:sld xmlns:a="http://schemas.openxmlformats.org/drawingml/2006/main" xmlns:r="http://schemas.openxmlformats.org/officeDocument/2006/relationships" xmlns:p="http://schemas.openxmlformats.org/presentationml/2006/main">
+  <p:cSld>
+    <p:spTree>
+      <p:nvGrpSpPr>
+        <p:cNvPr id="1" name=""/>
+        <p:cNvGrpSpPr/>
+        <p:nvPr/>
+      </p:nvGrpSpPr>
+      <p:grpSpPr>
+        <a:xfrm>
+          <a:off x="0" y="0"/>
+          <a:ext cx="0" cy="0"/>
+          <a:chOff x="0" y="0"/>
+          <a:chExt cx="0" cy="0"/>
+        </a:xfrm>
+      </p:grpSpPr>
+      <p:sp>
+        <p:nvSpPr>
+          <p:cNvPr id="4" name="標題 3"/>
+          <p:cNvSpPr>
+            <a:spLocks noGrp="1"/>
+          </p:cNvSpPr>
+          <p:nvPr>
+            <p:ph type="title"/>
+          </p:nvPr>
+        </p:nvSpPr>
+        <p:spPr>
+          <a:xfrm>
+            <a:off x="467544" y="2564904"/>
+            <a:ext cx="8229600" cy="1156990"/>
+          </a:xfrm>
+        </p:spPr>
+        <p:txBody>
+          <a:bodyPr/>
+          <a:lstStyle/>
+          <a:p>
+            <a:r>
+              <a:rPr lang="zh-TW" altLang="en-US" dirty="0" smtClean="0"/>
+              <a:t>系統實作與實驗</a:t>
+            </a:r>
+            <a:endParaRPr lang="zh-TW" altLang="en-US" dirty="0"/>
+          </a:p>
+        </p:txBody>
+      </p:sp>
+    </p:spTree>
+    <p:extLst>
+      <p:ext uri="{BB962C8B-B14F-4D97-AF65-F5344CB8AC3E}">
+        <p14:creationId xmlns:p14="http://schemas.microsoft.com/office/powerpoint/2010/main" val="829056583"/>
+      </p:ext>
+    </p:extLst>
+  </p:cSld>
+  <p:clrMapOvr>
+    <a:masterClrMapping/>
+  </p:clrMapOvr>
+  <p:timing>
+    <p:tnLst>
+      <p:par>
+        <p:cTn id="1" dur="indefinite" restart="never" nodeType="tmRoot"/>
+      </p:par>
+    </p:tnLst>
+  </p:timing>
+</p:sld>
+</file>
+
+<file path=ppt/slides/slide24.xml><?xml version="1.0" encoding="utf-8"?>
+<p:sld xmlns:a="http://schemas.openxmlformats.org/drawingml/2006/main" xmlns:r="http://schemas.openxmlformats.org/officeDocument/2006/relationships" xmlns:p="http://schemas.openxmlformats.org/presentationml/2006/main">
+  <p:cSld>
+    <p:spTree>
+      <p:nvGrpSpPr>
+        <p:cNvPr id="1" name=""/>
+        <p:cNvGrpSpPr/>
+        <p:nvPr/>
+      </p:nvGrpSpPr>
+      <p:grpSpPr>
+        <a:xfrm>
+          <a:off x="0" y="0"/>
+          <a:ext cx="0" cy="0"/>
+          <a:chOff x="0" y="0"/>
+          <a:chExt cx="0" cy="0"/>
+        </a:xfrm>
+      </p:grpSpPr>
+      <p:sp>
+        <p:nvSpPr>
+          <p:cNvPr id="2" name="標題 1"/>
+          <p:cNvSpPr>
+            <a:spLocks noGrp="1"/>
+          </p:cNvSpPr>
+          <p:nvPr>
+            <p:ph type="title"/>
+          </p:nvPr>
+        </p:nvSpPr>
+        <p:spPr/>
+        <p:txBody>
+          <a:bodyPr/>
+          <a:lstStyle/>
+          <a:p>
+            <a:r>
+              <a:rPr lang="zh-TW" altLang="en-US" dirty="0" smtClean="0"/>
+              <a:t>稽核事件、任務</a:t>
+            </a:r>
+            <a:endParaRPr lang="zh-TW" altLang="en-US" dirty="0"/>
+          </a:p>
+        </p:txBody>
+      </p:sp>
+      <p:sp>
+        <p:nvSpPr>
+          <p:cNvPr id="3" name="內容版面配置區 2"/>
+          <p:cNvSpPr>
+            <a:spLocks noGrp="1"/>
+          </p:cNvSpPr>
+          <p:nvPr>
+            <p:ph idx="1"/>
+          </p:nvPr>
+        </p:nvSpPr>
+        <p:spPr/>
+        <p:txBody>
+          <a:bodyPr>
+            <a:normAutofit/>
+          </a:bodyPr>
+          <a:lstStyle/>
+          <a:p>
+            <a:r>
+              <a:rPr lang="zh-TW" altLang="en-US" dirty="0" smtClean="0"/>
+              <a:t>持續一段時間</a:t>
+            </a:r>
+            <a:endParaRPr lang="en-US" altLang="zh-TW" dirty="0" smtClean="0"/>
+          </a:p>
+          <a:p>
+            <a:r>
+              <a:rPr lang="zh-TW" altLang="en-US" dirty="0" smtClean="0"/>
+              <a:t>期間</a:t>
+            </a:r>
+            <a:r>
+              <a:rPr lang="zh-TW" altLang="en-US" dirty="0"/>
+              <a:t>可以指派多筆稽核</a:t>
+            </a:r>
+            <a:r>
+              <a:rPr lang="zh-TW" altLang="en-US" dirty="0" smtClean="0"/>
+              <a:t>任務</a:t>
+            </a:r>
+            <a:endParaRPr lang="en-US" altLang="zh-TW" dirty="0" smtClean="0"/>
+          </a:p>
+          <a:p>
+            <a:r>
+              <a:rPr lang="zh-TW" altLang="en-US" dirty="0" smtClean="0"/>
+              <a:t>一</a:t>
+            </a:r>
+            <a:r>
+              <a:rPr lang="zh-TW" altLang="en-US" dirty="0"/>
+              <a:t>筆稽核</a:t>
+            </a:r>
+            <a:r>
+              <a:rPr lang="zh-TW" altLang="en-US" dirty="0" smtClean="0"/>
+              <a:t>任務由</a:t>
+            </a:r>
+            <a:r>
+              <a:rPr lang="zh-TW" altLang="en-US" dirty="0"/>
+              <a:t>一名稽核</a:t>
+            </a:r>
+            <a:r>
+              <a:rPr lang="zh-TW" altLang="en-US" dirty="0" smtClean="0"/>
+              <a:t>人員完成稽核、填寫回報</a:t>
+            </a:r>
+            <a:endParaRPr lang="en-US" altLang="zh-TW" dirty="0" smtClean="0"/>
+          </a:p>
+          <a:p>
+            <a:r>
+              <a:rPr lang="zh-TW" altLang="en-US" dirty="0" smtClean="0"/>
+              <a:t>填寫完成後寄信至主管信箱</a:t>
+            </a:r>
+            <a:endParaRPr lang="en-US" altLang="zh-TW" dirty="0" smtClean="0"/>
+          </a:p>
+          <a:p>
+            <a:r>
+              <a:rPr lang="zh-TW" altLang="en-US" dirty="0" smtClean="0"/>
+              <a:t>主管</a:t>
+            </a:r>
+            <a:r>
+              <a:rPr lang="zh-TW" altLang="en-US" dirty="0"/>
+              <a:t>簽署</a:t>
+            </a:r>
+            <a:r>
+              <a:rPr lang="zh-TW" altLang="en-US" dirty="0" smtClean="0"/>
+              <a:t>後寄信</a:t>
+            </a:r>
+            <a:r>
+              <a:rPr lang="zh-TW" altLang="en-US" dirty="0"/>
+              <a:t>至稽核小組</a:t>
+            </a:r>
+            <a:r>
+              <a:rPr lang="zh-TW" altLang="en-US" dirty="0" smtClean="0"/>
+              <a:t>信箱</a:t>
+            </a:r>
+            <a:endParaRPr lang="en-US" altLang="zh-TW" dirty="0" smtClean="0"/>
+          </a:p>
+          <a:p>
+            <a:r>
+              <a:rPr lang="zh-TW" altLang="en-US" dirty="0" smtClean="0"/>
+              <a:t>簽署結束＝回報完成</a:t>
+            </a:r>
+            <a:endParaRPr lang="en-US" altLang="zh-TW" dirty="0" smtClean="0"/>
+          </a:p>
+          <a:p>
+            <a:r>
+              <a:rPr lang="zh-TW" altLang="en-US" dirty="0" smtClean="0"/>
+              <a:t>由</a:t>
+            </a:r>
+            <a:r>
+              <a:rPr lang="zh-TW" altLang="en-US" dirty="0"/>
+              <a:t>受稽機關進行矯正預防</a:t>
+            </a:r>
+            <a:r>
+              <a:rPr lang="zh-TW" altLang="en-US" dirty="0" smtClean="0"/>
+              <a:t>處理、填寫</a:t>
+            </a:r>
+            <a:r>
+              <a:rPr lang="zh-TW" altLang="en-US" dirty="0"/>
+              <a:t>矯正預防</a:t>
+            </a:r>
+            <a:r>
+              <a:rPr lang="zh-TW" altLang="en-US" dirty="0" smtClean="0"/>
+              <a:t>結果</a:t>
+            </a:r>
+            <a:endParaRPr lang="en-US" altLang="zh-TW" dirty="0" smtClean="0"/>
+          </a:p>
+          <a:p>
+            <a:r>
+              <a:rPr lang="zh-TW" altLang="en-US" dirty="0" smtClean="0"/>
+              <a:t>填寫完成寄信</a:t>
+            </a:r>
+            <a:r>
+              <a:rPr lang="zh-TW" altLang="en-US" dirty="0"/>
+              <a:t>至主管</a:t>
+            </a:r>
+            <a:r>
+              <a:rPr lang="zh-TW" altLang="en-US" dirty="0" smtClean="0"/>
+              <a:t>信箱</a:t>
+            </a:r>
+            <a:endParaRPr lang="en-US" altLang="zh-TW" dirty="0" smtClean="0"/>
+          </a:p>
+          <a:p>
+            <a:r>
+              <a:rPr lang="zh-TW" altLang="en-US" dirty="0" smtClean="0"/>
+              <a:t>簽署成功＝矯正完成＝一筆稽核完成。</a:t>
+            </a:r>
+            <a:br>
+              <a:rPr lang="zh-TW" altLang="en-US" dirty="0" smtClean="0"/>
+            </a:br>
+            <a:endParaRPr lang="zh-TW" altLang="en-US" dirty="0"/>
+          </a:p>
+        </p:txBody>
+      </p:sp>
+    </p:spTree>
+    <p:extLst>
+      <p:ext uri="{BB962C8B-B14F-4D97-AF65-F5344CB8AC3E}">
+        <p14:creationId xmlns:p14="http://schemas.microsoft.com/office/powerpoint/2010/main" val="2879552582"/>
+      </p:ext>
+    </p:extLst>
+  </p:cSld>
+  <p:clrMapOvr>
+    <a:masterClrMapping/>
+  </p:clrMapOvr>
+  <p:timing>
+    <p:tnLst>
+      <p:par>
+        <p:cTn id="1" dur="indefinite" restart="never" nodeType="tmRoot"/>
+      </p:par>
+    </p:tnLst>
+  </p:timing>
+</p:sld>
+</file>
+
+<file path=ppt/slides/slide25.xml><?xml version="1.0" encoding="utf-8"?>
+<p:sld xmlns:a="http://schemas.openxmlformats.org/drawingml/2006/main" xmlns:r="http://schemas.openxmlformats.org/officeDocument/2006/relationships" xmlns:p="http://schemas.openxmlformats.org/presentationml/2006/main">
+  <p:cSld>
+    <p:spTree>
+      <p:nvGrpSpPr>
+        <p:cNvPr id="1" name=""/>
+        <p:cNvGrpSpPr/>
+        <p:nvPr/>
+      </p:nvGrpSpPr>
+      <p:grpSpPr>
+        <a:xfrm>
+          <a:off x="0" y="0"/>
+          <a:ext cx="0" cy="0"/>
+          <a:chOff x="0" y="0"/>
+          <a:chExt cx="0" cy="0"/>
+        </a:xfrm>
+      </p:grpSpPr>
+      <p:sp>
+        <p:nvSpPr>
+          <p:cNvPr id="2" name="標題 1"/>
+          <p:cNvSpPr>
+            <a:spLocks noGrp="1"/>
+          </p:cNvSpPr>
+          <p:nvPr>
+            <p:ph type="title"/>
+          </p:nvPr>
+        </p:nvSpPr>
+        <p:spPr/>
+        <p:txBody>
+          <a:bodyPr/>
+          <a:lstStyle/>
+          <a:p>
+            <a:r>
               <a:rPr lang="zh-TW" altLang="en-US" dirty="0" smtClean="0"/>
               <a:t>稽核人員</a:t>
             </a:r>
@@ -11306,7 +11857,7 @@
 </p:sld>
 </file>
 
-<file path=ppt/slides/slide21.xml><?xml version="1.0" encoding="utf-8"?>
+<file path=ppt/slides/slide26.xml><?xml version="1.0" encoding="utf-8"?>
 <p:sld xmlns:a="http://schemas.openxmlformats.org/drawingml/2006/main" xmlns:r="http://schemas.openxmlformats.org/officeDocument/2006/relationships" xmlns:p="http://schemas.openxmlformats.org/presentationml/2006/main">
   <p:cSld>
     <p:spTree>
@@ -11421,7 +11972,7 @@
 </p:sld>
 </file>
 
-<file path=ppt/slides/slide22.xml><?xml version="1.0" encoding="utf-8"?>
+<file path=ppt/slides/slide27.xml><?xml version="1.0" encoding="utf-8"?>
 <p:sld xmlns:a="http://schemas.openxmlformats.org/drawingml/2006/main" xmlns:r="http://schemas.openxmlformats.org/officeDocument/2006/relationships" xmlns:p="http://schemas.openxmlformats.org/presentationml/2006/main">
   <p:cSld>
     <p:spTree>
@@ -11536,7 +12087,7 @@
 </p:sld>
 </file>
 
-<file path=ppt/slides/slide23.xml><?xml version="1.0" encoding="utf-8"?>
+<file path=ppt/slides/slide28.xml><?xml version="1.0" encoding="utf-8"?>
 <p:sld xmlns:a="http://schemas.openxmlformats.org/drawingml/2006/main" xmlns:r="http://schemas.openxmlformats.org/officeDocument/2006/relationships" xmlns:p="http://schemas.openxmlformats.org/presentationml/2006/main">
   <p:cSld>
     <p:spTree>
@@ -11585,624 +12136,6 @@
     <p:extLst>
       <p:ext uri="{BB962C8B-B14F-4D97-AF65-F5344CB8AC3E}">
         <p14:creationId xmlns:p14="http://schemas.microsoft.com/office/powerpoint/2010/main" val="693232607"/>
-      </p:ext>
-    </p:extLst>
-  </p:cSld>
-  <p:clrMapOvr>
-    <a:masterClrMapping/>
-  </p:clrMapOvr>
-  <p:timing>
-    <p:tnLst>
-      <p:par>
-        <p:cTn id="1" dur="indefinite" restart="never" nodeType="tmRoot"/>
-      </p:par>
-    </p:tnLst>
-  </p:timing>
-</p:sld>
-</file>
-
-<file path=ppt/slides/slide24.xml><?xml version="1.0" encoding="utf-8"?>
-<p:sld xmlns:a="http://schemas.openxmlformats.org/drawingml/2006/main" xmlns:r="http://schemas.openxmlformats.org/officeDocument/2006/relationships" xmlns:p="http://schemas.openxmlformats.org/presentationml/2006/main">
-  <p:cSld>
-    <p:spTree>
-      <p:nvGrpSpPr>
-        <p:cNvPr id="1" name=""/>
-        <p:cNvGrpSpPr/>
-        <p:nvPr/>
-      </p:nvGrpSpPr>
-      <p:grpSpPr>
-        <a:xfrm>
-          <a:off x="0" y="0"/>
-          <a:ext cx="0" cy="0"/>
-          <a:chOff x="0" y="0"/>
-          <a:chExt cx="0" cy="0"/>
-        </a:xfrm>
-      </p:grpSpPr>
-      <p:sp>
-        <p:nvSpPr>
-          <p:cNvPr id="2" name="標題 1"/>
-          <p:cNvSpPr>
-            <a:spLocks noGrp="1"/>
-          </p:cNvSpPr>
-          <p:nvPr>
-            <p:ph type="title"/>
-          </p:nvPr>
-        </p:nvSpPr>
-        <p:spPr/>
-        <p:txBody>
-          <a:bodyPr/>
-          <a:lstStyle/>
-          <a:p>
-            <a:r>
-              <a:rPr lang="zh-TW" altLang="en-US" dirty="0" smtClean="0"/>
-              <a:t>功能介紹</a:t>
-            </a:r>
-            <a:endParaRPr lang="zh-TW" altLang="en-US" dirty="0"/>
-          </a:p>
-        </p:txBody>
-      </p:sp>
-      <p:sp>
-        <p:nvSpPr>
-          <p:cNvPr id="3" name="內容版面配置區 2"/>
-          <p:cNvSpPr>
-            <a:spLocks noGrp="1"/>
-          </p:cNvSpPr>
-          <p:nvPr>
-            <p:ph idx="1"/>
-          </p:nvPr>
-        </p:nvSpPr>
-        <p:spPr/>
-        <p:txBody>
-          <a:bodyPr>
-            <a:normAutofit/>
-          </a:bodyPr>
-          <a:lstStyle/>
-          <a:p>
-            <a:r>
-              <a:rPr lang="zh-TW" altLang="en-US" dirty="0" smtClean="0"/>
-              <a:t>身份驗證以及登入</a:t>
-            </a:r>
-            <a:endParaRPr lang="en-US" altLang="zh-TW" dirty="0" smtClean="0"/>
-          </a:p>
-          <a:p>
-            <a:pPr lvl="1"/>
-            <a:r>
-              <a:rPr lang="zh-TW" altLang="en-US" dirty="0" smtClean="0"/>
-              <a:t>資料庫存取</a:t>
-            </a:r>
-            <a:endParaRPr lang="en-US" altLang="zh-TW" dirty="0" smtClean="0"/>
-          </a:p>
-          <a:p>
-            <a:pPr lvl="1"/>
-            <a:r>
-              <a:rPr lang="en-US" altLang="zh-TW" dirty="0" smtClean="0"/>
-              <a:t>Session </a:t>
-            </a:r>
-            <a:r>
-              <a:rPr lang="zh-TW" altLang="en-US" dirty="0" smtClean="0"/>
-              <a:t>記錄</a:t>
-            </a:r>
-            <a:endParaRPr lang="en-US" altLang="zh-TW" dirty="0" smtClean="0"/>
-          </a:p>
-          <a:p>
-            <a:pPr lvl="1"/>
-            <a:r>
-              <a:rPr lang="zh-TW" altLang="en-US" dirty="0" smtClean="0"/>
-              <a:t>存</a:t>
-            </a:r>
-            <a:r>
-              <a:rPr lang="zh-TW" altLang="en-US" dirty="0"/>
-              <a:t>取控管</a:t>
-            </a:r>
-          </a:p>
-          <a:p>
-            <a:r>
-              <a:rPr lang="zh-TW" altLang="en-US" dirty="0"/>
-              <a:t>管理</a:t>
-            </a:r>
-            <a:r>
-              <a:rPr lang="zh-TW" altLang="en-US" dirty="0" smtClean="0"/>
-              <a:t>介面</a:t>
-            </a:r>
-            <a:endParaRPr lang="en-US" altLang="zh-TW" dirty="0" smtClean="0"/>
-          </a:p>
-          <a:p>
-            <a:pPr lvl="1"/>
-            <a:r>
-              <a:rPr lang="zh-TW" altLang="en-US" dirty="0" smtClean="0"/>
-              <a:t>使用者</a:t>
-            </a:r>
-            <a:endParaRPr lang="en-US" altLang="zh-TW" dirty="0" smtClean="0"/>
-          </a:p>
-          <a:p>
-            <a:pPr lvl="1"/>
-            <a:r>
-              <a:rPr lang="zh-TW" altLang="en-US" dirty="0" smtClean="0"/>
-              <a:t>設定</a:t>
-            </a:r>
-            <a:endParaRPr lang="en-US" altLang="zh-TW" dirty="0" smtClean="0"/>
-          </a:p>
-          <a:p>
-            <a:pPr lvl="1"/>
-            <a:r>
-              <a:rPr lang="zh-TW" altLang="en-US" dirty="0" smtClean="0"/>
-              <a:t>任務</a:t>
-            </a:r>
-            <a:r>
-              <a:rPr lang="zh-TW" altLang="en-US" dirty="0"/>
-              <a:t>管理</a:t>
-            </a:r>
-          </a:p>
-          <a:p>
-            <a:r>
-              <a:rPr lang="zh-TW" altLang="en-US" dirty="0" smtClean="0"/>
-              <a:t>稽核人員介面</a:t>
-            </a:r>
-            <a:endParaRPr lang="en-US" altLang="zh-TW" dirty="0" smtClean="0"/>
-          </a:p>
-          <a:p>
-            <a:pPr lvl="1"/>
-            <a:r>
-              <a:rPr lang="zh-TW" altLang="en-US" dirty="0" smtClean="0"/>
-              <a:t>稽核行事曆</a:t>
-            </a:r>
-            <a:endParaRPr lang="en-US" altLang="zh-TW" dirty="0"/>
-          </a:p>
-          <a:p>
-            <a:pPr lvl="1"/>
-            <a:r>
-              <a:rPr lang="zh-TW" altLang="en-US" dirty="0" smtClean="0"/>
-              <a:t>稽核報告填寫與暫存</a:t>
-            </a:r>
-            <a:endParaRPr lang="zh-TW" altLang="en-US" dirty="0"/>
-          </a:p>
-        </p:txBody>
-      </p:sp>
-    </p:spTree>
-    <p:extLst>
-      <p:ext uri="{BB962C8B-B14F-4D97-AF65-F5344CB8AC3E}">
-        <p14:creationId xmlns:p14="http://schemas.microsoft.com/office/powerpoint/2010/main" val="3227895633"/>
-      </p:ext>
-    </p:extLst>
-  </p:cSld>
-  <p:clrMapOvr>
-    <a:masterClrMapping/>
-  </p:clrMapOvr>
-  <p:timing>
-    <p:tnLst>
-      <p:par>
-        <p:cTn id="1" dur="indefinite" restart="never" nodeType="tmRoot"/>
-      </p:par>
-    </p:tnLst>
-  </p:timing>
-</p:sld>
-</file>
-
-<file path=ppt/slides/slide25.xml><?xml version="1.0" encoding="utf-8"?>
-<p:sld xmlns:a="http://schemas.openxmlformats.org/drawingml/2006/main" xmlns:r="http://schemas.openxmlformats.org/officeDocument/2006/relationships" xmlns:p="http://schemas.openxmlformats.org/presentationml/2006/main">
-  <p:cSld>
-    <p:spTree>
-      <p:nvGrpSpPr>
-        <p:cNvPr id="1" name=""/>
-        <p:cNvGrpSpPr/>
-        <p:nvPr/>
-      </p:nvGrpSpPr>
-      <p:grpSpPr>
-        <a:xfrm>
-          <a:off x="0" y="0"/>
-          <a:ext cx="0" cy="0"/>
-          <a:chOff x="0" y="0"/>
-          <a:chExt cx="0" cy="0"/>
-        </a:xfrm>
-      </p:grpSpPr>
-      <p:sp>
-        <p:nvSpPr>
-          <p:cNvPr id="2" name="標題 1"/>
-          <p:cNvSpPr>
-            <a:spLocks noGrp="1"/>
-          </p:cNvSpPr>
-          <p:nvPr>
-            <p:ph type="title"/>
-          </p:nvPr>
-        </p:nvSpPr>
-        <p:spPr/>
-        <p:txBody>
-          <a:bodyPr/>
-          <a:lstStyle/>
-          <a:p>
-            <a:r>
-              <a:rPr lang="zh-TW" altLang="en-US" dirty="0" smtClean="0"/>
-              <a:t>功能介紹</a:t>
-            </a:r>
-            <a:endParaRPr lang="zh-TW" altLang="en-US" dirty="0"/>
-          </a:p>
-        </p:txBody>
-      </p:sp>
-      <p:sp>
-        <p:nvSpPr>
-          <p:cNvPr id="3" name="內容版面配置區 2"/>
-          <p:cNvSpPr>
-            <a:spLocks noGrp="1"/>
-          </p:cNvSpPr>
-          <p:nvPr>
-            <p:ph idx="1"/>
-          </p:nvPr>
-        </p:nvSpPr>
-        <p:spPr/>
-        <p:txBody>
-          <a:bodyPr>
-            <a:normAutofit/>
-          </a:bodyPr>
-          <a:lstStyle/>
-          <a:p>
-            <a:r>
-              <a:rPr lang="zh-TW" altLang="en-US" dirty="0" smtClean="0"/>
-              <a:t>稽核以及矯正預防報告產生</a:t>
-            </a:r>
-            <a:endParaRPr lang="en-US" altLang="zh-TW" dirty="0" smtClean="0"/>
-          </a:p>
-          <a:p>
-            <a:pPr lvl="1"/>
-            <a:r>
-              <a:rPr lang="en-US" altLang="zh-TW" dirty="0" smtClean="0"/>
-              <a:t>PDF </a:t>
-            </a:r>
-            <a:r>
-              <a:rPr lang="zh-TW" altLang="en-US" dirty="0"/>
-              <a:t>產生器</a:t>
-            </a:r>
-          </a:p>
-          <a:p>
-            <a:r>
-              <a:rPr lang="zh-TW" altLang="en-US" dirty="0" smtClean="0"/>
-              <a:t>單位主管通知簽署</a:t>
-            </a:r>
-            <a:endParaRPr lang="en-US" altLang="zh-TW" dirty="0" smtClean="0"/>
-          </a:p>
-          <a:p>
-            <a:pPr lvl="1"/>
-            <a:r>
-              <a:rPr lang="zh-TW" altLang="en-US" dirty="0" smtClean="0"/>
-              <a:t>藉由信件寄送簽署連結以及稽核</a:t>
-            </a:r>
-            <a:r>
-              <a:rPr lang="zh-TW" altLang="en-US" dirty="0"/>
-              <a:t>報告 </a:t>
-            </a:r>
-            <a:r>
-              <a:rPr lang="en-US" altLang="zh-TW" dirty="0"/>
-              <a:t>PDF </a:t>
-            </a:r>
-            <a:r>
-              <a:rPr lang="zh-TW" altLang="en-US" dirty="0"/>
-              <a:t>給單位主管確認</a:t>
-            </a:r>
-          </a:p>
-          <a:p>
-            <a:r>
-              <a:rPr lang="zh-TW" altLang="en-US" dirty="0" smtClean="0"/>
-              <a:t>受稽單位介面</a:t>
-            </a:r>
-            <a:endParaRPr lang="en-US" altLang="zh-TW" dirty="0" smtClean="0"/>
-          </a:p>
-          <a:p>
-            <a:pPr lvl="1"/>
-            <a:r>
-              <a:rPr lang="zh-TW" altLang="en-US" dirty="0" smtClean="0"/>
-              <a:t>矯正預防報告填寫</a:t>
-            </a:r>
-            <a:r>
-              <a:rPr lang="zh-TW" altLang="en-US" dirty="0"/>
-              <a:t>或指定其他同仁填寫</a:t>
-            </a:r>
-          </a:p>
-        </p:txBody>
-      </p:sp>
-    </p:spTree>
-    <p:extLst>
-      <p:ext uri="{BB962C8B-B14F-4D97-AF65-F5344CB8AC3E}">
-        <p14:creationId xmlns:p14="http://schemas.microsoft.com/office/powerpoint/2010/main" val="950409900"/>
-      </p:ext>
-    </p:extLst>
-  </p:cSld>
-  <p:clrMapOvr>
-    <a:masterClrMapping/>
-  </p:clrMapOvr>
-  <p:timing>
-    <p:tnLst>
-      <p:par>
-        <p:cTn id="1" dur="indefinite" restart="never" nodeType="tmRoot"/>
-      </p:par>
-    </p:tnLst>
-  </p:timing>
-</p:sld>
-</file>
-
-<file path=ppt/slides/slide26.xml><?xml version="1.0" encoding="utf-8"?>
-<p:sld xmlns:a="http://schemas.openxmlformats.org/drawingml/2006/main" xmlns:r="http://schemas.openxmlformats.org/officeDocument/2006/relationships" xmlns:p="http://schemas.openxmlformats.org/presentationml/2006/main">
-  <p:cSld>
-    <p:spTree>
-      <p:nvGrpSpPr>
-        <p:cNvPr id="1" name=""/>
-        <p:cNvGrpSpPr/>
-        <p:nvPr/>
-      </p:nvGrpSpPr>
-      <p:grpSpPr>
-        <a:xfrm>
-          <a:off x="0" y="0"/>
-          <a:ext cx="0" cy="0"/>
-          <a:chOff x="0" y="0"/>
-          <a:chExt cx="0" cy="0"/>
-        </a:xfrm>
-      </p:grpSpPr>
-      <p:sp>
-        <p:nvSpPr>
-          <p:cNvPr id="4" name="標題 3"/>
-          <p:cNvSpPr>
-            <a:spLocks noGrp="1"/>
-          </p:cNvSpPr>
-          <p:nvPr>
-            <p:ph type="title"/>
-          </p:nvPr>
-        </p:nvSpPr>
-        <p:spPr>
-          <a:xfrm>
-            <a:off x="467544" y="2564904"/>
-            <a:ext cx="8229600" cy="1156990"/>
-          </a:xfrm>
-        </p:spPr>
-        <p:txBody>
-          <a:bodyPr/>
-          <a:lstStyle/>
-          <a:p>
-            <a:r>
-              <a:rPr lang="zh-TW" altLang="en-US" dirty="0" smtClean="0"/>
-              <a:t>管理介面</a:t>
-            </a:r>
-            <a:endParaRPr lang="en-US" altLang="zh-TW" dirty="0"/>
-          </a:p>
-        </p:txBody>
-      </p:sp>
-    </p:spTree>
-    <p:extLst>
-      <p:ext uri="{BB962C8B-B14F-4D97-AF65-F5344CB8AC3E}">
-        <p14:creationId xmlns:p14="http://schemas.microsoft.com/office/powerpoint/2010/main" val="1031223462"/>
-      </p:ext>
-    </p:extLst>
-  </p:cSld>
-  <p:clrMapOvr>
-    <a:masterClrMapping/>
-  </p:clrMapOvr>
-  <p:timing>
-    <p:tnLst>
-      <p:par>
-        <p:cTn id="1" dur="indefinite" restart="never" nodeType="tmRoot"/>
-      </p:par>
-    </p:tnLst>
-  </p:timing>
-</p:sld>
-</file>
-
-<file path=ppt/slides/slide27.xml><?xml version="1.0" encoding="utf-8"?>
-<p:sld xmlns:a="http://schemas.openxmlformats.org/drawingml/2006/main" xmlns:r="http://schemas.openxmlformats.org/officeDocument/2006/relationships" xmlns:p="http://schemas.openxmlformats.org/presentationml/2006/main">
-  <p:cSld>
-    <p:spTree>
-      <p:nvGrpSpPr>
-        <p:cNvPr id="1" name=""/>
-        <p:cNvGrpSpPr/>
-        <p:nvPr/>
-      </p:nvGrpSpPr>
-      <p:grpSpPr>
-        <a:xfrm>
-          <a:off x="0" y="0"/>
-          <a:ext cx="0" cy="0"/>
-          <a:chOff x="0" y="0"/>
-          <a:chExt cx="0" cy="0"/>
-        </a:xfrm>
-      </p:grpSpPr>
-      <p:sp>
-        <p:nvSpPr>
-          <p:cNvPr id="2" name="標題 1"/>
-          <p:cNvSpPr>
-            <a:spLocks noGrp="1"/>
-          </p:cNvSpPr>
-          <p:nvPr>
-            <p:ph type="title"/>
-          </p:nvPr>
-        </p:nvSpPr>
-        <p:spPr/>
-        <p:txBody>
-          <a:bodyPr/>
-          <a:lstStyle/>
-          <a:p>
-            <a:r>
-              <a:rPr kumimoji="1" lang="zh-TW" altLang="en-US" dirty="0" smtClean="0"/>
-              <a:t>行事曆</a:t>
-            </a:r>
-            <a:endParaRPr kumimoji="1" lang="zh-TW" altLang="en-US" dirty="0"/>
-          </a:p>
-        </p:txBody>
-      </p:sp>
-      <p:sp>
-        <p:nvSpPr>
-          <p:cNvPr id="3" name="內容版面配置區 2"/>
-          <p:cNvSpPr>
-            <a:spLocks noGrp="1"/>
-          </p:cNvSpPr>
-          <p:nvPr>
-            <p:ph idx="1"/>
-          </p:nvPr>
-        </p:nvSpPr>
-        <p:spPr/>
-        <p:txBody>
-          <a:bodyPr/>
-          <a:lstStyle/>
-          <a:p>
-            <a:r>
-              <a:rPr kumimoji="1" lang="zh-TW" altLang="en-US" dirty="0"/>
-              <a:t>使用 </a:t>
-            </a:r>
-            <a:r>
-              <a:rPr kumimoji="1" lang="en-US" altLang="zh-TW" dirty="0" err="1"/>
-              <a:t>FullCalendar</a:t>
-            </a:r>
-            <a:r>
-              <a:rPr kumimoji="1" lang="zh-TW" altLang="en-US" dirty="0"/>
-              <a:t>，一個開源的 </a:t>
-            </a:r>
-            <a:r>
-              <a:rPr kumimoji="1" lang="en-US" altLang="zh-TW" dirty="0"/>
-              <a:t>JavaScript </a:t>
-            </a:r>
-            <a:r>
-              <a:rPr kumimoji="1" lang="zh-TW" altLang="en-US" dirty="0"/>
-              <a:t>行事曆套件。</a:t>
-            </a:r>
-            <a:endParaRPr kumimoji="1" lang="en-US" altLang="zh-TW" dirty="0" smtClean="0"/>
-          </a:p>
-          <a:p>
-            <a:r>
-              <a:rPr kumimoji="1" lang="zh-TW" altLang="en-US" dirty="0" smtClean="0"/>
-              <a:t>透過 </a:t>
-            </a:r>
-            <a:r>
-              <a:rPr kumimoji="1" lang="en-US" altLang="zh-TW" dirty="0" smtClean="0"/>
-              <a:t>PHP </a:t>
-            </a:r>
-            <a:r>
-              <a:rPr kumimoji="1" lang="zh-TW" altLang="en-US" dirty="0" smtClean="0"/>
-              <a:t>從資料庫拿取資料給前端，再藉由 </a:t>
-            </a:r>
-            <a:r>
-              <a:rPr kumimoji="1" lang="en-US" altLang="zh-TW" dirty="0" smtClean="0"/>
-              <a:t>JavaScript </a:t>
-            </a:r>
-            <a:r>
-              <a:rPr kumimoji="1" lang="zh-TW" altLang="en-US" dirty="0" smtClean="0"/>
-              <a:t>將事件渲染至頁面上。</a:t>
-            </a:r>
-            <a:endParaRPr kumimoji="1" lang="en-US" altLang="zh-TW" dirty="0" smtClean="0"/>
-          </a:p>
-          <a:p>
-            <a:endParaRPr kumimoji="1" lang="en-US" altLang="zh-TW" dirty="0" smtClean="0"/>
-          </a:p>
-          <a:p>
-            <a:r>
-              <a:rPr kumimoji="1" lang="zh-TW" altLang="en-US" dirty="0" smtClean="0"/>
-              <a:t>行事曆上會顯示稽核</a:t>
-            </a:r>
-            <a:r>
-              <a:rPr kumimoji="1" lang="zh-TW" altLang="en-US" dirty="0"/>
-              <a:t>開始時間、稽核員與受稽單位，且顯示的最小單位可到一天的某分鐘。</a:t>
-            </a:r>
-            <a:endParaRPr kumimoji="1" lang="en-US" altLang="zh-Hant" dirty="0" smtClean="0"/>
-          </a:p>
-          <a:p>
-            <a:endParaRPr kumimoji="1" lang="en-US" altLang="zh-TW" dirty="0" smtClean="0"/>
-          </a:p>
-          <a:p>
-            <a:r>
-              <a:rPr kumimoji="1" lang="zh-TW" altLang="en-US" dirty="0" smtClean="0"/>
-              <a:t>（不確定要不要這頁）</a:t>
-            </a:r>
-            <a:endParaRPr kumimoji="1" lang="zh-TW" altLang="en-US" dirty="0"/>
-          </a:p>
-        </p:txBody>
-      </p:sp>
-    </p:spTree>
-    <p:extLst>
-      <p:ext uri="{BB962C8B-B14F-4D97-AF65-F5344CB8AC3E}">
-        <p14:creationId xmlns:p14="http://schemas.microsoft.com/office/powerpoint/2010/main" val="2139351975"/>
-      </p:ext>
-    </p:extLst>
-  </p:cSld>
-  <p:clrMapOvr>
-    <a:masterClrMapping/>
-  </p:clrMapOvr>
-  <p:timing>
-    <p:tnLst>
-      <p:par>
-        <p:cTn id="1" dur="indefinite" restart="never" nodeType="tmRoot"/>
-      </p:par>
-    </p:tnLst>
-  </p:timing>
-</p:sld>
-</file>
-
-<file path=ppt/slides/slide28.xml><?xml version="1.0" encoding="utf-8"?>
-<p:sld xmlns:a="http://schemas.openxmlformats.org/drawingml/2006/main" xmlns:r="http://schemas.openxmlformats.org/officeDocument/2006/relationships" xmlns:p="http://schemas.openxmlformats.org/presentationml/2006/main">
-  <p:cSld>
-    <p:spTree>
-      <p:nvGrpSpPr>
-        <p:cNvPr id="1" name=""/>
-        <p:cNvGrpSpPr/>
-        <p:nvPr/>
-      </p:nvGrpSpPr>
-      <p:grpSpPr>
-        <a:xfrm>
-          <a:off x="0" y="0"/>
-          <a:ext cx="0" cy="0"/>
-          <a:chOff x="0" y="0"/>
-          <a:chExt cx="0" cy="0"/>
-        </a:xfrm>
-      </p:grpSpPr>
-      <p:sp>
-        <p:nvSpPr>
-          <p:cNvPr id="2" name="標題 1"/>
-          <p:cNvSpPr>
-            <a:spLocks noGrp="1"/>
-          </p:cNvSpPr>
-          <p:nvPr>
-            <p:ph type="title"/>
-          </p:nvPr>
-        </p:nvSpPr>
-        <p:spPr/>
-        <p:txBody>
-          <a:bodyPr/>
-          <a:lstStyle/>
-          <a:p>
-            <a:r>
-              <a:rPr kumimoji="1" lang="zh-TW" altLang="en-US" dirty="0" smtClean="0"/>
-              <a:t>行事曆</a:t>
-            </a:r>
-            <a:endParaRPr kumimoji="1" lang="zh-TW" altLang="en-US" dirty="0"/>
-          </a:p>
-        </p:txBody>
-      </p:sp>
-      <p:pic>
-        <p:nvPicPr>
-          <p:cNvPr id="7" name="圖片 6" descr="Untitled1.gif"/>
-          <p:cNvPicPr>
-            <a:picLocks noChangeAspect="1"/>
-          </p:cNvPicPr>
-          <p:nvPr/>
-        </p:nvPicPr>
-        <p:blipFill>
-          <a:blip r:embed="rId3">
-            <a:extLst>
-              <a:ext uri="{28A0092B-C50C-407E-A947-70E740481C1C}">
-                <a14:useLocalDpi xmlns:a14="http://schemas.microsoft.com/office/drawing/2010/main" val="0"/>
-              </a:ext>
-            </a:extLst>
-          </a:blip>
-          <a:stretch>
-            <a:fillRect/>
-          </a:stretch>
-        </p:blipFill>
-        <p:spPr>
-          <a:xfrm>
-            <a:off x="1115616" y="1368152"/>
-            <a:ext cx="6503475" cy="5373216"/>
-          </a:xfrm>
-          <a:prstGeom prst="rect">
-            <a:avLst/>
-          </a:prstGeom>
-        </p:spPr>
-      </p:pic>
-    </p:spTree>
-    <p:extLst>
-      <p:ext uri="{BB962C8B-B14F-4D97-AF65-F5344CB8AC3E}">
-        <p14:creationId xmlns:p14="http://schemas.microsoft.com/office/powerpoint/2010/main" val="2303482676"/>
       </p:ext>
     </p:extLst>
   </p:cSld>
@@ -12252,16 +12185,16 @@
           <a:lstStyle/>
           <a:p>
             <a:r>
-              <a:rPr kumimoji="1" lang="zh-TW" altLang="en-US" dirty="0" smtClean="0"/>
-              <a:t>篩選器</a:t>
-            </a:r>
-            <a:endParaRPr kumimoji="1" lang="zh-TW" altLang="en-US" dirty="0"/>
+              <a:rPr lang="zh-TW" altLang="en-US" dirty="0" smtClean="0"/>
+              <a:t>功能介紹</a:t>
+            </a:r>
+            <a:endParaRPr lang="zh-TW" altLang="en-US" dirty="0"/>
           </a:p>
         </p:txBody>
       </p:sp>
       <p:sp>
         <p:nvSpPr>
-          <p:cNvPr id="7" name="內容版面配置區 6"/>
+          <p:cNvPr id="3" name="內容版面配置區 2"/>
           <p:cNvSpPr>
             <a:spLocks noGrp="1"/>
           </p:cNvSpPr>
@@ -12271,47 +12204,115 @@
         </p:nvSpPr>
         <p:spPr/>
         <p:txBody>
-          <a:bodyPr/>
+          <a:bodyPr>
+            <a:normAutofit/>
+          </a:bodyPr>
           <a:lstStyle/>
           <a:p>
-            <a:endParaRPr kumimoji="1" lang="zh-TW" altLang="en-US" dirty="0"/>
+            <a:r>
+              <a:rPr lang="zh-TW" altLang="en-US" dirty="0" smtClean="0"/>
+              <a:t>身份驗證以及登入</a:t>
+            </a:r>
+            <a:endParaRPr lang="en-US" altLang="zh-TW" dirty="0" smtClean="0"/>
+          </a:p>
+          <a:p>
+            <a:pPr lvl="1"/>
+            <a:r>
+              <a:rPr lang="zh-TW" altLang="en-US" dirty="0" smtClean="0"/>
+              <a:t>資料庫存取</a:t>
+            </a:r>
+            <a:endParaRPr lang="en-US" altLang="zh-TW" dirty="0" smtClean="0"/>
+          </a:p>
+          <a:p>
+            <a:pPr lvl="1"/>
+            <a:r>
+              <a:rPr lang="en-US" altLang="zh-TW" dirty="0" smtClean="0"/>
+              <a:t>Session </a:t>
+            </a:r>
+            <a:r>
+              <a:rPr lang="zh-TW" altLang="en-US" dirty="0" smtClean="0"/>
+              <a:t>記錄</a:t>
+            </a:r>
+            <a:endParaRPr lang="en-US" altLang="zh-TW" dirty="0" smtClean="0"/>
+          </a:p>
+          <a:p>
+            <a:pPr lvl="1"/>
+            <a:r>
+              <a:rPr lang="zh-TW" altLang="en-US" dirty="0" smtClean="0"/>
+              <a:t>存</a:t>
+            </a:r>
+            <a:r>
+              <a:rPr lang="zh-TW" altLang="en-US" dirty="0"/>
+              <a:t>取控管</a:t>
+            </a:r>
+          </a:p>
+          <a:p>
+            <a:r>
+              <a:rPr lang="zh-TW" altLang="en-US" dirty="0"/>
+              <a:t>管理</a:t>
+            </a:r>
+            <a:r>
+              <a:rPr lang="zh-TW" altLang="en-US" dirty="0" smtClean="0"/>
+              <a:t>介面</a:t>
+            </a:r>
+            <a:endParaRPr lang="en-US" altLang="zh-TW" dirty="0" smtClean="0"/>
+          </a:p>
+          <a:p>
+            <a:pPr lvl="1"/>
+            <a:r>
+              <a:rPr lang="zh-TW" altLang="en-US" dirty="0" smtClean="0"/>
+              <a:t>使用者</a:t>
+            </a:r>
+            <a:endParaRPr lang="en-US" altLang="zh-TW" dirty="0" smtClean="0"/>
+          </a:p>
+          <a:p>
+            <a:pPr lvl="1"/>
+            <a:r>
+              <a:rPr lang="zh-TW" altLang="en-US" dirty="0" smtClean="0"/>
+              <a:t>設定</a:t>
+            </a:r>
+            <a:endParaRPr lang="en-US" altLang="zh-TW" dirty="0" smtClean="0"/>
+          </a:p>
+          <a:p>
+            <a:pPr lvl="1"/>
+            <a:r>
+              <a:rPr lang="zh-TW" altLang="en-US" dirty="0" smtClean="0"/>
+              <a:t>任務</a:t>
+            </a:r>
+            <a:r>
+              <a:rPr lang="zh-TW" altLang="en-US" dirty="0"/>
+              <a:t>管理</a:t>
+            </a:r>
+          </a:p>
+          <a:p>
+            <a:r>
+              <a:rPr lang="zh-TW" altLang="en-US" dirty="0" smtClean="0"/>
+              <a:t>稽核人員介面</a:t>
+            </a:r>
+            <a:endParaRPr lang="en-US" altLang="zh-TW" dirty="0" smtClean="0"/>
+          </a:p>
+          <a:p>
+            <a:pPr lvl="1"/>
+            <a:r>
+              <a:rPr lang="zh-TW" altLang="en-US" dirty="0" smtClean="0"/>
+              <a:t>稽核行事曆</a:t>
+            </a:r>
+            <a:endParaRPr lang="en-US" altLang="zh-TW" dirty="0"/>
+          </a:p>
+          <a:p>
+            <a:pPr lvl="1"/>
+            <a:r>
+              <a:rPr lang="zh-TW" altLang="en-US" dirty="0" smtClean="0"/>
+              <a:t>稽核報告填寫與暫存</a:t>
+            </a:r>
+            <a:endParaRPr lang="zh-TW" altLang="en-US" dirty="0"/>
           </a:p>
         </p:txBody>
       </p:sp>
-      <p:pic>
-        <p:nvPicPr>
-          <p:cNvPr id="6" name="圖片 5" descr="Untitled.gif"/>
-          <p:cNvPicPr>
-            <a:picLocks noChangeAspect="1"/>
-          </p:cNvPicPr>
-          <p:nvPr/>
-        </p:nvPicPr>
-        <p:blipFill>
-          <a:blip r:embed="rId3">
-            <a:extLst>
-              <a:ext uri="{28A0092B-C50C-407E-A947-70E740481C1C}">
-                <a14:useLocalDpi xmlns:a14="http://schemas.microsoft.com/office/drawing/2010/main" val="0"/>
-              </a:ext>
-            </a:extLst>
-          </a:blip>
-          <a:stretch>
-            <a:fillRect/>
-          </a:stretch>
-        </p:blipFill>
-        <p:spPr>
-          <a:xfrm>
-            <a:off x="323528" y="1988840"/>
-            <a:ext cx="7991872" cy="3995936"/>
-          </a:xfrm>
-          <a:prstGeom prst="rect">
-            <a:avLst/>
-          </a:prstGeom>
-        </p:spPr>
-      </p:pic>
     </p:spTree>
     <p:extLst>
       <p:ext uri="{BB962C8B-B14F-4D97-AF65-F5344CB8AC3E}">
-        <p14:creationId xmlns:p14="http://schemas.microsoft.com/office/powerpoint/2010/main" val="3445478445"/>
+        <p14:creationId xmlns:p14="http://schemas.microsoft.com/office/powerpoint/2010/main" val="3227895633"/>
       </p:ext>
     </p:extLst>
   </p:cSld>
@@ -12744,6 +12745,556 @@
       </p:grpSpPr>
       <p:sp>
         <p:nvSpPr>
+          <p:cNvPr id="2" name="標題 1"/>
+          <p:cNvSpPr>
+            <a:spLocks noGrp="1"/>
+          </p:cNvSpPr>
+          <p:nvPr>
+            <p:ph type="title"/>
+          </p:nvPr>
+        </p:nvSpPr>
+        <p:spPr/>
+        <p:txBody>
+          <a:bodyPr/>
+          <a:lstStyle/>
+          <a:p>
+            <a:r>
+              <a:rPr lang="zh-TW" altLang="en-US" dirty="0" smtClean="0"/>
+              <a:t>功能介紹</a:t>
+            </a:r>
+            <a:endParaRPr lang="zh-TW" altLang="en-US" dirty="0"/>
+          </a:p>
+        </p:txBody>
+      </p:sp>
+      <p:sp>
+        <p:nvSpPr>
+          <p:cNvPr id="3" name="內容版面配置區 2"/>
+          <p:cNvSpPr>
+            <a:spLocks noGrp="1"/>
+          </p:cNvSpPr>
+          <p:nvPr>
+            <p:ph idx="1"/>
+          </p:nvPr>
+        </p:nvSpPr>
+        <p:spPr/>
+        <p:txBody>
+          <a:bodyPr>
+            <a:normAutofit/>
+          </a:bodyPr>
+          <a:lstStyle/>
+          <a:p>
+            <a:r>
+              <a:rPr lang="zh-TW" altLang="en-US" dirty="0" smtClean="0"/>
+              <a:t>稽核以及矯正預防報告產生</a:t>
+            </a:r>
+            <a:endParaRPr lang="en-US" altLang="zh-TW" dirty="0" smtClean="0"/>
+          </a:p>
+          <a:p>
+            <a:pPr lvl="1"/>
+            <a:r>
+              <a:rPr lang="en-US" altLang="zh-TW" dirty="0" smtClean="0"/>
+              <a:t>PDF </a:t>
+            </a:r>
+            <a:r>
+              <a:rPr lang="zh-TW" altLang="en-US" dirty="0"/>
+              <a:t>產生器</a:t>
+            </a:r>
+          </a:p>
+          <a:p>
+            <a:r>
+              <a:rPr lang="zh-TW" altLang="en-US" dirty="0" smtClean="0"/>
+              <a:t>單位主管通知簽署</a:t>
+            </a:r>
+            <a:endParaRPr lang="en-US" altLang="zh-TW" dirty="0" smtClean="0"/>
+          </a:p>
+          <a:p>
+            <a:pPr lvl="1"/>
+            <a:r>
+              <a:rPr lang="zh-TW" altLang="en-US" dirty="0" smtClean="0"/>
+              <a:t>藉由信件寄送簽署連結以及稽核</a:t>
+            </a:r>
+            <a:r>
+              <a:rPr lang="zh-TW" altLang="en-US" dirty="0"/>
+              <a:t>報告 </a:t>
+            </a:r>
+            <a:r>
+              <a:rPr lang="en-US" altLang="zh-TW" dirty="0"/>
+              <a:t>PDF </a:t>
+            </a:r>
+            <a:r>
+              <a:rPr lang="zh-TW" altLang="en-US" dirty="0"/>
+              <a:t>給單位主管確認</a:t>
+            </a:r>
+          </a:p>
+          <a:p>
+            <a:r>
+              <a:rPr lang="zh-TW" altLang="en-US" dirty="0" smtClean="0"/>
+              <a:t>受稽單位介面</a:t>
+            </a:r>
+            <a:endParaRPr lang="en-US" altLang="zh-TW" dirty="0" smtClean="0"/>
+          </a:p>
+          <a:p>
+            <a:pPr lvl="1"/>
+            <a:r>
+              <a:rPr lang="zh-TW" altLang="en-US" dirty="0" smtClean="0"/>
+              <a:t>矯正預防報告填寫</a:t>
+            </a:r>
+            <a:r>
+              <a:rPr lang="zh-TW" altLang="en-US" dirty="0"/>
+              <a:t>或指定其他同仁填寫</a:t>
+            </a:r>
+          </a:p>
+        </p:txBody>
+      </p:sp>
+    </p:spTree>
+    <p:extLst>
+      <p:ext uri="{BB962C8B-B14F-4D97-AF65-F5344CB8AC3E}">
+        <p14:creationId xmlns:p14="http://schemas.microsoft.com/office/powerpoint/2010/main" val="950409900"/>
+      </p:ext>
+    </p:extLst>
+  </p:cSld>
+  <p:clrMapOvr>
+    <a:masterClrMapping/>
+  </p:clrMapOvr>
+  <p:timing>
+    <p:tnLst>
+      <p:par>
+        <p:cTn id="1" dur="indefinite" restart="never" nodeType="tmRoot"/>
+      </p:par>
+    </p:tnLst>
+  </p:timing>
+</p:sld>
+</file>
+
+<file path=ppt/slides/slide31.xml><?xml version="1.0" encoding="utf-8"?>
+<p:sld xmlns:a="http://schemas.openxmlformats.org/drawingml/2006/main" xmlns:r="http://schemas.openxmlformats.org/officeDocument/2006/relationships" xmlns:p="http://schemas.openxmlformats.org/presentationml/2006/main">
+  <p:cSld>
+    <p:spTree>
+      <p:nvGrpSpPr>
+        <p:cNvPr id="1" name=""/>
+        <p:cNvGrpSpPr/>
+        <p:nvPr/>
+      </p:nvGrpSpPr>
+      <p:grpSpPr>
+        <a:xfrm>
+          <a:off x="0" y="0"/>
+          <a:ext cx="0" cy="0"/>
+          <a:chOff x="0" y="0"/>
+          <a:chExt cx="0" cy="0"/>
+        </a:xfrm>
+      </p:grpSpPr>
+      <p:sp>
+        <p:nvSpPr>
+          <p:cNvPr id="4" name="標題 3"/>
+          <p:cNvSpPr>
+            <a:spLocks noGrp="1"/>
+          </p:cNvSpPr>
+          <p:nvPr>
+            <p:ph type="title"/>
+          </p:nvPr>
+        </p:nvSpPr>
+        <p:spPr>
+          <a:xfrm>
+            <a:off x="467544" y="2564904"/>
+            <a:ext cx="8229600" cy="1156990"/>
+          </a:xfrm>
+        </p:spPr>
+        <p:txBody>
+          <a:bodyPr/>
+          <a:lstStyle/>
+          <a:p>
+            <a:r>
+              <a:rPr lang="zh-TW" altLang="en-US" dirty="0" smtClean="0"/>
+              <a:t>管理介面</a:t>
+            </a:r>
+            <a:endParaRPr lang="en-US" altLang="zh-TW" dirty="0"/>
+          </a:p>
+        </p:txBody>
+      </p:sp>
+    </p:spTree>
+    <p:extLst>
+      <p:ext uri="{BB962C8B-B14F-4D97-AF65-F5344CB8AC3E}">
+        <p14:creationId xmlns:p14="http://schemas.microsoft.com/office/powerpoint/2010/main" val="1031223462"/>
+      </p:ext>
+    </p:extLst>
+  </p:cSld>
+  <p:clrMapOvr>
+    <a:masterClrMapping/>
+  </p:clrMapOvr>
+  <p:timing>
+    <p:tnLst>
+      <p:par>
+        <p:cTn id="1" dur="indefinite" restart="never" nodeType="tmRoot"/>
+      </p:par>
+    </p:tnLst>
+  </p:timing>
+</p:sld>
+</file>
+
+<file path=ppt/slides/slide32.xml><?xml version="1.0" encoding="utf-8"?>
+<p:sld xmlns:a="http://schemas.openxmlformats.org/drawingml/2006/main" xmlns:r="http://schemas.openxmlformats.org/officeDocument/2006/relationships" xmlns:p="http://schemas.openxmlformats.org/presentationml/2006/main">
+  <p:cSld>
+    <p:spTree>
+      <p:nvGrpSpPr>
+        <p:cNvPr id="1" name=""/>
+        <p:cNvGrpSpPr/>
+        <p:nvPr/>
+      </p:nvGrpSpPr>
+      <p:grpSpPr>
+        <a:xfrm>
+          <a:off x="0" y="0"/>
+          <a:ext cx="0" cy="0"/>
+          <a:chOff x="0" y="0"/>
+          <a:chExt cx="0" cy="0"/>
+        </a:xfrm>
+      </p:grpSpPr>
+      <p:sp>
+        <p:nvSpPr>
+          <p:cNvPr id="2" name="標題 1"/>
+          <p:cNvSpPr>
+            <a:spLocks noGrp="1"/>
+          </p:cNvSpPr>
+          <p:nvPr>
+            <p:ph type="title"/>
+          </p:nvPr>
+        </p:nvSpPr>
+        <p:spPr/>
+        <p:txBody>
+          <a:bodyPr/>
+          <a:lstStyle/>
+          <a:p>
+            <a:r>
+              <a:rPr kumimoji="1" lang="zh-TW" altLang="en-US" dirty="0" smtClean="0"/>
+              <a:t>行事曆</a:t>
+            </a:r>
+            <a:endParaRPr kumimoji="1" lang="zh-TW" altLang="en-US" dirty="0"/>
+          </a:p>
+        </p:txBody>
+      </p:sp>
+      <p:sp>
+        <p:nvSpPr>
+          <p:cNvPr id="3" name="內容版面配置區 2"/>
+          <p:cNvSpPr>
+            <a:spLocks noGrp="1"/>
+          </p:cNvSpPr>
+          <p:nvPr>
+            <p:ph idx="1"/>
+          </p:nvPr>
+        </p:nvSpPr>
+        <p:spPr/>
+        <p:txBody>
+          <a:bodyPr/>
+          <a:lstStyle/>
+          <a:p>
+            <a:r>
+              <a:rPr kumimoji="1" lang="zh-TW" altLang="en-US" dirty="0"/>
+              <a:t>使用 </a:t>
+            </a:r>
+            <a:r>
+              <a:rPr kumimoji="1" lang="en-US" altLang="zh-TW" dirty="0" err="1"/>
+              <a:t>FullCalendar</a:t>
+            </a:r>
+            <a:r>
+              <a:rPr kumimoji="1" lang="zh-TW" altLang="en-US" dirty="0"/>
+              <a:t>，一個開源的 </a:t>
+            </a:r>
+            <a:r>
+              <a:rPr kumimoji="1" lang="en-US" altLang="zh-TW" dirty="0"/>
+              <a:t>JavaScript </a:t>
+            </a:r>
+            <a:r>
+              <a:rPr kumimoji="1" lang="zh-TW" altLang="en-US" dirty="0"/>
+              <a:t>行事曆套件。</a:t>
+            </a:r>
+            <a:endParaRPr kumimoji="1" lang="en-US" altLang="zh-TW" dirty="0" smtClean="0"/>
+          </a:p>
+          <a:p>
+            <a:r>
+              <a:rPr kumimoji="1" lang="zh-TW" altLang="en-US" dirty="0" smtClean="0"/>
+              <a:t>透過 </a:t>
+            </a:r>
+            <a:r>
+              <a:rPr kumimoji="1" lang="en-US" altLang="zh-TW" dirty="0" smtClean="0"/>
+              <a:t>PHP </a:t>
+            </a:r>
+            <a:r>
+              <a:rPr kumimoji="1" lang="zh-TW" altLang="en-US" dirty="0" smtClean="0"/>
+              <a:t>從資料庫拿取資料給前端，再藉由 </a:t>
+            </a:r>
+            <a:r>
+              <a:rPr kumimoji="1" lang="en-US" altLang="zh-TW" dirty="0" smtClean="0"/>
+              <a:t>JavaScript </a:t>
+            </a:r>
+            <a:r>
+              <a:rPr kumimoji="1" lang="zh-TW" altLang="en-US" dirty="0" smtClean="0"/>
+              <a:t>將事件渲染至頁面上。</a:t>
+            </a:r>
+            <a:endParaRPr kumimoji="1" lang="en-US" altLang="zh-TW" dirty="0" smtClean="0"/>
+          </a:p>
+          <a:p>
+            <a:endParaRPr kumimoji="1" lang="en-US" altLang="zh-TW" dirty="0" smtClean="0"/>
+          </a:p>
+          <a:p>
+            <a:r>
+              <a:rPr kumimoji="1" lang="zh-TW" altLang="en-US" dirty="0" smtClean="0"/>
+              <a:t>行事曆上會顯示稽核</a:t>
+            </a:r>
+            <a:r>
+              <a:rPr kumimoji="1" lang="zh-TW" altLang="en-US" dirty="0"/>
+              <a:t>開始時間、稽核員與受稽單位，且顯示的最小單位可到一天的某分鐘。</a:t>
+            </a:r>
+            <a:endParaRPr kumimoji="1" lang="en-US" altLang="zh-Hant" dirty="0" smtClean="0"/>
+          </a:p>
+          <a:p>
+            <a:endParaRPr kumimoji="1" lang="en-US" altLang="zh-TW" dirty="0" smtClean="0"/>
+          </a:p>
+          <a:p>
+            <a:r>
+              <a:rPr kumimoji="1" lang="zh-TW" altLang="en-US" dirty="0" smtClean="0"/>
+              <a:t>（不確定要不要這頁）</a:t>
+            </a:r>
+            <a:endParaRPr kumimoji="1" lang="zh-TW" altLang="en-US" dirty="0"/>
+          </a:p>
+        </p:txBody>
+      </p:sp>
+    </p:spTree>
+    <p:extLst>
+      <p:ext uri="{BB962C8B-B14F-4D97-AF65-F5344CB8AC3E}">
+        <p14:creationId xmlns:p14="http://schemas.microsoft.com/office/powerpoint/2010/main" val="2139351975"/>
+      </p:ext>
+    </p:extLst>
+  </p:cSld>
+  <p:clrMapOvr>
+    <a:masterClrMapping/>
+  </p:clrMapOvr>
+  <p:timing>
+    <p:tnLst>
+      <p:par>
+        <p:cTn id="1" dur="indefinite" restart="never" nodeType="tmRoot"/>
+      </p:par>
+    </p:tnLst>
+  </p:timing>
+</p:sld>
+</file>
+
+<file path=ppt/slides/slide33.xml><?xml version="1.0" encoding="utf-8"?>
+<p:sld xmlns:a="http://schemas.openxmlformats.org/drawingml/2006/main" xmlns:r="http://schemas.openxmlformats.org/officeDocument/2006/relationships" xmlns:p="http://schemas.openxmlformats.org/presentationml/2006/main">
+  <p:cSld>
+    <p:spTree>
+      <p:nvGrpSpPr>
+        <p:cNvPr id="1" name=""/>
+        <p:cNvGrpSpPr/>
+        <p:nvPr/>
+      </p:nvGrpSpPr>
+      <p:grpSpPr>
+        <a:xfrm>
+          <a:off x="0" y="0"/>
+          <a:ext cx="0" cy="0"/>
+          <a:chOff x="0" y="0"/>
+          <a:chExt cx="0" cy="0"/>
+        </a:xfrm>
+      </p:grpSpPr>
+      <p:sp>
+        <p:nvSpPr>
+          <p:cNvPr id="2" name="標題 1"/>
+          <p:cNvSpPr>
+            <a:spLocks noGrp="1"/>
+          </p:cNvSpPr>
+          <p:nvPr>
+            <p:ph type="title"/>
+          </p:nvPr>
+        </p:nvSpPr>
+        <p:spPr/>
+        <p:txBody>
+          <a:bodyPr/>
+          <a:lstStyle/>
+          <a:p>
+            <a:r>
+              <a:rPr kumimoji="1" lang="zh-TW" altLang="en-US" dirty="0" smtClean="0"/>
+              <a:t>行事曆</a:t>
+            </a:r>
+            <a:endParaRPr kumimoji="1" lang="zh-TW" altLang="en-US" dirty="0"/>
+          </a:p>
+        </p:txBody>
+      </p:sp>
+      <p:pic>
+        <p:nvPicPr>
+          <p:cNvPr id="7" name="圖片 6" descr="Untitled1.gif"/>
+          <p:cNvPicPr>
+            <a:picLocks noChangeAspect="1"/>
+          </p:cNvPicPr>
+          <p:nvPr/>
+        </p:nvPicPr>
+        <p:blipFill>
+          <a:blip r:embed="rId3">
+            <a:extLst>
+              <a:ext uri="{28A0092B-C50C-407E-A947-70E740481C1C}">
+                <a14:useLocalDpi xmlns:a14="http://schemas.microsoft.com/office/drawing/2010/main" val="0"/>
+              </a:ext>
+            </a:extLst>
+          </a:blip>
+          <a:stretch>
+            <a:fillRect/>
+          </a:stretch>
+        </p:blipFill>
+        <p:spPr>
+          <a:xfrm>
+            <a:off x="1115616" y="1368152"/>
+            <a:ext cx="6503475" cy="5373216"/>
+          </a:xfrm>
+          <a:prstGeom prst="rect">
+            <a:avLst/>
+          </a:prstGeom>
+        </p:spPr>
+      </p:pic>
+    </p:spTree>
+    <p:extLst>
+      <p:ext uri="{BB962C8B-B14F-4D97-AF65-F5344CB8AC3E}">
+        <p14:creationId xmlns:p14="http://schemas.microsoft.com/office/powerpoint/2010/main" val="2303482676"/>
+      </p:ext>
+    </p:extLst>
+  </p:cSld>
+  <p:clrMapOvr>
+    <a:masterClrMapping/>
+  </p:clrMapOvr>
+  <p:timing>
+    <p:tnLst>
+      <p:par>
+        <p:cTn id="1" dur="indefinite" restart="never" nodeType="tmRoot"/>
+      </p:par>
+    </p:tnLst>
+  </p:timing>
+</p:sld>
+</file>
+
+<file path=ppt/slides/slide34.xml><?xml version="1.0" encoding="utf-8"?>
+<p:sld xmlns:a="http://schemas.openxmlformats.org/drawingml/2006/main" xmlns:r="http://schemas.openxmlformats.org/officeDocument/2006/relationships" xmlns:p="http://schemas.openxmlformats.org/presentationml/2006/main">
+  <p:cSld>
+    <p:spTree>
+      <p:nvGrpSpPr>
+        <p:cNvPr id="1" name=""/>
+        <p:cNvGrpSpPr/>
+        <p:nvPr/>
+      </p:nvGrpSpPr>
+      <p:grpSpPr>
+        <a:xfrm>
+          <a:off x="0" y="0"/>
+          <a:ext cx="0" cy="0"/>
+          <a:chOff x="0" y="0"/>
+          <a:chExt cx="0" cy="0"/>
+        </a:xfrm>
+      </p:grpSpPr>
+      <p:sp>
+        <p:nvSpPr>
+          <p:cNvPr id="2" name="標題 1"/>
+          <p:cNvSpPr>
+            <a:spLocks noGrp="1"/>
+          </p:cNvSpPr>
+          <p:nvPr>
+            <p:ph type="title"/>
+          </p:nvPr>
+        </p:nvSpPr>
+        <p:spPr/>
+        <p:txBody>
+          <a:bodyPr/>
+          <a:lstStyle/>
+          <a:p>
+            <a:r>
+              <a:rPr kumimoji="1" lang="zh-TW" altLang="en-US" dirty="0" smtClean="0"/>
+              <a:t>篩選器</a:t>
+            </a:r>
+            <a:endParaRPr kumimoji="1" lang="zh-TW" altLang="en-US" dirty="0"/>
+          </a:p>
+        </p:txBody>
+      </p:sp>
+      <p:sp>
+        <p:nvSpPr>
+          <p:cNvPr id="7" name="內容版面配置區 6"/>
+          <p:cNvSpPr>
+            <a:spLocks noGrp="1"/>
+          </p:cNvSpPr>
+          <p:nvPr>
+            <p:ph idx="1"/>
+          </p:nvPr>
+        </p:nvSpPr>
+        <p:spPr/>
+        <p:txBody>
+          <a:bodyPr/>
+          <a:lstStyle/>
+          <a:p>
+            <a:endParaRPr kumimoji="1" lang="zh-TW" altLang="en-US" dirty="0"/>
+          </a:p>
+        </p:txBody>
+      </p:sp>
+      <p:pic>
+        <p:nvPicPr>
+          <p:cNvPr id="6" name="圖片 5" descr="Untitled.gif"/>
+          <p:cNvPicPr>
+            <a:picLocks noChangeAspect="1"/>
+          </p:cNvPicPr>
+          <p:nvPr/>
+        </p:nvPicPr>
+        <p:blipFill>
+          <a:blip r:embed="rId3">
+            <a:extLst>
+              <a:ext uri="{28A0092B-C50C-407E-A947-70E740481C1C}">
+                <a14:useLocalDpi xmlns:a14="http://schemas.microsoft.com/office/drawing/2010/main" val="0"/>
+              </a:ext>
+            </a:extLst>
+          </a:blip>
+          <a:stretch>
+            <a:fillRect/>
+          </a:stretch>
+        </p:blipFill>
+        <p:spPr>
+          <a:xfrm>
+            <a:off x="323528" y="1988840"/>
+            <a:ext cx="7991872" cy="3995936"/>
+          </a:xfrm>
+          <a:prstGeom prst="rect">
+            <a:avLst/>
+          </a:prstGeom>
+        </p:spPr>
+      </p:pic>
+    </p:spTree>
+    <p:extLst>
+      <p:ext uri="{BB962C8B-B14F-4D97-AF65-F5344CB8AC3E}">
+        <p14:creationId xmlns:p14="http://schemas.microsoft.com/office/powerpoint/2010/main" val="3445478445"/>
+      </p:ext>
+    </p:extLst>
+  </p:cSld>
+  <p:clrMapOvr>
+    <a:masterClrMapping/>
+  </p:clrMapOvr>
+  <p:timing>
+    <p:tnLst>
+      <p:par>
+        <p:cTn id="1" dur="indefinite" restart="never" nodeType="tmRoot"/>
+      </p:par>
+    </p:tnLst>
+  </p:timing>
+</p:sld>
+</file>
+
+<file path=ppt/slides/slide35.xml><?xml version="1.0" encoding="utf-8"?>
+<p:sld xmlns:a="http://schemas.openxmlformats.org/drawingml/2006/main" xmlns:r="http://schemas.openxmlformats.org/officeDocument/2006/relationships" xmlns:p="http://schemas.openxmlformats.org/presentationml/2006/main">
+  <p:cSld>
+    <p:spTree>
+      <p:nvGrpSpPr>
+        <p:cNvPr id="1" name=""/>
+        <p:cNvGrpSpPr/>
+        <p:nvPr/>
+      </p:nvGrpSpPr>
+      <p:grpSpPr>
+        <a:xfrm>
+          <a:off x="0" y="0"/>
+          <a:ext cx="0" cy="0"/>
+          <a:chOff x="0" y="0"/>
+          <a:chExt cx="0" cy="0"/>
+        </a:xfrm>
+      </p:grpSpPr>
+      <p:sp>
+        <p:nvSpPr>
           <p:cNvPr id="4" name="標題 3"/>
           <p:cNvSpPr>
             <a:spLocks noGrp="1"/>
@@ -12790,7 +13341,7 @@
 </p:sld>
 </file>
 
-<file path=ppt/slides/slide31.xml><?xml version="1.0" encoding="utf-8"?>
+<file path=ppt/slides/slide36.xml><?xml version="1.0" encoding="utf-8"?>
 <p:sld xmlns:a="http://schemas.openxmlformats.org/drawingml/2006/main" xmlns:r="http://schemas.openxmlformats.org/officeDocument/2006/relationships" xmlns:p="http://schemas.openxmlformats.org/presentationml/2006/main">
   <p:cSld>
     <p:spTree>
@@ -13022,7 +13573,7 @@
 </p:sld>
 </file>
 
-<file path=ppt/slides/slide32.xml><?xml version="1.0" encoding="utf-8"?>
+<file path=ppt/slides/slide37.xml><?xml version="1.0" encoding="utf-8"?>
 <p:sld xmlns:a="http://schemas.openxmlformats.org/drawingml/2006/main" xmlns:r="http://schemas.openxmlformats.org/officeDocument/2006/relationships" xmlns:p="http://schemas.openxmlformats.org/presentationml/2006/main">
   <p:cSld>
     <p:spTree>
@@ -13087,7 +13638,7 @@
 </p:sld>
 </file>
 
-<file path=ppt/slides/slide33.xml><?xml version="1.0" encoding="utf-8"?>
+<file path=ppt/slides/slide38.xml><?xml version="1.0" encoding="utf-8"?>
 <p:sld xmlns:a="http://schemas.openxmlformats.org/drawingml/2006/main" xmlns:r="http://schemas.openxmlformats.org/officeDocument/2006/relationships" xmlns:p="http://schemas.openxmlformats.org/presentationml/2006/main">
   <p:cSld>
     <p:spTree>
@@ -13221,7 +13772,7 @@
 </p:sld>
 </file>
 
-<file path=ppt/slides/slide34.xml><?xml version="1.0" encoding="utf-8"?>
+<file path=ppt/slides/slide39.xml><?xml version="1.0" encoding="utf-8"?>
 <p:sld xmlns:a="http://schemas.openxmlformats.org/drawingml/2006/main" xmlns:r="http://schemas.openxmlformats.org/officeDocument/2006/relationships" xmlns:p="http://schemas.openxmlformats.org/presentationml/2006/main">
   <p:cSld>
     <p:spTree>
@@ -13269,293 +13820,6 @@
     <p:extLst>
       <p:ext uri="{BB962C8B-B14F-4D97-AF65-F5344CB8AC3E}">
         <p14:creationId xmlns:p14="http://schemas.microsoft.com/office/powerpoint/2010/main" val="1814644749"/>
-      </p:ext>
-    </p:extLst>
-  </p:cSld>
-  <p:clrMapOvr>
-    <a:masterClrMapping/>
-  </p:clrMapOvr>
-  <p:timing>
-    <p:tnLst>
-      <p:par>
-        <p:cTn id="1" dur="indefinite" restart="never" nodeType="tmRoot"/>
-      </p:par>
-    </p:tnLst>
-  </p:timing>
-</p:sld>
-</file>
-
-<file path=ppt/slides/slide35.xml><?xml version="1.0" encoding="utf-8"?>
-<p:sld xmlns:a="http://schemas.openxmlformats.org/drawingml/2006/main" xmlns:r="http://schemas.openxmlformats.org/officeDocument/2006/relationships" xmlns:p="http://schemas.openxmlformats.org/presentationml/2006/main">
-  <p:cSld>
-    <p:spTree>
-      <p:nvGrpSpPr>
-        <p:cNvPr id="1" name=""/>
-        <p:cNvGrpSpPr/>
-        <p:nvPr/>
-      </p:nvGrpSpPr>
-      <p:grpSpPr>
-        <a:xfrm>
-          <a:off x="0" y="0"/>
-          <a:ext cx="0" cy="0"/>
-          <a:chOff x="0" y="0"/>
-          <a:chExt cx="0" cy="0"/>
-        </a:xfrm>
-      </p:grpSpPr>
-      <p:sp>
-        <p:nvSpPr>
-          <p:cNvPr id="2" name="標題 1"/>
-          <p:cNvSpPr>
-            <a:spLocks noGrp="1"/>
-          </p:cNvSpPr>
-          <p:nvPr>
-            <p:ph type="title"/>
-          </p:nvPr>
-        </p:nvSpPr>
-        <p:spPr/>
-        <p:txBody>
-          <a:bodyPr/>
-          <a:lstStyle/>
-          <a:p>
-            <a:r>
-              <a:rPr kumimoji="1" lang="zh-TW" altLang="en-US" dirty="0" smtClean="0"/>
-              <a:t>填寫矯正預防報告</a:t>
-            </a:r>
-            <a:endParaRPr kumimoji="1" lang="zh-TW" altLang="en-US" dirty="0"/>
-          </a:p>
-        </p:txBody>
-      </p:sp>
-      <p:sp>
-        <p:nvSpPr>
-          <p:cNvPr id="3" name="內容版面配置區 2"/>
-          <p:cNvSpPr>
-            <a:spLocks noGrp="1"/>
-          </p:cNvSpPr>
-          <p:nvPr>
-            <p:ph idx="1"/>
-          </p:nvPr>
-        </p:nvSpPr>
-        <p:spPr/>
-        <p:txBody>
-          <a:bodyPr/>
-          <a:lstStyle/>
-          <a:p>
-            <a:r>
-              <a:rPr kumimoji="1" lang="zh-TW" altLang="en-US" dirty="0" smtClean="0"/>
-              <a:t>問題</a:t>
-            </a:r>
-            <a:endParaRPr kumimoji="1" lang="en-US" altLang="zh-TW" dirty="0" smtClean="0"/>
-          </a:p>
-          <a:p>
-            <a:pPr lvl="1"/>
-            <a:r>
-              <a:rPr kumimoji="1" lang="zh-TW" altLang="en-US" dirty="0" smtClean="0"/>
-              <a:t>窗口不一定是填寫報告的人</a:t>
-            </a:r>
-            <a:endParaRPr kumimoji="1" lang="en-US" altLang="zh-TW" dirty="0" smtClean="0"/>
-          </a:p>
-          <a:p>
-            <a:pPr lvl="1"/>
-            <a:r>
-              <a:rPr kumimoji="1" lang="zh-TW" altLang="en-US" dirty="0" smtClean="0"/>
-              <a:t>要如何指派給他人</a:t>
-            </a:r>
-            <a:endParaRPr kumimoji="1" lang="en-US" altLang="zh-TW" dirty="0" smtClean="0"/>
-          </a:p>
-          <a:p>
-            <a:pPr lvl="1"/>
-            <a:r>
-              <a:rPr kumimoji="1" lang="zh-TW" altLang="en-US" dirty="0" smtClean="0"/>
-              <a:t>如果要取消指派呢</a:t>
-            </a:r>
-            <a:endParaRPr kumimoji="1" lang="en-US" altLang="zh-TW" dirty="0" smtClean="0"/>
-          </a:p>
-          <a:p>
-            <a:pPr lvl="1"/>
-            <a:endParaRPr kumimoji="1" lang="en-US" altLang="zh-TW" dirty="0"/>
-          </a:p>
-          <a:p>
-            <a:r>
-              <a:rPr kumimoji="1" lang="zh-TW" altLang="en-US" dirty="0" smtClean="0"/>
-              <a:t>解決方式</a:t>
-            </a:r>
-            <a:endParaRPr kumimoji="1" lang="en-US" altLang="zh-TW" dirty="0" smtClean="0"/>
-          </a:p>
-          <a:p>
-            <a:pPr lvl="1"/>
-            <a:r>
-              <a:rPr kumimoji="1" lang="zh-TW" altLang="en-US" dirty="0" smtClean="0"/>
-              <a:t>透過電子郵</a:t>
-            </a:r>
-            <a:r>
-              <a:rPr kumimoji="1" lang="zh-TW" altLang="en-US" dirty="0"/>
-              <a:t>件通知</a:t>
-            </a:r>
-            <a:endParaRPr kumimoji="1" lang="en-US" altLang="zh-TW" dirty="0"/>
-          </a:p>
-          <a:p>
-            <a:pPr lvl="1"/>
-            <a:r>
-              <a:rPr kumimoji="1" lang="zh-TW" altLang="en-US" dirty="0" smtClean="0"/>
-              <a:t>內含一個一次性的矯正預防表單</a:t>
-            </a:r>
-            <a:endParaRPr kumimoji="1" lang="zh-TW" altLang="en-US" dirty="0"/>
-          </a:p>
-        </p:txBody>
-      </p:sp>
-    </p:spTree>
-    <p:extLst>
-      <p:ext uri="{BB962C8B-B14F-4D97-AF65-F5344CB8AC3E}">
-        <p14:creationId xmlns:p14="http://schemas.microsoft.com/office/powerpoint/2010/main" val="3856537675"/>
-      </p:ext>
-    </p:extLst>
-  </p:cSld>
-  <p:clrMapOvr>
-    <a:masterClrMapping/>
-  </p:clrMapOvr>
-  <p:timing>
-    <p:tnLst>
-      <p:par>
-        <p:cTn id="1" dur="indefinite" restart="never" nodeType="tmRoot"/>
-      </p:par>
-    </p:tnLst>
-  </p:timing>
-</p:sld>
-</file>
-
-<file path=ppt/slides/slide36.xml><?xml version="1.0" encoding="utf-8"?>
-<p:sld xmlns:a="http://schemas.openxmlformats.org/drawingml/2006/main" xmlns:r="http://schemas.openxmlformats.org/officeDocument/2006/relationships" xmlns:p="http://schemas.openxmlformats.org/presentationml/2006/main">
-  <p:cSld>
-    <p:spTree>
-      <p:nvGrpSpPr>
-        <p:cNvPr id="1" name=""/>
-        <p:cNvGrpSpPr/>
-        <p:nvPr/>
-      </p:nvGrpSpPr>
-      <p:grpSpPr>
-        <a:xfrm>
-          <a:off x="0" y="0"/>
-          <a:ext cx="0" cy="0"/>
-          <a:chOff x="0" y="0"/>
-          <a:chExt cx="0" cy="0"/>
-        </a:xfrm>
-      </p:grpSpPr>
-      <p:sp>
-        <p:nvSpPr>
-          <p:cNvPr id="3" name="標題 2"/>
-          <p:cNvSpPr>
-            <a:spLocks noGrp="1"/>
-          </p:cNvSpPr>
-          <p:nvPr>
-            <p:ph type="title"/>
-          </p:nvPr>
-        </p:nvSpPr>
-        <p:spPr/>
-        <p:txBody>
-          <a:bodyPr/>
-          <a:lstStyle/>
-          <a:p>
-            <a:r>
-              <a:rPr lang="zh-TW" altLang="en-US" dirty="0"/>
-              <a:t>參考資料</a:t>
-            </a:r>
-          </a:p>
-        </p:txBody>
-      </p:sp>
-      <p:sp>
-        <p:nvSpPr>
-          <p:cNvPr id="4" name="內容版面配置區 3"/>
-          <p:cNvSpPr>
-            <a:spLocks noGrp="1"/>
-          </p:cNvSpPr>
-          <p:nvPr>
-            <p:ph idx="1"/>
-          </p:nvPr>
-        </p:nvSpPr>
-        <p:spPr/>
-        <p:txBody>
-          <a:bodyPr>
-            <a:normAutofit/>
-          </a:bodyPr>
-          <a:lstStyle/>
-          <a:p>
-            <a:r>
-              <a:rPr lang="pt-BR" altLang="zh-TW" dirty="0">
-                <a:hlinkClick r:id="rId2"/>
-              </a:rPr>
-              <a:t>Laravel http://laravel.tw/</a:t>
-            </a:r>
-            <a:endParaRPr lang="pt-BR" altLang="zh-TW" dirty="0"/>
-          </a:p>
-          <a:p>
-            <a:r>
-              <a:rPr lang="pt-BR" altLang="zh-TW" dirty="0">
-                <a:hlinkClick r:id="rId3"/>
-              </a:rPr>
-              <a:t>Composer https://getcomposer.org/</a:t>
-            </a:r>
-            <a:endParaRPr lang="pt-BR" altLang="zh-TW" dirty="0"/>
-          </a:p>
-          <a:p>
-            <a:r>
-              <a:rPr lang="pt-BR" altLang="zh-TW" dirty="0">
-                <a:hlinkClick r:id="rId4"/>
-              </a:rPr>
-              <a:t>wkhtmltopdf http://wkhtmltopdf.org/</a:t>
-            </a:r>
-            <a:endParaRPr lang="pt-BR" altLang="zh-TW" dirty="0"/>
-          </a:p>
-          <a:p>
-            <a:r>
-              <a:rPr lang="pt-BR" altLang="zh-TW" dirty="0">
-                <a:hlinkClick r:id="rId5"/>
-              </a:rPr>
-              <a:t>FullCalendar http://fullcalendar.io/</a:t>
-            </a:r>
-            <a:endParaRPr lang="pt-BR" altLang="zh-TW" dirty="0"/>
-          </a:p>
-          <a:p>
-            <a:r>
-              <a:rPr lang="zh-TW" altLang="pt-BR" dirty="0">
-                <a:hlinkClick r:id="rId6"/>
-              </a:rPr>
-              <a:t>思源正黑體 </a:t>
-            </a:r>
-            <a:r>
-              <a:rPr lang="pt-BR" altLang="zh-TW" dirty="0">
-                <a:hlinkClick r:id="rId6"/>
-              </a:rPr>
-              <a:t>https://github.com/adobe-fonts/source-han-sans</a:t>
-            </a:r>
-            <a:endParaRPr lang="pt-BR" altLang="zh-TW" dirty="0"/>
-          </a:p>
-          <a:p>
-            <a:r>
-              <a:rPr lang="pt-BR" altLang="zh-TW" dirty="0">
-                <a:hlinkClick r:id="rId7"/>
-              </a:rPr>
-              <a:t>Vagrant https://www.vagrantup.com/</a:t>
-            </a:r>
-            <a:endParaRPr lang="pt-BR" altLang="zh-TW" dirty="0"/>
-          </a:p>
-          <a:p>
-            <a:r>
-              <a:rPr lang="pt-BR" altLang="zh-TW" dirty="0">
-                <a:hlinkClick r:id="rId8"/>
-              </a:rPr>
-              <a:t>Docker https://www.docker.com/</a:t>
-            </a:r>
-            <a:endParaRPr lang="pt-BR" altLang="zh-TW" dirty="0"/>
-          </a:p>
-          <a:p>
-            <a:endParaRPr lang="zh-TW" altLang="en-US" dirty="0"/>
-          </a:p>
-        </p:txBody>
-      </p:sp>
-    </p:spTree>
-    <p:extLst>
-      <p:ext uri="{BB962C8B-B14F-4D97-AF65-F5344CB8AC3E}">
-        <p14:creationId xmlns:p14="http://schemas.microsoft.com/office/powerpoint/2010/main" val="3133800750"/>
       </p:ext>
     </p:extLst>
   </p:cSld>
@@ -15602,6 +15866,293 @@
 </p:sld>
 </file>
 
+<file path=ppt/slides/slide40.xml><?xml version="1.0" encoding="utf-8"?>
+<p:sld xmlns:a="http://schemas.openxmlformats.org/drawingml/2006/main" xmlns:r="http://schemas.openxmlformats.org/officeDocument/2006/relationships" xmlns:p="http://schemas.openxmlformats.org/presentationml/2006/main">
+  <p:cSld>
+    <p:spTree>
+      <p:nvGrpSpPr>
+        <p:cNvPr id="1" name=""/>
+        <p:cNvGrpSpPr/>
+        <p:nvPr/>
+      </p:nvGrpSpPr>
+      <p:grpSpPr>
+        <a:xfrm>
+          <a:off x="0" y="0"/>
+          <a:ext cx="0" cy="0"/>
+          <a:chOff x="0" y="0"/>
+          <a:chExt cx="0" cy="0"/>
+        </a:xfrm>
+      </p:grpSpPr>
+      <p:sp>
+        <p:nvSpPr>
+          <p:cNvPr id="2" name="標題 1"/>
+          <p:cNvSpPr>
+            <a:spLocks noGrp="1"/>
+          </p:cNvSpPr>
+          <p:nvPr>
+            <p:ph type="title"/>
+          </p:nvPr>
+        </p:nvSpPr>
+        <p:spPr/>
+        <p:txBody>
+          <a:bodyPr/>
+          <a:lstStyle/>
+          <a:p>
+            <a:r>
+              <a:rPr kumimoji="1" lang="zh-TW" altLang="en-US" dirty="0" smtClean="0"/>
+              <a:t>填寫矯正預防報告</a:t>
+            </a:r>
+            <a:endParaRPr kumimoji="1" lang="zh-TW" altLang="en-US" dirty="0"/>
+          </a:p>
+        </p:txBody>
+      </p:sp>
+      <p:sp>
+        <p:nvSpPr>
+          <p:cNvPr id="3" name="內容版面配置區 2"/>
+          <p:cNvSpPr>
+            <a:spLocks noGrp="1"/>
+          </p:cNvSpPr>
+          <p:nvPr>
+            <p:ph idx="1"/>
+          </p:nvPr>
+        </p:nvSpPr>
+        <p:spPr/>
+        <p:txBody>
+          <a:bodyPr/>
+          <a:lstStyle/>
+          <a:p>
+            <a:r>
+              <a:rPr kumimoji="1" lang="zh-TW" altLang="en-US" dirty="0" smtClean="0"/>
+              <a:t>問題</a:t>
+            </a:r>
+            <a:endParaRPr kumimoji="1" lang="en-US" altLang="zh-TW" dirty="0" smtClean="0"/>
+          </a:p>
+          <a:p>
+            <a:pPr lvl="1"/>
+            <a:r>
+              <a:rPr kumimoji="1" lang="zh-TW" altLang="en-US" dirty="0" smtClean="0"/>
+              <a:t>窗口不一定是填寫報告的人</a:t>
+            </a:r>
+            <a:endParaRPr kumimoji="1" lang="en-US" altLang="zh-TW" dirty="0" smtClean="0"/>
+          </a:p>
+          <a:p>
+            <a:pPr lvl="1"/>
+            <a:r>
+              <a:rPr kumimoji="1" lang="zh-TW" altLang="en-US" dirty="0" smtClean="0"/>
+              <a:t>要如何指派給他人</a:t>
+            </a:r>
+            <a:endParaRPr kumimoji="1" lang="en-US" altLang="zh-TW" dirty="0" smtClean="0"/>
+          </a:p>
+          <a:p>
+            <a:pPr lvl="1"/>
+            <a:r>
+              <a:rPr kumimoji="1" lang="zh-TW" altLang="en-US" dirty="0" smtClean="0"/>
+              <a:t>如果要取消指派呢</a:t>
+            </a:r>
+            <a:endParaRPr kumimoji="1" lang="en-US" altLang="zh-TW" dirty="0" smtClean="0"/>
+          </a:p>
+          <a:p>
+            <a:pPr lvl="1"/>
+            <a:endParaRPr kumimoji="1" lang="en-US" altLang="zh-TW" dirty="0"/>
+          </a:p>
+          <a:p>
+            <a:r>
+              <a:rPr kumimoji="1" lang="zh-TW" altLang="en-US" dirty="0" smtClean="0"/>
+              <a:t>解決方式</a:t>
+            </a:r>
+            <a:endParaRPr kumimoji="1" lang="en-US" altLang="zh-TW" dirty="0" smtClean="0"/>
+          </a:p>
+          <a:p>
+            <a:pPr lvl="1"/>
+            <a:r>
+              <a:rPr kumimoji="1" lang="zh-TW" altLang="en-US" dirty="0" smtClean="0"/>
+              <a:t>透過電子郵</a:t>
+            </a:r>
+            <a:r>
+              <a:rPr kumimoji="1" lang="zh-TW" altLang="en-US" dirty="0"/>
+              <a:t>件通知</a:t>
+            </a:r>
+            <a:endParaRPr kumimoji="1" lang="en-US" altLang="zh-TW" dirty="0"/>
+          </a:p>
+          <a:p>
+            <a:pPr lvl="1"/>
+            <a:r>
+              <a:rPr kumimoji="1" lang="zh-TW" altLang="en-US" dirty="0" smtClean="0"/>
+              <a:t>內含一個一次性的矯正預防表單</a:t>
+            </a:r>
+            <a:endParaRPr kumimoji="1" lang="zh-TW" altLang="en-US" dirty="0"/>
+          </a:p>
+        </p:txBody>
+      </p:sp>
+    </p:spTree>
+    <p:extLst>
+      <p:ext uri="{BB962C8B-B14F-4D97-AF65-F5344CB8AC3E}">
+        <p14:creationId xmlns:p14="http://schemas.microsoft.com/office/powerpoint/2010/main" val="3856537675"/>
+      </p:ext>
+    </p:extLst>
+  </p:cSld>
+  <p:clrMapOvr>
+    <a:masterClrMapping/>
+  </p:clrMapOvr>
+  <p:timing>
+    <p:tnLst>
+      <p:par>
+        <p:cTn id="1" dur="indefinite" restart="never" nodeType="tmRoot"/>
+      </p:par>
+    </p:tnLst>
+  </p:timing>
+</p:sld>
+</file>
+
+<file path=ppt/slides/slide41.xml><?xml version="1.0" encoding="utf-8"?>
+<p:sld xmlns:a="http://schemas.openxmlformats.org/drawingml/2006/main" xmlns:r="http://schemas.openxmlformats.org/officeDocument/2006/relationships" xmlns:p="http://schemas.openxmlformats.org/presentationml/2006/main">
+  <p:cSld>
+    <p:spTree>
+      <p:nvGrpSpPr>
+        <p:cNvPr id="1" name=""/>
+        <p:cNvGrpSpPr/>
+        <p:nvPr/>
+      </p:nvGrpSpPr>
+      <p:grpSpPr>
+        <a:xfrm>
+          <a:off x="0" y="0"/>
+          <a:ext cx="0" cy="0"/>
+          <a:chOff x="0" y="0"/>
+          <a:chExt cx="0" cy="0"/>
+        </a:xfrm>
+      </p:grpSpPr>
+      <p:sp>
+        <p:nvSpPr>
+          <p:cNvPr id="3" name="標題 2"/>
+          <p:cNvSpPr>
+            <a:spLocks noGrp="1"/>
+          </p:cNvSpPr>
+          <p:nvPr>
+            <p:ph type="title"/>
+          </p:nvPr>
+        </p:nvSpPr>
+        <p:spPr/>
+        <p:txBody>
+          <a:bodyPr/>
+          <a:lstStyle/>
+          <a:p>
+            <a:r>
+              <a:rPr lang="zh-TW" altLang="en-US" dirty="0"/>
+              <a:t>參考資料</a:t>
+            </a:r>
+          </a:p>
+        </p:txBody>
+      </p:sp>
+      <p:sp>
+        <p:nvSpPr>
+          <p:cNvPr id="4" name="內容版面配置區 3"/>
+          <p:cNvSpPr>
+            <a:spLocks noGrp="1"/>
+          </p:cNvSpPr>
+          <p:nvPr>
+            <p:ph idx="1"/>
+          </p:nvPr>
+        </p:nvSpPr>
+        <p:spPr/>
+        <p:txBody>
+          <a:bodyPr>
+            <a:normAutofit/>
+          </a:bodyPr>
+          <a:lstStyle/>
+          <a:p>
+            <a:r>
+              <a:rPr lang="pt-BR" altLang="zh-TW" dirty="0">
+                <a:hlinkClick r:id="rId2"/>
+              </a:rPr>
+              <a:t>Laravel http://laravel.tw/</a:t>
+            </a:r>
+            <a:endParaRPr lang="pt-BR" altLang="zh-TW" dirty="0"/>
+          </a:p>
+          <a:p>
+            <a:r>
+              <a:rPr lang="pt-BR" altLang="zh-TW" dirty="0">
+                <a:hlinkClick r:id="rId3"/>
+              </a:rPr>
+              <a:t>Composer https://getcomposer.org/</a:t>
+            </a:r>
+            <a:endParaRPr lang="pt-BR" altLang="zh-TW" dirty="0"/>
+          </a:p>
+          <a:p>
+            <a:r>
+              <a:rPr lang="pt-BR" altLang="zh-TW" dirty="0">
+                <a:hlinkClick r:id="rId4"/>
+              </a:rPr>
+              <a:t>wkhtmltopdf http://wkhtmltopdf.org/</a:t>
+            </a:r>
+            <a:endParaRPr lang="pt-BR" altLang="zh-TW" dirty="0"/>
+          </a:p>
+          <a:p>
+            <a:r>
+              <a:rPr lang="pt-BR" altLang="zh-TW" dirty="0">
+                <a:hlinkClick r:id="rId5"/>
+              </a:rPr>
+              <a:t>FullCalendar http://fullcalendar.io/</a:t>
+            </a:r>
+            <a:endParaRPr lang="pt-BR" altLang="zh-TW" dirty="0"/>
+          </a:p>
+          <a:p>
+            <a:r>
+              <a:rPr lang="zh-TW" altLang="pt-BR" dirty="0">
+                <a:hlinkClick r:id="rId6"/>
+              </a:rPr>
+              <a:t>思源正黑體 </a:t>
+            </a:r>
+            <a:r>
+              <a:rPr lang="pt-BR" altLang="zh-TW" dirty="0">
+                <a:hlinkClick r:id="rId6"/>
+              </a:rPr>
+              <a:t>https://github.com/adobe-fonts/source-han-sans</a:t>
+            </a:r>
+            <a:endParaRPr lang="pt-BR" altLang="zh-TW" dirty="0"/>
+          </a:p>
+          <a:p>
+            <a:r>
+              <a:rPr lang="pt-BR" altLang="zh-TW" dirty="0">
+                <a:hlinkClick r:id="rId7"/>
+              </a:rPr>
+              <a:t>Vagrant https://www.vagrantup.com/</a:t>
+            </a:r>
+            <a:endParaRPr lang="pt-BR" altLang="zh-TW" dirty="0"/>
+          </a:p>
+          <a:p>
+            <a:r>
+              <a:rPr lang="pt-BR" altLang="zh-TW" dirty="0">
+                <a:hlinkClick r:id="rId8"/>
+              </a:rPr>
+              <a:t>Docker https://www.docker.com/</a:t>
+            </a:r>
+            <a:endParaRPr lang="pt-BR" altLang="zh-TW" dirty="0"/>
+          </a:p>
+          <a:p>
+            <a:endParaRPr lang="zh-TW" altLang="en-US" dirty="0"/>
+          </a:p>
+        </p:txBody>
+      </p:sp>
+    </p:spTree>
+    <p:extLst>
+      <p:ext uri="{BB962C8B-B14F-4D97-AF65-F5344CB8AC3E}">
+        <p14:creationId xmlns:p14="http://schemas.microsoft.com/office/powerpoint/2010/main" val="3133800750"/>
+      </p:ext>
+    </p:extLst>
+  </p:cSld>
+  <p:clrMapOvr>
+    <a:masterClrMapping/>
+  </p:clrMapOvr>
+  <p:timing>
+    <p:tnLst>
+      <p:par>
+        <p:cTn id="1" dur="indefinite" restart="never" nodeType="tmRoot"/>
+      </p:par>
+    </p:tnLst>
+  </p:timing>
+</p:sld>
+</file>
+
 <file path=ppt/slides/slide5.xml><?xml version="1.0" encoding="utf-8"?>
 <p:sld xmlns:a="http://schemas.openxmlformats.org/drawingml/2006/main" xmlns:r="http://schemas.openxmlformats.org/officeDocument/2006/relationships" xmlns:p="http://schemas.openxmlformats.org/presentationml/2006/main">
   <p:cSld>
@@ -16814,7 +17365,7 @@
   <a:extraClrSchemeLst/>
   <a:extLst>
     <a:ext uri="{05A4C25C-085E-4340-85A3-A5531E510DB2}">
-      <thm15:themeFamily xmlns:thm15="http://schemas.microsoft.com/office/thememl/2012/main" xmlns="" name="Office Theme" id="{62F939B6-93AF-4DB8-9C6B-D6C7DFDC589F}" vid="{4A3C46E8-61CC-4603-A589-7422A47A8E4A}"/>
+      <thm15:themeFamily xmlns="" xmlns:thm15="http://schemas.microsoft.com/office/thememl/2012/main" name="Office Theme" id="{62F939B6-93AF-4DB8-9C6B-D6C7DFDC589F}" vid="{4A3C46E8-61CC-4603-A589-7422A47A8E4A}"/>
     </a:ext>
   </a:extLst>
 </a:theme>

</xml_diff>

<commit_message>
presentation some more revise
</commit_message>
<xml_diff>
--- a/Presentation/報告投影片.pptx
+++ b/Presentation/報告投影片.pptx
@@ -5,7 +5,7 @@
     <p:sldMasterId id="2147483660" r:id="rId1"/>
   </p:sldMasterIdLst>
   <p:notesMasterIdLst>
-    <p:notesMasterId r:id="rId43"/>
+    <p:notesMasterId r:id="rId45"/>
   </p:notesMasterIdLst>
   <p:sldIdLst>
     <p:sldId id="256" r:id="rId2"/>
@@ -22,33 +22,35 @@
     <p:sldId id="273" r:id="rId13"/>
     <p:sldId id="274" r:id="rId14"/>
     <p:sldId id="275" r:id="rId15"/>
-    <p:sldId id="309" r:id="rId16"/>
-    <p:sldId id="310" r:id="rId17"/>
-    <p:sldId id="311" r:id="rId18"/>
-    <p:sldId id="312" r:id="rId19"/>
-    <p:sldId id="313" r:id="rId20"/>
-    <p:sldId id="276" r:id="rId21"/>
-    <p:sldId id="277" r:id="rId22"/>
-    <p:sldId id="278" r:id="rId23"/>
-    <p:sldId id="280" r:id="rId24"/>
-    <p:sldId id="282" r:id="rId25"/>
-    <p:sldId id="283" r:id="rId26"/>
-    <p:sldId id="284" r:id="rId27"/>
-    <p:sldId id="285" r:id="rId28"/>
-    <p:sldId id="296" r:id="rId29"/>
-    <p:sldId id="297" r:id="rId30"/>
-    <p:sldId id="298" r:id="rId31"/>
-    <p:sldId id="299" r:id="rId32"/>
-    <p:sldId id="300" r:id="rId33"/>
-    <p:sldId id="301" r:id="rId34"/>
-    <p:sldId id="302" r:id="rId35"/>
-    <p:sldId id="303" r:id="rId36"/>
-    <p:sldId id="304" r:id="rId37"/>
-    <p:sldId id="305" r:id="rId38"/>
-    <p:sldId id="306" r:id="rId39"/>
-    <p:sldId id="307" r:id="rId40"/>
-    <p:sldId id="308" r:id="rId41"/>
-    <p:sldId id="295" r:id="rId42"/>
+    <p:sldId id="314" r:id="rId16"/>
+    <p:sldId id="309" r:id="rId17"/>
+    <p:sldId id="310" r:id="rId18"/>
+    <p:sldId id="311" r:id="rId19"/>
+    <p:sldId id="312" r:id="rId20"/>
+    <p:sldId id="313" r:id="rId21"/>
+    <p:sldId id="315" r:id="rId22"/>
+    <p:sldId id="276" r:id="rId23"/>
+    <p:sldId id="277" r:id="rId24"/>
+    <p:sldId id="278" r:id="rId25"/>
+    <p:sldId id="280" r:id="rId26"/>
+    <p:sldId id="282" r:id="rId27"/>
+    <p:sldId id="283" r:id="rId28"/>
+    <p:sldId id="284" r:id="rId29"/>
+    <p:sldId id="285" r:id="rId30"/>
+    <p:sldId id="296" r:id="rId31"/>
+    <p:sldId id="297" r:id="rId32"/>
+    <p:sldId id="298" r:id="rId33"/>
+    <p:sldId id="299" r:id="rId34"/>
+    <p:sldId id="300" r:id="rId35"/>
+    <p:sldId id="301" r:id="rId36"/>
+    <p:sldId id="302" r:id="rId37"/>
+    <p:sldId id="303" r:id="rId38"/>
+    <p:sldId id="304" r:id="rId39"/>
+    <p:sldId id="305" r:id="rId40"/>
+    <p:sldId id="306" r:id="rId41"/>
+    <p:sldId id="307" r:id="rId42"/>
+    <p:sldId id="308" r:id="rId43"/>
+    <p:sldId id="295" r:id="rId44"/>
   </p:sldIdLst>
   <p:sldSz cx="9144000" cy="6858000" type="screen4x3"/>
   <p:notesSz cx="6858000" cy="9144000"/>
@@ -6201,7 +6203,7 @@
           <a:p>
             <a:fld id="{B23E3EE3-903C-6049-ABF9-CB22CD5F18D1}" type="slidenum">
               <a:rPr kumimoji="1" lang="zh-TW" altLang="en-US" smtClean="0"/>
-              <a:t>33</a:t>
+              <a:t>35</a:t>
             </a:fld>
             <a:endParaRPr kumimoji="1" lang="zh-TW" altLang="en-US"/>
           </a:p>
@@ -6383,7 +6385,7 @@
           <a:p>
             <a:fld id="{B23E3EE3-903C-6049-ABF9-CB22CD5F18D1}" type="slidenum">
               <a:rPr kumimoji="1" lang="zh-TW" altLang="en-US" smtClean="0"/>
-              <a:t>34</a:t>
+              <a:t>36</a:t>
             </a:fld>
             <a:endParaRPr kumimoji="1" lang="zh-TW" altLang="en-US"/>
           </a:p>
@@ -6478,7 +6480,7 @@
           <a:p>
             <a:fld id="{B23E3EE3-903C-6049-ABF9-CB22CD5F18D1}" type="slidenum">
               <a:rPr kumimoji="1" lang="zh-TW" altLang="en-US" smtClean="0"/>
-              <a:t>38</a:t>
+              <a:t>40</a:t>
             </a:fld>
             <a:endParaRPr kumimoji="1" lang="zh-TW" altLang="en-US"/>
           </a:p>
@@ -6573,7 +6575,7 @@
           <a:p>
             <a:fld id="{B23E3EE3-903C-6049-ABF9-CB22CD5F18D1}" type="slidenum">
               <a:rPr kumimoji="1" lang="zh-TW" altLang="en-US" smtClean="0"/>
-              <a:t>40</a:t>
+              <a:t>42</a:t>
             </a:fld>
             <a:endParaRPr kumimoji="1" lang="zh-TW" altLang="en-US"/>
           </a:p>
@@ -9905,8 +9907,12 @@
           <a:lstStyle/>
           <a:p>
             <a:r>
+              <a:rPr lang="zh-TW" altLang="en-US" dirty="0" smtClean="0"/>
+              <a:t>技術介紹</a:t>
+            </a:r>
+            <a:r>
               <a:rPr lang="en-US" altLang="zh-TW" dirty="0" smtClean="0"/>
-              <a:t>Bootstrap</a:t>
+              <a:t>-Bootstrap</a:t>
             </a:r>
             <a:endParaRPr lang="zh-TW" altLang="en-US" dirty="0"/>
           </a:p>
@@ -10291,16 +10297,11 @@
               <a:rPr lang="en-US" altLang="zh-TW" dirty="0" smtClean="0"/>
               <a:t>Form input</a:t>
             </a:r>
-            <a:endParaRPr lang="en-US" altLang="zh-TW" dirty="0" smtClean="0"/>
           </a:p>
           <a:p>
             <a:r>
               <a:rPr lang="en-US" altLang="zh-TW" dirty="0" smtClean="0"/>
-              <a:t>Eloquent </a:t>
-            </a:r>
-            <a:r>
-              <a:rPr lang="en-US" altLang="zh-TW" dirty="0" smtClean="0"/>
-              <a:t>ORM</a:t>
+              <a:t>Eloquent ORM</a:t>
             </a:r>
           </a:p>
           <a:p>
@@ -10329,6 +10330,12 @@
             <a:r>
               <a:rPr lang="en-US" altLang="zh-TW" dirty="0" smtClean="0"/>
               <a:t>)</a:t>
+            </a:r>
+          </a:p>
+          <a:p>
+            <a:r>
+              <a:rPr lang="en-US" altLang="zh-TW" dirty="0" smtClean="0"/>
+              <a:t>Migration file</a:t>
             </a:r>
             <a:endParaRPr lang="en-US" altLang="zh-TW" dirty="0"/>
           </a:p>
@@ -10388,7 +10395,116 @@
           <a:p>
             <a:r>
               <a:rPr lang="en-US" altLang="zh-TW" dirty="0" smtClean="0"/>
-              <a:t>Input, ORM</a:t>
+              <a:t>Input verification</a:t>
+            </a:r>
+            <a:endParaRPr lang="zh-TW" altLang="en-US" dirty="0"/>
+          </a:p>
+        </p:txBody>
+      </p:sp>
+      <p:pic>
+        <p:nvPicPr>
+          <p:cNvPr id="1026" name="Picture 2"/>
+          <p:cNvPicPr>
+            <a:picLocks noGrp="1" noChangeAspect="1" noChangeArrowheads="1"/>
+          </p:cNvPicPr>
+          <p:nvPr>
+            <p:ph idx="1"/>
+          </p:nvPr>
+        </p:nvPicPr>
+        <p:blipFill>
+          <a:blip r:embed="rId2">
+            <a:extLst>
+              <a:ext uri="{28A0092B-C50C-407E-A947-70E740481C1C}">
+                <a14:useLocalDpi xmlns:a14="http://schemas.microsoft.com/office/drawing/2010/main" val="0"/>
+              </a:ext>
+            </a:extLst>
+          </a:blip>
+          <a:srcRect/>
+          <a:stretch>
+            <a:fillRect/>
+          </a:stretch>
+        </p:blipFill>
+        <p:spPr bwMode="auto">
+          <a:xfrm>
+            <a:off x="755576" y="1772816"/>
+            <a:ext cx="6707435" cy="4390616"/>
+          </a:xfrm>
+          <a:prstGeom prst="rect">
+            <a:avLst/>
+          </a:prstGeom>
+          <a:noFill/>
+          <a:ln>
+            <a:noFill/>
+          </a:ln>
+          <a:extLst>
+            <a:ext uri="{909E8E84-426E-40DD-AFC4-6F175D3DCCD1}">
+              <a14:hiddenFill xmlns:a14="http://schemas.microsoft.com/office/drawing/2010/main">
+                <a:solidFill>
+                  <a:schemeClr val="accent1"/>
+                </a:solidFill>
+              </a14:hiddenFill>
+            </a:ext>
+            <a:ext uri="{91240B29-F687-4F45-9708-019B960494DF}">
+              <a14:hiddenLine xmlns:a14="http://schemas.microsoft.com/office/drawing/2010/main" w="9525">
+                <a:solidFill>
+                  <a:schemeClr val="tx1"/>
+                </a:solidFill>
+                <a:miter lim="800000"/>
+                <a:headEnd/>
+                <a:tailEnd/>
+              </a14:hiddenLine>
+            </a:ext>
+          </a:extLst>
+        </p:spPr>
+      </p:pic>
+    </p:spTree>
+    <p:extLst>
+      <p:ext uri="{BB962C8B-B14F-4D97-AF65-F5344CB8AC3E}">
+        <p14:creationId xmlns:p14="http://schemas.microsoft.com/office/powerpoint/2010/main" val="3477876374"/>
+      </p:ext>
+    </p:extLst>
+  </p:cSld>
+  <p:clrMapOvr>
+    <a:masterClrMapping/>
+  </p:clrMapOvr>
+</p:sld>
+</file>
+
+<file path=ppt/slides/slide16.xml><?xml version="1.0" encoding="utf-8"?>
+<p:sld xmlns:a="http://schemas.openxmlformats.org/drawingml/2006/main" xmlns:r="http://schemas.openxmlformats.org/officeDocument/2006/relationships" xmlns:p="http://schemas.openxmlformats.org/presentationml/2006/main">
+  <p:cSld>
+    <p:spTree>
+      <p:nvGrpSpPr>
+        <p:cNvPr id="1" name=""/>
+        <p:cNvGrpSpPr/>
+        <p:nvPr/>
+      </p:nvGrpSpPr>
+      <p:grpSpPr>
+        <a:xfrm>
+          <a:off x="0" y="0"/>
+          <a:ext cx="0" cy="0"/>
+          <a:chOff x="0" y="0"/>
+          <a:chExt cx="0" cy="0"/>
+        </a:xfrm>
+      </p:grpSpPr>
+      <p:sp>
+        <p:nvSpPr>
+          <p:cNvPr id="2" name="標題 1"/>
+          <p:cNvSpPr>
+            <a:spLocks noGrp="1"/>
+          </p:cNvSpPr>
+          <p:nvPr>
+            <p:ph type="title"/>
+          </p:nvPr>
+        </p:nvSpPr>
+        <p:spPr/>
+        <p:txBody>
+          <a:bodyPr/>
+          <a:lstStyle/>
+          <a:p>
+            <a:r>
+              <a:rPr lang="en-US" altLang="zh-TW" dirty="0" smtClean="0"/>
+              <a:t>Input retrieving, ORM</a:t>
             </a:r>
             <a:endParaRPr lang="zh-TW" altLang="en-US" dirty="0"/>
           </a:p>
@@ -10463,7 +10579,7 @@
 </p:sld>
 </file>
 
-<file path=ppt/slides/slide16.xml><?xml version="1.0" encoding="utf-8"?>
+<file path=ppt/slides/slide17.xml><?xml version="1.0" encoding="utf-8"?>
 <p:sld xmlns:a="http://schemas.openxmlformats.org/drawingml/2006/main" xmlns:r="http://schemas.openxmlformats.org/officeDocument/2006/relationships" xmlns:p="http://schemas.openxmlformats.org/presentationml/2006/main">
   <p:cSld>
     <p:spTree>
@@ -10572,7 +10688,7 @@
 </p:sld>
 </file>
 
-<file path=ppt/slides/slide17.xml><?xml version="1.0" encoding="utf-8"?>
+<file path=ppt/slides/slide18.xml><?xml version="1.0" encoding="utf-8"?>
 <p:sld xmlns:a="http://schemas.openxmlformats.org/drawingml/2006/main" xmlns:r="http://schemas.openxmlformats.org/officeDocument/2006/relationships" xmlns:p="http://schemas.openxmlformats.org/presentationml/2006/main">
   <p:cSld>
     <p:spTree>
@@ -10681,7 +10797,7 @@
 </p:sld>
 </file>
 
-<file path=ppt/slides/slide18.xml><?xml version="1.0" encoding="utf-8"?>
+<file path=ppt/slides/slide19.xml><?xml version="1.0" encoding="utf-8"?>
 <p:sld xmlns:a="http://schemas.openxmlformats.org/drawingml/2006/main" xmlns:r="http://schemas.openxmlformats.org/officeDocument/2006/relationships" xmlns:p="http://schemas.openxmlformats.org/presentationml/2006/main">
   <p:cSld>
     <p:spTree>
@@ -10790,7 +10906,160 @@
 </p:sld>
 </file>
 
-<file path=ppt/slides/slide19.xml><?xml version="1.0" encoding="utf-8"?>
+<file path=ppt/slides/slide2.xml><?xml version="1.0" encoding="utf-8"?>
+<p:sld xmlns:a="http://schemas.openxmlformats.org/drawingml/2006/main" xmlns:r="http://schemas.openxmlformats.org/officeDocument/2006/relationships" xmlns:p="http://schemas.openxmlformats.org/presentationml/2006/main">
+  <p:cSld>
+    <p:spTree>
+      <p:nvGrpSpPr>
+        <p:cNvPr id="1" name=""/>
+        <p:cNvGrpSpPr/>
+        <p:nvPr/>
+      </p:nvGrpSpPr>
+      <p:grpSpPr>
+        <a:xfrm>
+          <a:off x="0" y="0"/>
+          <a:ext cx="0" cy="0"/>
+          <a:chOff x="0" y="0"/>
+          <a:chExt cx="0" cy="0"/>
+        </a:xfrm>
+      </p:grpSpPr>
+      <p:sp>
+        <p:nvSpPr>
+          <p:cNvPr id="2" name="標題 1"/>
+          <p:cNvSpPr>
+            <a:spLocks noGrp="1"/>
+          </p:cNvSpPr>
+          <p:nvPr>
+            <p:ph type="title"/>
+          </p:nvPr>
+        </p:nvSpPr>
+        <p:spPr/>
+        <p:txBody>
+          <a:bodyPr/>
+          <a:lstStyle/>
+          <a:p>
+            <a:r>
+              <a:rPr lang="zh-TW" altLang="en-US" dirty="0" smtClean="0"/>
+              <a:t>我們將會報告</a:t>
+            </a:r>
+            <a:r>
+              <a:rPr lang="en-US" altLang="zh-TW" dirty="0" smtClean="0"/>
+              <a:t>…</a:t>
+            </a:r>
+            <a:endParaRPr lang="zh-TW" altLang="en-US" dirty="0"/>
+          </a:p>
+        </p:txBody>
+      </p:sp>
+      <p:sp>
+        <p:nvSpPr>
+          <p:cNvPr id="3" name="內容版面配置區 2"/>
+          <p:cNvSpPr>
+            <a:spLocks noGrp="1"/>
+          </p:cNvSpPr>
+          <p:nvPr>
+            <p:ph idx="1"/>
+          </p:nvPr>
+        </p:nvSpPr>
+        <p:spPr/>
+        <p:txBody>
+          <a:bodyPr>
+            <a:normAutofit/>
+          </a:bodyPr>
+          <a:lstStyle/>
+          <a:p>
+            <a:pPr marL="514350" indent="-514350">
+              <a:buFont typeface="+mj-lt"/>
+              <a:buAutoNum type="arabicPeriod"/>
+            </a:pPr>
+            <a:r>
+              <a:rPr lang="zh-TW" altLang="en-US" dirty="0" smtClean="0"/>
+              <a:t>動機</a:t>
+            </a:r>
+            <a:r>
+              <a:rPr lang="zh-TW" altLang="en-US" dirty="0"/>
+              <a:t>、</a:t>
+            </a:r>
+            <a:r>
+              <a:rPr lang="zh-TW" altLang="en-US" dirty="0" smtClean="0"/>
+              <a:t>目的以及重要貢獻</a:t>
+            </a:r>
+          </a:p>
+          <a:p>
+            <a:pPr marL="514350" indent="-514350">
+              <a:buFont typeface="+mj-lt"/>
+              <a:buAutoNum type="arabicPeriod"/>
+            </a:pPr>
+            <a:r>
+              <a:rPr lang="zh-TW" altLang="en-US" dirty="0" smtClean="0"/>
+              <a:t>團隊合作方式</a:t>
+            </a:r>
+          </a:p>
+          <a:p>
+            <a:pPr marL="514350" indent="-514350">
+              <a:buFont typeface="+mj-lt"/>
+              <a:buAutoNum type="arabicPeriod"/>
+            </a:pPr>
+            <a:r>
+              <a:rPr lang="zh-TW" altLang="en-US" dirty="0" smtClean="0"/>
+              <a:t>設計原理、研究方法與步驟</a:t>
+            </a:r>
+            <a:endParaRPr lang="en-US" altLang="zh-TW" dirty="0" smtClean="0"/>
+          </a:p>
+          <a:p>
+            <a:pPr marL="514350" indent="-514350">
+              <a:buFont typeface="+mj-lt"/>
+              <a:buAutoNum type="arabicPeriod"/>
+            </a:pPr>
+            <a:r>
+              <a:rPr lang="zh-TW" altLang="en-US" dirty="0"/>
+              <a:t>系統實作與實驗</a:t>
+            </a:r>
+            <a:endParaRPr lang="zh-TW" altLang="en-US" dirty="0" smtClean="0"/>
+          </a:p>
+          <a:p>
+            <a:pPr marL="514350" indent="-514350">
+              <a:buFont typeface="+mj-lt"/>
+              <a:buAutoNum type="arabicPeriod"/>
+            </a:pPr>
+            <a:r>
+              <a:rPr lang="zh-TW" altLang="en-US" dirty="0" smtClean="0"/>
+              <a:t>功能介紹</a:t>
+            </a:r>
+          </a:p>
+          <a:p>
+            <a:pPr marL="514350" indent="-514350">
+              <a:buFont typeface="+mj-lt"/>
+              <a:buAutoNum type="arabicPeriod"/>
+            </a:pPr>
+            <a:r>
+              <a:rPr lang="zh-TW" altLang="en-US" dirty="0" smtClean="0"/>
+              <a:t>參考資料</a:t>
+            </a:r>
+            <a:endParaRPr lang="zh-TW" altLang="en-US" dirty="0"/>
+          </a:p>
+        </p:txBody>
+      </p:sp>
+    </p:spTree>
+    <p:extLst>
+      <p:ext uri="{BB962C8B-B14F-4D97-AF65-F5344CB8AC3E}">
+        <p14:creationId xmlns:p14="http://schemas.microsoft.com/office/powerpoint/2010/main" val="3319367334"/>
+      </p:ext>
+    </p:extLst>
+  </p:cSld>
+  <p:clrMapOvr>
+    <a:masterClrMapping/>
+  </p:clrMapOvr>
+  <p:timing>
+    <p:tnLst>
+      <p:par>
+        <p:cTn id="1" dur="indefinite" restart="never" nodeType="tmRoot"/>
+      </p:par>
+    </p:tnLst>
+  </p:timing>
+</p:sld>
+</file>
+
+<file path=ppt/slides/slide20.xml><?xml version="1.0" encoding="utf-8"?>
 <p:sld xmlns:a="http://schemas.openxmlformats.org/drawingml/2006/main" xmlns:r="http://schemas.openxmlformats.org/officeDocument/2006/relationships" xmlns:p="http://schemas.openxmlformats.org/presentationml/2006/main">
   <p:cSld>
     <p:spTree>
@@ -10899,283 +11168,6 @@
 </p:sld>
 </file>
 
-<file path=ppt/slides/slide2.xml><?xml version="1.0" encoding="utf-8"?>
-<p:sld xmlns:a="http://schemas.openxmlformats.org/drawingml/2006/main" xmlns:r="http://schemas.openxmlformats.org/officeDocument/2006/relationships" xmlns:p="http://schemas.openxmlformats.org/presentationml/2006/main">
-  <p:cSld>
-    <p:spTree>
-      <p:nvGrpSpPr>
-        <p:cNvPr id="1" name=""/>
-        <p:cNvGrpSpPr/>
-        <p:nvPr/>
-      </p:nvGrpSpPr>
-      <p:grpSpPr>
-        <a:xfrm>
-          <a:off x="0" y="0"/>
-          <a:ext cx="0" cy="0"/>
-          <a:chOff x="0" y="0"/>
-          <a:chExt cx="0" cy="0"/>
-        </a:xfrm>
-      </p:grpSpPr>
-      <p:sp>
-        <p:nvSpPr>
-          <p:cNvPr id="2" name="標題 1"/>
-          <p:cNvSpPr>
-            <a:spLocks noGrp="1"/>
-          </p:cNvSpPr>
-          <p:nvPr>
-            <p:ph type="title"/>
-          </p:nvPr>
-        </p:nvSpPr>
-        <p:spPr/>
-        <p:txBody>
-          <a:bodyPr/>
-          <a:lstStyle/>
-          <a:p>
-            <a:r>
-              <a:rPr lang="zh-TW" altLang="en-US" dirty="0" smtClean="0"/>
-              <a:t>我們將會報告</a:t>
-            </a:r>
-            <a:r>
-              <a:rPr lang="en-US" altLang="zh-TW" dirty="0" smtClean="0"/>
-              <a:t>…</a:t>
-            </a:r>
-            <a:endParaRPr lang="zh-TW" altLang="en-US" dirty="0"/>
-          </a:p>
-        </p:txBody>
-      </p:sp>
-      <p:sp>
-        <p:nvSpPr>
-          <p:cNvPr id="3" name="內容版面配置區 2"/>
-          <p:cNvSpPr>
-            <a:spLocks noGrp="1"/>
-          </p:cNvSpPr>
-          <p:nvPr>
-            <p:ph idx="1"/>
-          </p:nvPr>
-        </p:nvSpPr>
-        <p:spPr/>
-        <p:txBody>
-          <a:bodyPr>
-            <a:normAutofit/>
-          </a:bodyPr>
-          <a:lstStyle/>
-          <a:p>
-            <a:pPr marL="514350" indent="-514350">
-              <a:buFont typeface="+mj-lt"/>
-              <a:buAutoNum type="arabicPeriod"/>
-            </a:pPr>
-            <a:r>
-              <a:rPr lang="zh-TW" altLang="en-US" dirty="0" smtClean="0"/>
-              <a:t>動機</a:t>
-            </a:r>
-            <a:r>
-              <a:rPr lang="zh-TW" altLang="en-US" dirty="0"/>
-              <a:t>、</a:t>
-            </a:r>
-            <a:r>
-              <a:rPr lang="zh-TW" altLang="en-US" dirty="0" smtClean="0"/>
-              <a:t>目的以及重要貢獻</a:t>
-            </a:r>
-          </a:p>
-          <a:p>
-            <a:pPr marL="514350" indent="-514350">
-              <a:buFont typeface="+mj-lt"/>
-              <a:buAutoNum type="arabicPeriod"/>
-            </a:pPr>
-            <a:r>
-              <a:rPr lang="zh-TW" altLang="en-US" dirty="0" smtClean="0"/>
-              <a:t>團隊合作方式</a:t>
-            </a:r>
-          </a:p>
-          <a:p>
-            <a:pPr marL="514350" indent="-514350">
-              <a:buFont typeface="+mj-lt"/>
-              <a:buAutoNum type="arabicPeriod"/>
-            </a:pPr>
-            <a:r>
-              <a:rPr lang="zh-TW" altLang="en-US" dirty="0" smtClean="0"/>
-              <a:t>設計原理、研究方法與步驟</a:t>
-            </a:r>
-            <a:endParaRPr lang="en-US" altLang="zh-TW" dirty="0" smtClean="0"/>
-          </a:p>
-          <a:p>
-            <a:pPr marL="514350" indent="-514350">
-              <a:buFont typeface="+mj-lt"/>
-              <a:buAutoNum type="arabicPeriod"/>
-            </a:pPr>
-            <a:r>
-              <a:rPr lang="zh-TW" altLang="en-US" dirty="0"/>
-              <a:t>系統實作與實驗</a:t>
-            </a:r>
-            <a:endParaRPr lang="zh-TW" altLang="en-US" dirty="0" smtClean="0"/>
-          </a:p>
-          <a:p>
-            <a:pPr marL="514350" indent="-514350">
-              <a:buFont typeface="+mj-lt"/>
-              <a:buAutoNum type="arabicPeriod"/>
-            </a:pPr>
-            <a:r>
-              <a:rPr lang="zh-TW" altLang="en-US" dirty="0" smtClean="0"/>
-              <a:t>功能介紹</a:t>
-            </a:r>
-          </a:p>
-          <a:p>
-            <a:pPr marL="514350" indent="-514350">
-              <a:buFont typeface="+mj-lt"/>
-              <a:buAutoNum type="arabicPeriod"/>
-            </a:pPr>
-            <a:r>
-              <a:rPr lang="zh-TW" altLang="en-US" dirty="0" smtClean="0"/>
-              <a:t>參考資料</a:t>
-            </a:r>
-            <a:endParaRPr lang="zh-TW" altLang="en-US" dirty="0"/>
-          </a:p>
-        </p:txBody>
-      </p:sp>
-    </p:spTree>
-    <p:extLst>
-      <p:ext uri="{BB962C8B-B14F-4D97-AF65-F5344CB8AC3E}">
-        <p14:creationId xmlns:p14="http://schemas.microsoft.com/office/powerpoint/2010/main" val="3319367334"/>
-      </p:ext>
-    </p:extLst>
-  </p:cSld>
-  <p:clrMapOvr>
-    <a:masterClrMapping/>
-  </p:clrMapOvr>
-  <p:timing>
-    <p:tnLst>
-      <p:par>
-        <p:cTn id="1" dur="indefinite" restart="never" nodeType="tmRoot"/>
-      </p:par>
-    </p:tnLst>
-  </p:timing>
-</p:sld>
-</file>
-
-<file path=ppt/slides/slide20.xml><?xml version="1.0" encoding="utf-8"?>
-<p:sld xmlns:a="http://schemas.openxmlformats.org/drawingml/2006/main" xmlns:r="http://schemas.openxmlformats.org/officeDocument/2006/relationships" xmlns:p="http://schemas.openxmlformats.org/presentationml/2006/main">
-  <p:cSld>
-    <p:spTree>
-      <p:nvGrpSpPr>
-        <p:cNvPr id="1" name=""/>
-        <p:cNvGrpSpPr/>
-        <p:nvPr/>
-      </p:nvGrpSpPr>
-      <p:grpSpPr>
-        <a:xfrm>
-          <a:off x="0" y="0"/>
-          <a:ext cx="0" cy="0"/>
-          <a:chOff x="0" y="0"/>
-          <a:chExt cx="0" cy="0"/>
-        </a:xfrm>
-      </p:grpSpPr>
-      <p:sp>
-        <p:nvSpPr>
-          <p:cNvPr id="2" name="標題 1"/>
-          <p:cNvSpPr>
-            <a:spLocks noGrp="1"/>
-          </p:cNvSpPr>
-          <p:nvPr>
-            <p:ph type="title"/>
-          </p:nvPr>
-        </p:nvSpPr>
-        <p:spPr/>
-        <p:txBody>
-          <a:bodyPr/>
-          <a:lstStyle/>
-          <a:p>
-            <a:r>
-              <a:rPr lang="en-US" altLang="zh-TW" dirty="0"/>
-              <a:t>C</a:t>
-            </a:r>
-            <a:r>
-              <a:rPr lang="en-US" altLang="zh-TW" dirty="0" smtClean="0"/>
-              <a:t>omposer</a:t>
-            </a:r>
-            <a:endParaRPr lang="zh-TW" altLang="en-US" dirty="0"/>
-          </a:p>
-        </p:txBody>
-      </p:sp>
-      <p:sp>
-        <p:nvSpPr>
-          <p:cNvPr id="3" name="內容版面配置區 2"/>
-          <p:cNvSpPr>
-            <a:spLocks noGrp="1"/>
-          </p:cNvSpPr>
-          <p:nvPr>
-            <p:ph idx="1"/>
-          </p:nvPr>
-        </p:nvSpPr>
-        <p:spPr/>
-        <p:txBody>
-          <a:bodyPr/>
-          <a:lstStyle/>
-          <a:p>
-            <a:r>
-              <a:rPr lang="en-US" altLang="zh-TW" dirty="0" smtClean="0"/>
-              <a:t>PHP</a:t>
-            </a:r>
-            <a:r>
-              <a:rPr lang="zh-TW" altLang="en-US" dirty="0" smtClean="0"/>
-              <a:t>依賴性</a:t>
-            </a:r>
-            <a:r>
-              <a:rPr lang="zh-TW" altLang="en-US" dirty="0"/>
-              <a:t>管理</a:t>
-            </a:r>
-            <a:r>
-              <a:rPr lang="zh-TW" altLang="en-US" dirty="0" smtClean="0"/>
-              <a:t>工具</a:t>
-            </a:r>
-            <a:endParaRPr lang="en-US" altLang="zh-TW" dirty="0" smtClean="0"/>
-          </a:p>
-          <a:p>
-            <a:r>
-              <a:rPr lang="zh-TW" altLang="en-US" dirty="0" smtClean="0"/>
-              <a:t>安裝專案依賴</a:t>
-            </a:r>
-            <a:r>
-              <a:rPr lang="zh-TW" altLang="en-US" dirty="0"/>
-              <a:t>函式</a:t>
-            </a:r>
-            <a:r>
-              <a:rPr lang="zh-TW" altLang="en-US" dirty="0" smtClean="0"/>
-              <a:t>庫</a:t>
-            </a:r>
-            <a:endParaRPr lang="en-US" altLang="zh-TW" dirty="0" smtClean="0"/>
-          </a:p>
-          <a:p>
-            <a:r>
-              <a:rPr lang="zh-TW" altLang="en-US" dirty="0" smtClean="0"/>
-              <a:t>簡化部署開發環境步驟</a:t>
-            </a:r>
-            <a:br>
-              <a:rPr lang="zh-TW" altLang="en-US" dirty="0" smtClean="0"/>
-            </a:br>
-            <a:endParaRPr lang="zh-TW" altLang="en-US" dirty="0"/>
-          </a:p>
-        </p:txBody>
-      </p:sp>
-    </p:spTree>
-    <p:extLst>
-      <p:ext uri="{BB962C8B-B14F-4D97-AF65-F5344CB8AC3E}">
-        <p14:creationId xmlns:p14="http://schemas.microsoft.com/office/powerpoint/2010/main" val="598198643"/>
-      </p:ext>
-    </p:extLst>
-  </p:cSld>
-  <p:clrMapOvr>
-    <a:masterClrMapping/>
-  </p:clrMapOvr>
-  <p:timing>
-    <p:tnLst>
-      <p:par>
-        <p:cTn id="1" dur="indefinite" restart="never" nodeType="tmRoot"/>
-      </p:par>
-    </p:tnLst>
-  </p:timing>
-</p:sld>
-</file>
-
 <file path=ppt/slides/slide21.xml><?xml version="1.0" encoding="utf-8"?>
 <p:sld xmlns:a="http://schemas.openxmlformats.org/drawingml/2006/main" xmlns:r="http://schemas.openxmlformats.org/officeDocument/2006/relationships" xmlns:p="http://schemas.openxmlformats.org/presentationml/2006/main">
   <p:cSld>
@@ -11209,85 +11201,79 @@
           <a:lstStyle/>
           <a:p>
             <a:r>
-              <a:rPr lang="en-US" altLang="zh-TW" dirty="0" err="1" smtClean="0"/>
-              <a:t>Git</a:t>
+              <a:rPr lang="en-US" altLang="zh-TW" dirty="0" smtClean="0"/>
+              <a:t>Migration file</a:t>
             </a:r>
             <a:endParaRPr lang="zh-TW" altLang="en-US" dirty="0"/>
           </a:p>
         </p:txBody>
       </p:sp>
-      <p:sp>
-        <p:nvSpPr>
-          <p:cNvPr id="3" name="內容版面配置區 2"/>
-          <p:cNvSpPr>
-            <a:spLocks noGrp="1"/>
-          </p:cNvSpPr>
+      <p:pic>
+        <p:nvPicPr>
+          <p:cNvPr id="1026" name="Picture 2"/>
+          <p:cNvPicPr>
+            <a:picLocks noGrp="1" noChangeAspect="1" noChangeArrowheads="1"/>
+          </p:cNvPicPr>
           <p:nvPr>
             <p:ph idx="1"/>
           </p:nvPr>
-        </p:nvSpPr>
-        <p:spPr/>
-        <p:txBody>
-          <a:bodyPr>
-            <a:normAutofit/>
-          </a:bodyPr>
-          <a:lstStyle/>
-          <a:p>
-            <a:r>
-              <a:rPr lang="zh-TW" altLang="en-US" dirty="0" smtClean="0"/>
-              <a:t>分散式</a:t>
-            </a:r>
-            <a:r>
-              <a:rPr lang="zh-TW" altLang="en-US" dirty="0"/>
-              <a:t>版本控制</a:t>
-            </a:r>
-            <a:r>
-              <a:rPr lang="zh-TW" altLang="en-US" dirty="0" smtClean="0"/>
-              <a:t>軟體</a:t>
-            </a:r>
-            <a:endParaRPr lang="en-US" altLang="zh-TW" dirty="0" smtClean="0"/>
-          </a:p>
-          <a:p>
-            <a:r>
-              <a:rPr lang="zh-TW" altLang="en-US" dirty="0" smtClean="0"/>
-              <a:t>合併</a:t>
-            </a:r>
-            <a:r>
-              <a:rPr lang="zh-TW" altLang="en-US" dirty="0"/>
-              <a:t>追蹤（</a:t>
-            </a:r>
-            <a:r>
-              <a:rPr lang="en-US" altLang="zh-TW" dirty="0"/>
-              <a:t>merge tracing</a:t>
-            </a:r>
-            <a:r>
-              <a:rPr lang="zh-TW" altLang="en-US" dirty="0" smtClean="0"/>
-              <a:t>）</a:t>
-            </a:r>
-            <a:br>
-              <a:rPr lang="zh-TW" altLang="en-US" dirty="0" smtClean="0"/>
-            </a:br>
-            <a:endParaRPr lang="zh-TW" altLang="en-US" dirty="0"/>
-          </a:p>
-        </p:txBody>
-      </p:sp>
+        </p:nvPicPr>
+        <p:blipFill>
+          <a:blip r:embed="rId2">
+            <a:extLst>
+              <a:ext uri="{28A0092B-C50C-407E-A947-70E740481C1C}">
+                <a14:useLocalDpi xmlns:a14="http://schemas.microsoft.com/office/drawing/2010/main" val="0"/>
+              </a:ext>
+            </a:extLst>
+          </a:blip>
+          <a:srcRect/>
+          <a:stretch>
+            <a:fillRect/>
+          </a:stretch>
+        </p:blipFill>
+        <p:spPr bwMode="auto">
+          <a:xfrm>
+            <a:off x="1115616" y="1700808"/>
+            <a:ext cx="5943267" cy="4480718"/>
+          </a:xfrm>
+          <a:prstGeom prst="rect">
+            <a:avLst/>
+          </a:prstGeom>
+          <a:noFill/>
+          <a:ln>
+            <a:noFill/>
+          </a:ln>
+          <a:extLst>
+            <a:ext uri="{909E8E84-426E-40DD-AFC4-6F175D3DCCD1}">
+              <a14:hiddenFill xmlns:a14="http://schemas.microsoft.com/office/drawing/2010/main">
+                <a:solidFill>
+                  <a:schemeClr val="accent1"/>
+                </a:solidFill>
+              </a14:hiddenFill>
+            </a:ext>
+            <a:ext uri="{91240B29-F687-4F45-9708-019B960494DF}">
+              <a14:hiddenLine xmlns:a14="http://schemas.microsoft.com/office/drawing/2010/main" w="9525">
+                <a:solidFill>
+                  <a:schemeClr val="tx1"/>
+                </a:solidFill>
+                <a:miter lim="800000"/>
+                <a:headEnd/>
+                <a:tailEnd/>
+              </a14:hiddenLine>
+            </a:ext>
+          </a:extLst>
+        </p:spPr>
+      </p:pic>
     </p:spTree>
     <p:extLst>
       <p:ext uri="{BB962C8B-B14F-4D97-AF65-F5344CB8AC3E}">
-        <p14:creationId xmlns:p14="http://schemas.microsoft.com/office/powerpoint/2010/main" val="517783100"/>
+        <p14:creationId xmlns:p14="http://schemas.microsoft.com/office/powerpoint/2010/main" val="1870860460"/>
       </p:ext>
     </p:extLst>
   </p:cSld>
   <p:clrMapOvr>
     <a:masterClrMapping/>
   </p:clrMapOvr>
-  <p:timing>
-    <p:tnLst>
-      <p:par>
-        <p:cTn id="1" dur="indefinite" restart="never" nodeType="tmRoot"/>
-      </p:par>
-    </p:tnLst>
-  </p:timing>
 </p:sld>
 </file>
 
@@ -11324,8 +11310,12 @@
           <a:lstStyle/>
           <a:p>
             <a:r>
-              <a:rPr lang="en-US" altLang="zh-TW" dirty="0" err="1" smtClean="0"/>
-              <a:t>Github</a:t>
+              <a:rPr lang="en-US" altLang="zh-TW" dirty="0"/>
+              <a:t>C</a:t>
+            </a:r>
+            <a:r>
+              <a:rPr lang="en-US" altLang="zh-TW" dirty="0" smtClean="0"/>
+              <a:t>omposer</a:t>
             </a:r>
             <a:endParaRPr lang="zh-TW" altLang="en-US" dirty="0"/>
           </a:p>
@@ -11347,84 +11337,46 @@
           <a:lstStyle/>
           <a:p>
             <a:r>
+              <a:rPr lang="en-US" altLang="zh-TW" dirty="0" smtClean="0"/>
+              <a:t>PHP</a:t>
+            </a:r>
+            <a:r>
               <a:rPr lang="zh-TW" altLang="en-US" dirty="0" smtClean="0"/>
-              <a:t>共享虛擬主機服務</a:t>
+              <a:t>依賴性</a:t>
+            </a:r>
+            <a:r>
+              <a:rPr lang="zh-TW" altLang="en-US" dirty="0"/>
+              <a:t>管理</a:t>
+            </a:r>
+            <a:r>
+              <a:rPr lang="zh-TW" altLang="en-US" dirty="0" smtClean="0"/>
+              <a:t>工具</a:t>
             </a:r>
             <a:endParaRPr lang="en-US" altLang="zh-TW" dirty="0" smtClean="0"/>
           </a:p>
           <a:p>
             <a:r>
               <a:rPr lang="zh-TW" altLang="en-US" dirty="0" smtClean="0"/>
-              <a:t>存放使用</a:t>
-            </a:r>
-            <a:r>
-              <a:rPr lang="en-US" altLang="zh-TW" dirty="0" err="1" smtClean="0"/>
-              <a:t>Git</a:t>
+              <a:t>安裝專案依賴</a:t>
+            </a:r>
+            <a:r>
+              <a:rPr lang="zh-TW" altLang="en-US" dirty="0"/>
+              <a:t>函式</a:t>
             </a:r>
             <a:r>
               <a:rPr lang="zh-TW" altLang="en-US" dirty="0" smtClean="0"/>
-              <a:t>版本控制的程式、專案</a:t>
+              <a:t>庫</a:t>
             </a:r>
             <a:endParaRPr lang="en-US" altLang="zh-TW" dirty="0" smtClean="0"/>
           </a:p>
           <a:p>
             <a:r>
               <a:rPr lang="zh-TW" altLang="en-US" dirty="0" smtClean="0"/>
-              <a:t>方便社會化軟體開發的功能</a:t>
-            </a:r>
-            <a:endParaRPr lang="en-US" altLang="zh-TW" dirty="0" smtClean="0"/>
-          </a:p>
-          <a:p>
-            <a:pPr lvl="1"/>
-            <a:r>
+              <a:t>簡化部署開發環境步驟</a:t>
+            </a:r>
+            <a:br>
               <a:rPr lang="zh-TW" altLang="en-US" dirty="0" smtClean="0"/>
-              <a:t>追蹤其它用戶</a:t>
-            </a:r>
-            <a:endParaRPr lang="en-US" altLang="zh-TW" dirty="0" smtClean="0"/>
-          </a:p>
-          <a:p>
-            <a:pPr lvl="1"/>
-            <a:r>
-              <a:rPr lang="zh-TW" altLang="en-US" dirty="0" smtClean="0"/>
-              <a:t>組織</a:t>
-            </a:r>
-            <a:r>
-              <a:rPr lang="en-US" altLang="zh-TW" dirty="0" smtClean="0"/>
-              <a:t>(group)</a:t>
-            </a:r>
-          </a:p>
-          <a:p>
-            <a:pPr lvl="1"/>
-            <a:r>
-              <a:rPr lang="zh-TW" altLang="en-US" dirty="0" smtClean="0"/>
-              <a:t>軟體庫</a:t>
-            </a:r>
-            <a:r>
-              <a:rPr lang="en-US" altLang="zh-TW" smtClean="0"/>
-              <a:t>(repository/repo)</a:t>
-            </a:r>
-            <a:r>
-              <a:rPr lang="zh-TW" altLang="en-US" dirty="0" smtClean="0"/>
-              <a:t>的動態</a:t>
-            </a:r>
-            <a:endParaRPr lang="en-US" altLang="zh-TW" dirty="0" smtClean="0"/>
-          </a:p>
-          <a:p>
-            <a:pPr lvl="1"/>
-            <a:r>
-              <a:rPr lang="zh-TW" altLang="en-US" dirty="0" smtClean="0"/>
-              <a:t>對程式的改動和</a:t>
-            </a:r>
-            <a:r>
-              <a:rPr lang="en-US" altLang="zh-TW" dirty="0" smtClean="0"/>
-              <a:t>bug</a:t>
-            </a:r>
-            <a:r>
-              <a:rPr lang="zh-TW" altLang="en-US" dirty="0" smtClean="0"/>
-              <a:t>提出評論</a:t>
-            </a:r>
-          </a:p>
-          <a:p>
+            </a:br>
             <a:endParaRPr lang="zh-TW" altLang="en-US" dirty="0"/>
           </a:p>
         </p:txBody>
@@ -11432,7 +11384,7 @@
     </p:spTree>
     <p:extLst>
       <p:ext uri="{BB962C8B-B14F-4D97-AF65-F5344CB8AC3E}">
-        <p14:creationId xmlns:p14="http://schemas.microsoft.com/office/powerpoint/2010/main" val="837447092"/>
+        <p14:creationId xmlns:p14="http://schemas.microsoft.com/office/powerpoint/2010/main" val="598198643"/>
       </p:ext>
     </p:extLst>
   </p:cSld>
@@ -11468,7 +11420,7 @@
       </p:grpSpPr>
       <p:sp>
         <p:nvSpPr>
-          <p:cNvPr id="4" name="標題 3"/>
+          <p:cNvPr id="2" name="標題 1"/>
           <p:cNvSpPr>
             <a:spLocks noGrp="1"/>
           </p:cNvSpPr>
@@ -11476,28 +11428,132 @@
             <p:ph type="title"/>
           </p:nvPr>
         </p:nvSpPr>
-        <p:spPr>
-          <a:xfrm>
-            <a:off x="467544" y="2564904"/>
-            <a:ext cx="8229600" cy="1156990"/>
-          </a:xfrm>
-        </p:spPr>
+        <p:spPr/>
         <p:txBody>
           <a:bodyPr/>
           <a:lstStyle/>
           <a:p>
             <a:r>
-              <a:rPr lang="zh-TW" altLang="en-US" dirty="0" smtClean="0"/>
-              <a:t>系統實作與實驗</a:t>
+              <a:rPr lang="en-US" altLang="zh-TW" dirty="0" err="1" smtClean="0"/>
+              <a:t>Git</a:t>
             </a:r>
             <a:endParaRPr lang="zh-TW" altLang="en-US" dirty="0"/>
           </a:p>
         </p:txBody>
       </p:sp>
+      <p:sp>
+        <p:nvSpPr>
+          <p:cNvPr id="3" name="內容版面配置區 2"/>
+          <p:cNvSpPr>
+            <a:spLocks noGrp="1"/>
+          </p:cNvSpPr>
+          <p:nvPr>
+            <p:ph idx="1"/>
+          </p:nvPr>
+        </p:nvSpPr>
+        <p:spPr/>
+        <p:txBody>
+          <a:bodyPr>
+            <a:normAutofit/>
+          </a:bodyPr>
+          <a:lstStyle/>
+          <a:p>
+            <a:r>
+              <a:rPr lang="zh-TW" altLang="en-US" dirty="0" smtClean="0"/>
+              <a:t>分散式</a:t>
+            </a:r>
+            <a:r>
+              <a:rPr lang="zh-TW" altLang="en-US" dirty="0"/>
+              <a:t>版本控制</a:t>
+            </a:r>
+            <a:r>
+              <a:rPr lang="zh-TW" altLang="en-US" dirty="0" smtClean="0"/>
+              <a:t>軟體</a:t>
+            </a:r>
+            <a:endParaRPr lang="en-US" altLang="zh-TW" dirty="0" smtClean="0"/>
+          </a:p>
+          <a:p>
+            <a:r>
+              <a:rPr lang="zh-TW" altLang="en-US" dirty="0" smtClean="0"/>
+              <a:t>合併</a:t>
+            </a:r>
+            <a:r>
+              <a:rPr lang="zh-TW" altLang="en-US" dirty="0"/>
+              <a:t>追蹤（</a:t>
+            </a:r>
+            <a:r>
+              <a:rPr lang="en-US" altLang="zh-TW" dirty="0"/>
+              <a:t>merge tracing</a:t>
+            </a:r>
+            <a:r>
+              <a:rPr lang="zh-TW" altLang="en-US" dirty="0" smtClean="0"/>
+              <a:t>）</a:t>
+            </a:r>
+            <a:br>
+              <a:rPr lang="zh-TW" altLang="en-US" dirty="0" smtClean="0"/>
+            </a:br>
+            <a:endParaRPr lang="zh-TW" altLang="en-US" dirty="0"/>
+          </a:p>
+        </p:txBody>
+      </p:sp>
+      <p:pic>
+        <p:nvPicPr>
+          <p:cNvPr id="2052" name="Picture 4"/>
+          <p:cNvPicPr>
+            <a:picLocks noChangeAspect="1" noChangeArrowheads="1"/>
+          </p:cNvPicPr>
+          <p:nvPr/>
+        </p:nvPicPr>
+        <p:blipFill>
+          <a:blip r:embed="rId2">
+            <a:extLst>
+              <a:ext uri="{28A0092B-C50C-407E-A947-70E740481C1C}">
+                <a14:useLocalDpi xmlns:a14="http://schemas.microsoft.com/office/drawing/2010/main" val="0"/>
+              </a:ext>
+            </a:extLst>
+          </a:blip>
+          <a:srcRect/>
+          <a:stretch>
+            <a:fillRect/>
+          </a:stretch>
+        </p:blipFill>
+        <p:spPr bwMode="auto">
+          <a:xfrm>
+            <a:off x="611560" y="2708920"/>
+            <a:ext cx="7378416" cy="3287413"/>
+          </a:xfrm>
+          <a:prstGeom prst="rect">
+            <a:avLst/>
+          </a:prstGeom>
+          <a:noFill/>
+          <a:ln>
+            <a:noFill/>
+          </a:ln>
+          <a:extLst>
+            <a:ext uri="{909E8E84-426E-40DD-AFC4-6F175D3DCCD1}">
+              <a14:hiddenFill xmlns:a14="http://schemas.microsoft.com/office/drawing/2010/main">
+                <a:solidFill>
+                  <a:schemeClr val="accent1"/>
+                </a:solidFill>
+              </a14:hiddenFill>
+            </a:ext>
+            <a:ext uri="{91240B29-F687-4F45-9708-019B960494DF}">
+              <a14:hiddenLine xmlns:a14="http://schemas.microsoft.com/office/drawing/2010/main" w="9525">
+                <a:solidFill>
+                  <a:schemeClr val="tx1"/>
+                </a:solidFill>
+                <a:miter lim="800000"/>
+                <a:headEnd/>
+                <a:tailEnd/>
+              </a14:hiddenLine>
+            </a:ext>
+          </a:extLst>
+        </p:spPr>
+      </p:pic>
     </p:spTree>
     <p:extLst>
       <p:ext uri="{BB962C8B-B14F-4D97-AF65-F5344CB8AC3E}">
-        <p14:creationId xmlns:p14="http://schemas.microsoft.com/office/powerpoint/2010/main" val="829056583"/>
+        <p14:creationId xmlns:p14="http://schemas.microsoft.com/office/powerpoint/2010/main" val="517783100"/>
       </p:ext>
     </p:extLst>
   </p:cSld>
@@ -11547,8 +11603,8 @@
           <a:lstStyle/>
           <a:p>
             <a:r>
-              <a:rPr lang="zh-TW" altLang="en-US" dirty="0" smtClean="0"/>
-              <a:t>稽核事件、任務</a:t>
+              <a:rPr lang="en-US" altLang="zh-TW" dirty="0" err="1" smtClean="0"/>
+              <a:t>Github</a:t>
             </a:r>
             <a:endParaRPr lang="zh-TW" altLang="en-US" dirty="0"/>
           </a:p>
@@ -11566,138 +11622,88 @@
         </p:nvSpPr>
         <p:spPr/>
         <p:txBody>
-          <a:bodyPr>
-            <a:normAutofit/>
-          </a:bodyPr>
+          <a:bodyPr/>
           <a:lstStyle/>
           <a:p>
             <a:r>
               <a:rPr lang="zh-TW" altLang="en-US" dirty="0" smtClean="0"/>
-              <a:t>持續一段時間</a:t>
+              <a:t>共享虛擬主機服務</a:t>
             </a:r>
             <a:endParaRPr lang="en-US" altLang="zh-TW" dirty="0" smtClean="0"/>
           </a:p>
           <a:p>
             <a:r>
               <a:rPr lang="zh-TW" altLang="en-US" dirty="0" smtClean="0"/>
-              <a:t>期間</a:t>
-            </a:r>
-            <a:r>
-              <a:rPr lang="zh-TW" altLang="en-US" dirty="0"/>
-              <a:t>可以指派多筆稽核</a:t>
+              <a:t>存放使用</a:t>
+            </a:r>
+            <a:r>
+              <a:rPr lang="en-US" altLang="zh-TW" dirty="0" err="1" smtClean="0"/>
+              <a:t>Git</a:t>
             </a:r>
             <a:r>
               <a:rPr lang="zh-TW" altLang="en-US" dirty="0" smtClean="0"/>
-              <a:t>任務</a:t>
+              <a:t>版本控制的程式、專案</a:t>
             </a:r>
             <a:endParaRPr lang="en-US" altLang="zh-TW" dirty="0" smtClean="0"/>
           </a:p>
           <a:p>
             <a:r>
               <a:rPr lang="zh-TW" altLang="en-US" dirty="0" smtClean="0"/>
-              <a:t>一</a:t>
-            </a:r>
-            <a:r>
-              <a:rPr lang="zh-TW" altLang="en-US" dirty="0"/>
-              <a:t>筆稽核</a:t>
-            </a:r>
+              <a:t>方便社會化軟體開發的功能</a:t>
+            </a:r>
+            <a:endParaRPr lang="en-US" altLang="zh-TW" dirty="0" smtClean="0"/>
+          </a:p>
+          <a:p>
+            <a:pPr lvl="1"/>
             <a:r>
               <a:rPr lang="zh-TW" altLang="en-US" dirty="0" smtClean="0"/>
-              <a:t>任務由</a:t>
-            </a:r>
-            <a:r>
-              <a:rPr lang="zh-TW" altLang="en-US" dirty="0"/>
-              <a:t>一名稽核</a:t>
-            </a:r>
+              <a:t>追蹤其它用戶</a:t>
+            </a:r>
+            <a:endParaRPr lang="en-US" altLang="zh-TW" dirty="0" smtClean="0"/>
+          </a:p>
+          <a:p>
+            <a:pPr lvl="1"/>
             <a:r>
               <a:rPr lang="zh-TW" altLang="en-US" dirty="0" smtClean="0"/>
-              <a:t>人員完成稽核、填寫回報</a:t>
+              <a:t>組織</a:t>
+            </a:r>
+            <a:r>
+              <a:rPr lang="en-US" altLang="zh-TW" dirty="0" smtClean="0"/>
+              <a:t>(group)</a:t>
+            </a:r>
+          </a:p>
+          <a:p>
+            <a:pPr lvl="1"/>
+            <a:r>
+              <a:rPr lang="zh-TW" altLang="en-US" dirty="0" smtClean="0"/>
+              <a:t>軟體庫</a:t>
+            </a:r>
+            <a:r>
+              <a:rPr lang="en-US" altLang="zh-TW" smtClean="0"/>
+              <a:t>(repository/repo)</a:t>
+            </a:r>
+            <a:r>
+              <a:rPr lang="zh-TW" altLang="en-US" dirty="0" smtClean="0"/>
+              <a:t>的動態</a:t>
             </a:r>
             <a:endParaRPr lang="en-US" altLang="zh-TW" dirty="0" smtClean="0"/>
           </a:p>
           <a:p>
+            <a:pPr lvl="1"/>
             <a:r>
               <a:rPr lang="zh-TW" altLang="en-US" dirty="0" smtClean="0"/>
-              <a:t>填寫完成後寄信至主管信箱</a:t>
-            </a:r>
-            <a:endParaRPr lang="en-US" altLang="zh-TW" dirty="0" smtClean="0"/>
-          </a:p>
-          <a:p>
+              <a:t>對程式的改動和</a:t>
+            </a:r>
+            <a:r>
+              <a:rPr lang="en-US" altLang="zh-TW" dirty="0" smtClean="0"/>
+              <a:t>bug</a:t>
+            </a:r>
             <a:r>
               <a:rPr lang="zh-TW" altLang="en-US" dirty="0" smtClean="0"/>
-              <a:t>主管</a:t>
-            </a:r>
-            <a:r>
-              <a:rPr lang="zh-TW" altLang="en-US" dirty="0"/>
-              <a:t>簽署</a:t>
-            </a:r>
-            <a:r>
-              <a:rPr lang="zh-TW" altLang="en-US" dirty="0" smtClean="0"/>
-              <a:t>後寄信</a:t>
-            </a:r>
-            <a:r>
-              <a:rPr lang="zh-TW" altLang="en-US" dirty="0"/>
-              <a:t>至稽核小組</a:t>
-            </a:r>
-            <a:r>
-              <a:rPr lang="zh-TW" altLang="en-US" dirty="0" smtClean="0"/>
-              <a:t>信箱</a:t>
-            </a:r>
-            <a:endParaRPr lang="en-US" altLang="zh-TW" dirty="0" smtClean="0"/>
-          </a:p>
-          <a:p>
-            <a:r>
-              <a:rPr lang="zh-TW" altLang="en-US" dirty="0" smtClean="0"/>
-              <a:t>簽署結束＝回報完成</a:t>
-            </a:r>
-            <a:endParaRPr lang="en-US" altLang="zh-TW" dirty="0" smtClean="0"/>
-          </a:p>
-          <a:p>
-            <a:r>
-              <a:rPr lang="zh-TW" altLang="en-US" dirty="0" smtClean="0"/>
-              <a:t>由</a:t>
-            </a:r>
-            <a:r>
-              <a:rPr lang="zh-TW" altLang="en-US" dirty="0"/>
-              <a:t>受稽機關進行矯正預防</a:t>
-            </a:r>
-            <a:r>
-              <a:rPr lang="zh-TW" altLang="en-US" dirty="0" smtClean="0"/>
-              <a:t>處理、填寫</a:t>
-            </a:r>
-            <a:r>
-              <a:rPr lang="zh-TW" altLang="en-US" dirty="0"/>
-              <a:t>矯正預防</a:t>
-            </a:r>
-            <a:r>
-              <a:rPr lang="zh-TW" altLang="en-US" dirty="0" smtClean="0"/>
-              <a:t>結果</a:t>
-            </a:r>
-            <a:endParaRPr lang="en-US" altLang="zh-TW" dirty="0" smtClean="0"/>
-          </a:p>
-          <a:p>
-            <a:r>
-              <a:rPr lang="zh-TW" altLang="en-US" dirty="0" smtClean="0"/>
-              <a:t>填寫完成寄信</a:t>
-            </a:r>
-            <a:r>
-              <a:rPr lang="zh-TW" altLang="en-US" dirty="0"/>
-              <a:t>至主管</a:t>
-            </a:r>
-            <a:r>
-              <a:rPr lang="zh-TW" altLang="en-US" dirty="0" smtClean="0"/>
-              <a:t>信箱</a:t>
-            </a:r>
-            <a:endParaRPr lang="en-US" altLang="zh-TW" dirty="0" smtClean="0"/>
-          </a:p>
-          <a:p>
-            <a:r>
-              <a:rPr lang="zh-TW" altLang="en-US" dirty="0" smtClean="0"/>
-              <a:t>簽署成功＝矯正完成＝一筆稽核完成。</a:t>
-            </a:r>
-            <a:br>
-              <a:rPr lang="zh-TW" altLang="en-US" dirty="0" smtClean="0"/>
-            </a:br>
+              <a:t>提出評論</a:t>
+            </a:r>
+          </a:p>
+          <a:p>
             <a:endParaRPr lang="zh-TW" altLang="en-US" dirty="0"/>
           </a:p>
         </p:txBody>
@@ -11705,7 +11711,7 @@
     </p:spTree>
     <p:extLst>
       <p:ext uri="{BB962C8B-B14F-4D97-AF65-F5344CB8AC3E}">
-        <p14:creationId xmlns:p14="http://schemas.microsoft.com/office/powerpoint/2010/main" val="2879552582"/>
+        <p14:creationId xmlns:p14="http://schemas.microsoft.com/office/powerpoint/2010/main" val="837447092"/>
       </p:ext>
     </p:extLst>
   </p:cSld>
@@ -11741,6 +11747,279 @@
       </p:grpSpPr>
       <p:sp>
         <p:nvSpPr>
+          <p:cNvPr id="4" name="標題 3"/>
+          <p:cNvSpPr>
+            <a:spLocks noGrp="1"/>
+          </p:cNvSpPr>
+          <p:nvPr>
+            <p:ph type="title"/>
+          </p:nvPr>
+        </p:nvSpPr>
+        <p:spPr>
+          <a:xfrm>
+            <a:off x="467544" y="2564904"/>
+            <a:ext cx="8229600" cy="1156990"/>
+          </a:xfrm>
+        </p:spPr>
+        <p:txBody>
+          <a:bodyPr/>
+          <a:lstStyle/>
+          <a:p>
+            <a:r>
+              <a:rPr lang="zh-TW" altLang="en-US" dirty="0" smtClean="0"/>
+              <a:t>系統實作與實驗</a:t>
+            </a:r>
+            <a:endParaRPr lang="zh-TW" altLang="en-US" dirty="0"/>
+          </a:p>
+        </p:txBody>
+      </p:sp>
+    </p:spTree>
+    <p:extLst>
+      <p:ext uri="{BB962C8B-B14F-4D97-AF65-F5344CB8AC3E}">
+        <p14:creationId xmlns:p14="http://schemas.microsoft.com/office/powerpoint/2010/main" val="829056583"/>
+      </p:ext>
+    </p:extLst>
+  </p:cSld>
+  <p:clrMapOvr>
+    <a:masterClrMapping/>
+  </p:clrMapOvr>
+  <p:timing>
+    <p:tnLst>
+      <p:par>
+        <p:cTn id="1" dur="indefinite" restart="never" nodeType="tmRoot"/>
+      </p:par>
+    </p:tnLst>
+  </p:timing>
+</p:sld>
+</file>
+
+<file path=ppt/slides/slide26.xml><?xml version="1.0" encoding="utf-8"?>
+<p:sld xmlns:a="http://schemas.openxmlformats.org/drawingml/2006/main" xmlns:r="http://schemas.openxmlformats.org/officeDocument/2006/relationships" xmlns:p="http://schemas.openxmlformats.org/presentationml/2006/main">
+  <p:cSld>
+    <p:spTree>
+      <p:nvGrpSpPr>
+        <p:cNvPr id="1" name=""/>
+        <p:cNvGrpSpPr/>
+        <p:nvPr/>
+      </p:nvGrpSpPr>
+      <p:grpSpPr>
+        <a:xfrm>
+          <a:off x="0" y="0"/>
+          <a:ext cx="0" cy="0"/>
+          <a:chOff x="0" y="0"/>
+          <a:chExt cx="0" cy="0"/>
+        </a:xfrm>
+      </p:grpSpPr>
+      <p:sp>
+        <p:nvSpPr>
+          <p:cNvPr id="2" name="標題 1"/>
+          <p:cNvSpPr>
+            <a:spLocks noGrp="1"/>
+          </p:cNvSpPr>
+          <p:nvPr>
+            <p:ph type="title"/>
+          </p:nvPr>
+        </p:nvSpPr>
+        <p:spPr/>
+        <p:txBody>
+          <a:bodyPr/>
+          <a:lstStyle/>
+          <a:p>
+            <a:r>
+              <a:rPr lang="zh-TW" altLang="en-US" dirty="0" smtClean="0"/>
+              <a:t>稽核事件、任務</a:t>
+            </a:r>
+            <a:endParaRPr lang="zh-TW" altLang="en-US" dirty="0"/>
+          </a:p>
+        </p:txBody>
+      </p:sp>
+      <p:sp>
+        <p:nvSpPr>
+          <p:cNvPr id="3" name="內容版面配置區 2"/>
+          <p:cNvSpPr>
+            <a:spLocks noGrp="1"/>
+          </p:cNvSpPr>
+          <p:nvPr>
+            <p:ph idx="1"/>
+          </p:nvPr>
+        </p:nvSpPr>
+        <p:spPr/>
+        <p:txBody>
+          <a:bodyPr>
+            <a:normAutofit/>
+          </a:bodyPr>
+          <a:lstStyle/>
+          <a:p>
+            <a:r>
+              <a:rPr lang="zh-TW" altLang="en-US" dirty="0" smtClean="0"/>
+              <a:t>持續一段時間</a:t>
+            </a:r>
+            <a:endParaRPr lang="en-US" altLang="zh-TW" dirty="0" smtClean="0"/>
+          </a:p>
+          <a:p>
+            <a:r>
+              <a:rPr lang="zh-TW" altLang="en-US" dirty="0" smtClean="0"/>
+              <a:t>期間</a:t>
+            </a:r>
+            <a:r>
+              <a:rPr lang="zh-TW" altLang="en-US" dirty="0"/>
+              <a:t>可以指派多筆稽核</a:t>
+            </a:r>
+            <a:r>
+              <a:rPr lang="zh-TW" altLang="en-US" dirty="0" smtClean="0"/>
+              <a:t>任務</a:t>
+            </a:r>
+            <a:endParaRPr lang="en-US" altLang="zh-TW" dirty="0" smtClean="0"/>
+          </a:p>
+          <a:p>
+            <a:r>
+              <a:rPr lang="zh-TW" altLang="en-US" dirty="0" smtClean="0"/>
+              <a:t>一</a:t>
+            </a:r>
+            <a:r>
+              <a:rPr lang="zh-TW" altLang="en-US" dirty="0"/>
+              <a:t>筆稽核</a:t>
+            </a:r>
+            <a:r>
+              <a:rPr lang="zh-TW" altLang="en-US" dirty="0" smtClean="0"/>
+              <a:t>任務由</a:t>
+            </a:r>
+            <a:r>
+              <a:rPr lang="zh-TW" altLang="en-US" dirty="0"/>
+              <a:t>一名稽核</a:t>
+            </a:r>
+            <a:r>
+              <a:rPr lang="zh-TW" altLang="en-US" dirty="0" smtClean="0"/>
+              <a:t>人員完成稽核、填寫回報</a:t>
+            </a:r>
+            <a:endParaRPr lang="en-US" altLang="zh-TW" dirty="0" smtClean="0"/>
+          </a:p>
+          <a:p>
+            <a:r>
+              <a:rPr lang="zh-TW" altLang="en-US" dirty="0" smtClean="0"/>
+              <a:t>填寫完成後寄信至主管信箱</a:t>
+            </a:r>
+            <a:endParaRPr lang="en-US" altLang="zh-TW" dirty="0" smtClean="0"/>
+          </a:p>
+          <a:p>
+            <a:r>
+              <a:rPr lang="zh-TW" altLang="en-US" dirty="0" smtClean="0"/>
+              <a:t>主管</a:t>
+            </a:r>
+            <a:r>
+              <a:rPr lang="zh-TW" altLang="en-US" dirty="0"/>
+              <a:t>簽署</a:t>
+            </a:r>
+            <a:r>
+              <a:rPr lang="zh-TW" altLang="en-US" dirty="0" smtClean="0"/>
+              <a:t>後寄信</a:t>
+            </a:r>
+            <a:r>
+              <a:rPr lang="zh-TW" altLang="en-US" dirty="0"/>
+              <a:t>至稽核小組</a:t>
+            </a:r>
+            <a:r>
+              <a:rPr lang="zh-TW" altLang="en-US" dirty="0" smtClean="0"/>
+              <a:t>信箱</a:t>
+            </a:r>
+            <a:endParaRPr lang="en-US" altLang="zh-TW" dirty="0" smtClean="0"/>
+          </a:p>
+          <a:p>
+            <a:r>
+              <a:rPr lang="zh-TW" altLang="en-US" dirty="0" smtClean="0"/>
+              <a:t>簽署結束＝回報完成</a:t>
+            </a:r>
+            <a:endParaRPr lang="en-US" altLang="zh-TW" dirty="0" smtClean="0"/>
+          </a:p>
+          <a:p>
+            <a:r>
+              <a:rPr lang="zh-TW" altLang="en-US" dirty="0" smtClean="0"/>
+              <a:t>由</a:t>
+            </a:r>
+            <a:r>
+              <a:rPr lang="zh-TW" altLang="en-US" dirty="0"/>
+              <a:t>受稽機關進行矯正預防</a:t>
+            </a:r>
+            <a:r>
+              <a:rPr lang="zh-TW" altLang="en-US" dirty="0" smtClean="0"/>
+              <a:t>處理、填寫</a:t>
+            </a:r>
+            <a:r>
+              <a:rPr lang="zh-TW" altLang="en-US" dirty="0"/>
+              <a:t>矯正預防</a:t>
+            </a:r>
+            <a:r>
+              <a:rPr lang="zh-TW" altLang="en-US" dirty="0" smtClean="0"/>
+              <a:t>結果</a:t>
+            </a:r>
+            <a:endParaRPr lang="en-US" altLang="zh-TW" dirty="0" smtClean="0"/>
+          </a:p>
+          <a:p>
+            <a:r>
+              <a:rPr lang="zh-TW" altLang="en-US" dirty="0" smtClean="0"/>
+              <a:t>填寫完成寄信</a:t>
+            </a:r>
+            <a:r>
+              <a:rPr lang="zh-TW" altLang="en-US" dirty="0"/>
+              <a:t>至主管</a:t>
+            </a:r>
+            <a:r>
+              <a:rPr lang="zh-TW" altLang="en-US" dirty="0" smtClean="0"/>
+              <a:t>信箱</a:t>
+            </a:r>
+            <a:endParaRPr lang="en-US" altLang="zh-TW" dirty="0" smtClean="0"/>
+          </a:p>
+          <a:p>
+            <a:r>
+              <a:rPr lang="zh-TW" altLang="en-US" dirty="0" smtClean="0"/>
+              <a:t>簽署成功＝矯正完成＝一筆稽核完成。</a:t>
+            </a:r>
+            <a:br>
+              <a:rPr lang="zh-TW" altLang="en-US" dirty="0" smtClean="0"/>
+            </a:br>
+            <a:endParaRPr lang="zh-TW" altLang="en-US" dirty="0"/>
+          </a:p>
+        </p:txBody>
+      </p:sp>
+    </p:spTree>
+    <p:extLst>
+      <p:ext uri="{BB962C8B-B14F-4D97-AF65-F5344CB8AC3E}">
+        <p14:creationId xmlns:p14="http://schemas.microsoft.com/office/powerpoint/2010/main" val="2879552582"/>
+      </p:ext>
+    </p:extLst>
+  </p:cSld>
+  <p:clrMapOvr>
+    <a:masterClrMapping/>
+  </p:clrMapOvr>
+  <p:timing>
+    <p:tnLst>
+      <p:par>
+        <p:cTn id="1" dur="indefinite" restart="never" nodeType="tmRoot"/>
+      </p:par>
+    </p:tnLst>
+  </p:timing>
+</p:sld>
+</file>
+
+<file path=ppt/slides/slide27.xml><?xml version="1.0" encoding="utf-8"?>
+<p:sld xmlns:a="http://schemas.openxmlformats.org/drawingml/2006/main" xmlns:r="http://schemas.openxmlformats.org/officeDocument/2006/relationships" xmlns:p="http://schemas.openxmlformats.org/presentationml/2006/main">
+  <p:cSld>
+    <p:spTree>
+      <p:nvGrpSpPr>
+        <p:cNvPr id="1" name=""/>
+        <p:cNvGrpSpPr/>
+        <p:nvPr/>
+      </p:nvGrpSpPr>
+      <p:grpSpPr>
+        <a:xfrm>
+          <a:off x="0" y="0"/>
+          <a:ext cx="0" cy="0"/>
+          <a:chOff x="0" y="0"/>
+          <a:chExt cx="0" cy="0"/>
+        </a:xfrm>
+      </p:grpSpPr>
+      <p:sp>
+        <p:nvSpPr>
           <p:cNvPr id="2" name="標題 1"/>
           <p:cNvSpPr>
             <a:spLocks noGrp="1"/>
@@ -11857,7 +12136,7 @@
 </p:sld>
 </file>
 
-<file path=ppt/slides/slide26.xml><?xml version="1.0" encoding="utf-8"?>
+<file path=ppt/slides/slide28.xml><?xml version="1.0" encoding="utf-8"?>
 <p:sld xmlns:a="http://schemas.openxmlformats.org/drawingml/2006/main" xmlns:r="http://schemas.openxmlformats.org/officeDocument/2006/relationships" xmlns:p="http://schemas.openxmlformats.org/presentationml/2006/main">
   <p:cSld>
     <p:spTree>
@@ -11972,7 +12251,7 @@
 </p:sld>
 </file>
 
-<file path=ppt/slides/slide27.xml><?xml version="1.0" encoding="utf-8"?>
+<file path=ppt/slides/slide29.xml><?xml version="1.0" encoding="utf-8"?>
 <p:sld xmlns:a="http://schemas.openxmlformats.org/drawingml/2006/main" xmlns:r="http://schemas.openxmlformats.org/officeDocument/2006/relationships" xmlns:p="http://schemas.openxmlformats.org/presentationml/2006/main">
   <p:cSld>
     <p:spTree>
@@ -12071,248 +12350,6 @@
     <p:extLst>
       <p:ext uri="{BB962C8B-B14F-4D97-AF65-F5344CB8AC3E}">
         <p14:creationId xmlns:p14="http://schemas.microsoft.com/office/powerpoint/2010/main" val="2751504223"/>
-      </p:ext>
-    </p:extLst>
-  </p:cSld>
-  <p:clrMapOvr>
-    <a:masterClrMapping/>
-  </p:clrMapOvr>
-  <p:timing>
-    <p:tnLst>
-      <p:par>
-        <p:cTn id="1" dur="indefinite" restart="never" nodeType="tmRoot"/>
-      </p:par>
-    </p:tnLst>
-  </p:timing>
-</p:sld>
-</file>
-
-<file path=ppt/slides/slide28.xml><?xml version="1.0" encoding="utf-8"?>
-<p:sld xmlns:a="http://schemas.openxmlformats.org/drawingml/2006/main" xmlns:r="http://schemas.openxmlformats.org/officeDocument/2006/relationships" xmlns:p="http://schemas.openxmlformats.org/presentationml/2006/main">
-  <p:cSld>
-    <p:spTree>
-      <p:nvGrpSpPr>
-        <p:cNvPr id="1" name=""/>
-        <p:cNvGrpSpPr/>
-        <p:nvPr/>
-      </p:nvGrpSpPr>
-      <p:grpSpPr>
-        <a:xfrm>
-          <a:off x="0" y="0"/>
-          <a:ext cx="0" cy="0"/>
-          <a:chOff x="0" y="0"/>
-          <a:chExt cx="0" cy="0"/>
-        </a:xfrm>
-      </p:grpSpPr>
-      <p:sp>
-        <p:nvSpPr>
-          <p:cNvPr id="4" name="標題 3"/>
-          <p:cNvSpPr>
-            <a:spLocks noGrp="1"/>
-          </p:cNvSpPr>
-          <p:nvPr>
-            <p:ph type="title"/>
-          </p:nvPr>
-        </p:nvSpPr>
-        <p:spPr>
-          <a:xfrm>
-            <a:off x="467544" y="2564904"/>
-            <a:ext cx="8229600" cy="1156990"/>
-          </a:xfrm>
-        </p:spPr>
-        <p:txBody>
-          <a:bodyPr/>
-          <a:lstStyle/>
-          <a:p>
-            <a:r>
-              <a:rPr lang="zh-TW" altLang="en-US" dirty="0" smtClean="0"/>
-              <a:t>功能介紹</a:t>
-            </a:r>
-            <a:endParaRPr lang="zh-TW" altLang="en-US" dirty="0"/>
-          </a:p>
-        </p:txBody>
-      </p:sp>
-    </p:spTree>
-    <p:extLst>
-      <p:ext uri="{BB962C8B-B14F-4D97-AF65-F5344CB8AC3E}">
-        <p14:creationId xmlns:p14="http://schemas.microsoft.com/office/powerpoint/2010/main" val="693232607"/>
-      </p:ext>
-    </p:extLst>
-  </p:cSld>
-  <p:clrMapOvr>
-    <a:masterClrMapping/>
-  </p:clrMapOvr>
-  <p:timing>
-    <p:tnLst>
-      <p:par>
-        <p:cTn id="1" dur="indefinite" restart="never" nodeType="tmRoot"/>
-      </p:par>
-    </p:tnLst>
-  </p:timing>
-</p:sld>
-</file>
-
-<file path=ppt/slides/slide29.xml><?xml version="1.0" encoding="utf-8"?>
-<p:sld xmlns:a="http://schemas.openxmlformats.org/drawingml/2006/main" xmlns:r="http://schemas.openxmlformats.org/officeDocument/2006/relationships" xmlns:p="http://schemas.openxmlformats.org/presentationml/2006/main">
-  <p:cSld>
-    <p:spTree>
-      <p:nvGrpSpPr>
-        <p:cNvPr id="1" name=""/>
-        <p:cNvGrpSpPr/>
-        <p:nvPr/>
-      </p:nvGrpSpPr>
-      <p:grpSpPr>
-        <a:xfrm>
-          <a:off x="0" y="0"/>
-          <a:ext cx="0" cy="0"/>
-          <a:chOff x="0" y="0"/>
-          <a:chExt cx="0" cy="0"/>
-        </a:xfrm>
-      </p:grpSpPr>
-      <p:sp>
-        <p:nvSpPr>
-          <p:cNvPr id="2" name="標題 1"/>
-          <p:cNvSpPr>
-            <a:spLocks noGrp="1"/>
-          </p:cNvSpPr>
-          <p:nvPr>
-            <p:ph type="title"/>
-          </p:nvPr>
-        </p:nvSpPr>
-        <p:spPr/>
-        <p:txBody>
-          <a:bodyPr/>
-          <a:lstStyle/>
-          <a:p>
-            <a:r>
-              <a:rPr lang="zh-TW" altLang="en-US" dirty="0" smtClean="0"/>
-              <a:t>功能介紹</a:t>
-            </a:r>
-            <a:endParaRPr lang="zh-TW" altLang="en-US" dirty="0"/>
-          </a:p>
-        </p:txBody>
-      </p:sp>
-      <p:sp>
-        <p:nvSpPr>
-          <p:cNvPr id="3" name="內容版面配置區 2"/>
-          <p:cNvSpPr>
-            <a:spLocks noGrp="1"/>
-          </p:cNvSpPr>
-          <p:nvPr>
-            <p:ph idx="1"/>
-          </p:nvPr>
-        </p:nvSpPr>
-        <p:spPr/>
-        <p:txBody>
-          <a:bodyPr>
-            <a:normAutofit/>
-          </a:bodyPr>
-          <a:lstStyle/>
-          <a:p>
-            <a:r>
-              <a:rPr lang="zh-TW" altLang="en-US" dirty="0" smtClean="0"/>
-              <a:t>身份驗證以及登入</a:t>
-            </a:r>
-            <a:endParaRPr lang="en-US" altLang="zh-TW" dirty="0" smtClean="0"/>
-          </a:p>
-          <a:p>
-            <a:pPr lvl="1"/>
-            <a:r>
-              <a:rPr lang="zh-TW" altLang="en-US" dirty="0" smtClean="0"/>
-              <a:t>資料庫存取</a:t>
-            </a:r>
-            <a:endParaRPr lang="en-US" altLang="zh-TW" dirty="0" smtClean="0"/>
-          </a:p>
-          <a:p>
-            <a:pPr lvl="1"/>
-            <a:r>
-              <a:rPr lang="en-US" altLang="zh-TW" dirty="0" smtClean="0"/>
-              <a:t>Session </a:t>
-            </a:r>
-            <a:r>
-              <a:rPr lang="zh-TW" altLang="en-US" dirty="0" smtClean="0"/>
-              <a:t>記錄</a:t>
-            </a:r>
-            <a:endParaRPr lang="en-US" altLang="zh-TW" dirty="0" smtClean="0"/>
-          </a:p>
-          <a:p>
-            <a:pPr lvl="1"/>
-            <a:r>
-              <a:rPr lang="zh-TW" altLang="en-US" dirty="0" smtClean="0"/>
-              <a:t>存</a:t>
-            </a:r>
-            <a:r>
-              <a:rPr lang="zh-TW" altLang="en-US" dirty="0"/>
-              <a:t>取控管</a:t>
-            </a:r>
-          </a:p>
-          <a:p>
-            <a:r>
-              <a:rPr lang="zh-TW" altLang="en-US" dirty="0"/>
-              <a:t>管理</a:t>
-            </a:r>
-            <a:r>
-              <a:rPr lang="zh-TW" altLang="en-US" dirty="0" smtClean="0"/>
-              <a:t>介面</a:t>
-            </a:r>
-            <a:endParaRPr lang="en-US" altLang="zh-TW" dirty="0" smtClean="0"/>
-          </a:p>
-          <a:p>
-            <a:pPr lvl="1"/>
-            <a:r>
-              <a:rPr lang="zh-TW" altLang="en-US" dirty="0" smtClean="0"/>
-              <a:t>使用者</a:t>
-            </a:r>
-            <a:endParaRPr lang="en-US" altLang="zh-TW" dirty="0" smtClean="0"/>
-          </a:p>
-          <a:p>
-            <a:pPr lvl="1"/>
-            <a:r>
-              <a:rPr lang="zh-TW" altLang="en-US" dirty="0" smtClean="0"/>
-              <a:t>設定</a:t>
-            </a:r>
-            <a:endParaRPr lang="en-US" altLang="zh-TW" dirty="0" smtClean="0"/>
-          </a:p>
-          <a:p>
-            <a:pPr lvl="1"/>
-            <a:r>
-              <a:rPr lang="zh-TW" altLang="en-US" dirty="0" smtClean="0"/>
-              <a:t>任務</a:t>
-            </a:r>
-            <a:r>
-              <a:rPr lang="zh-TW" altLang="en-US" dirty="0"/>
-              <a:t>管理</a:t>
-            </a:r>
-          </a:p>
-          <a:p>
-            <a:r>
-              <a:rPr lang="zh-TW" altLang="en-US" dirty="0" smtClean="0"/>
-              <a:t>稽核人員介面</a:t>
-            </a:r>
-            <a:endParaRPr lang="en-US" altLang="zh-TW" dirty="0" smtClean="0"/>
-          </a:p>
-          <a:p>
-            <a:pPr lvl="1"/>
-            <a:r>
-              <a:rPr lang="zh-TW" altLang="en-US" dirty="0" smtClean="0"/>
-              <a:t>稽核行事曆</a:t>
-            </a:r>
-            <a:endParaRPr lang="en-US" altLang="zh-TW" dirty="0"/>
-          </a:p>
-          <a:p>
-            <a:pPr lvl="1"/>
-            <a:r>
-              <a:rPr lang="zh-TW" altLang="en-US" dirty="0" smtClean="0"/>
-              <a:t>稽核報告填寫與暫存</a:t>
-            </a:r>
-            <a:endParaRPr lang="zh-TW" altLang="en-US" dirty="0"/>
-          </a:p>
-        </p:txBody>
-      </p:sp>
-    </p:spTree>
-    <p:extLst>
-      <p:ext uri="{BB962C8B-B14F-4D97-AF65-F5344CB8AC3E}">
-        <p14:creationId xmlns:p14="http://schemas.microsoft.com/office/powerpoint/2010/main" val="3227895633"/>
       </p:ext>
     </p:extLst>
   </p:cSld>
@@ -12745,7 +12782,7 @@
       </p:grpSpPr>
       <p:sp>
         <p:nvSpPr>
-          <p:cNvPr id="2" name="標題 1"/>
+          <p:cNvPr id="4" name="標題 3"/>
           <p:cNvSpPr>
             <a:spLocks noGrp="1"/>
           </p:cNvSpPr>
@@ -12753,7 +12790,12 @@
             <p:ph type="title"/>
           </p:nvPr>
         </p:nvSpPr>
-        <p:spPr/>
+        <p:spPr>
+          <a:xfrm>
+            <a:off x="467544" y="2564904"/>
+            <a:ext cx="8229600" cy="1156990"/>
+          </a:xfrm>
+        </p:spPr>
         <p:txBody>
           <a:bodyPr/>
           <a:lstStyle/>
@@ -12763,93 +12805,13 @@
               <a:t>功能介紹</a:t>
             </a:r>
             <a:endParaRPr lang="zh-TW" altLang="en-US" dirty="0"/>
-          </a:p>
-        </p:txBody>
-      </p:sp>
-      <p:sp>
-        <p:nvSpPr>
-          <p:cNvPr id="3" name="內容版面配置區 2"/>
-          <p:cNvSpPr>
-            <a:spLocks noGrp="1"/>
-          </p:cNvSpPr>
-          <p:nvPr>
-            <p:ph idx="1"/>
-          </p:nvPr>
-        </p:nvSpPr>
-        <p:spPr/>
-        <p:txBody>
-          <a:bodyPr>
-            <a:normAutofit/>
-          </a:bodyPr>
-          <a:lstStyle/>
-          <a:p>
-            <a:r>
-              <a:rPr lang="zh-TW" altLang="en-US" dirty="0" smtClean="0"/>
-              <a:t>稽核以及矯正預防報告產生</a:t>
-            </a:r>
-            <a:endParaRPr lang="en-US" altLang="zh-TW" dirty="0" smtClean="0"/>
-          </a:p>
-          <a:p>
-            <a:pPr lvl="1"/>
-            <a:r>
-              <a:rPr lang="en-US" altLang="zh-TW" dirty="0" smtClean="0"/>
-              <a:t>PDF </a:t>
-            </a:r>
-            <a:r>
-              <a:rPr lang="zh-TW" altLang="en-US" dirty="0"/>
-              <a:t>產生器</a:t>
-            </a:r>
-          </a:p>
-          <a:p>
-            <a:r>
-              <a:rPr lang="zh-TW" altLang="en-US" dirty="0" smtClean="0"/>
-              <a:t>單位主管通知簽署</a:t>
-            </a:r>
-            <a:endParaRPr lang="en-US" altLang="zh-TW" dirty="0" smtClean="0"/>
-          </a:p>
-          <a:p>
-            <a:pPr lvl="1"/>
-            <a:r>
-              <a:rPr lang="zh-TW" altLang="en-US" dirty="0" smtClean="0"/>
-              <a:t>藉由信件寄送簽署連結以及稽核</a:t>
-            </a:r>
-            <a:r>
-              <a:rPr lang="zh-TW" altLang="en-US" dirty="0"/>
-              <a:t>報告 </a:t>
-            </a:r>
-            <a:r>
-              <a:rPr lang="en-US" altLang="zh-TW" dirty="0"/>
-              <a:t>PDF </a:t>
-            </a:r>
-            <a:r>
-              <a:rPr lang="zh-TW" altLang="en-US" dirty="0"/>
-              <a:t>給單位主管確認</a:t>
-            </a:r>
-          </a:p>
-          <a:p>
-            <a:r>
-              <a:rPr lang="zh-TW" altLang="en-US" dirty="0" smtClean="0"/>
-              <a:t>受稽單位介面</a:t>
-            </a:r>
-            <a:endParaRPr lang="en-US" altLang="zh-TW" dirty="0" smtClean="0"/>
-          </a:p>
-          <a:p>
-            <a:pPr lvl="1"/>
-            <a:r>
-              <a:rPr lang="zh-TW" altLang="en-US" dirty="0" smtClean="0"/>
-              <a:t>矯正預防報告填寫</a:t>
-            </a:r>
-            <a:r>
-              <a:rPr lang="zh-TW" altLang="en-US" dirty="0"/>
-              <a:t>或指定其他同仁填寫</a:t>
-            </a:r>
           </a:p>
         </p:txBody>
       </p:sp>
     </p:spTree>
     <p:extLst>
       <p:ext uri="{BB962C8B-B14F-4D97-AF65-F5344CB8AC3E}">
-        <p14:creationId xmlns:p14="http://schemas.microsoft.com/office/powerpoint/2010/main" val="950409900"/>
+        <p14:creationId xmlns:p14="http://schemas.microsoft.com/office/powerpoint/2010/main" val="693232607"/>
       </p:ext>
     </p:extLst>
   </p:cSld>
@@ -12885,7 +12847,7 @@
       </p:grpSpPr>
       <p:sp>
         <p:nvSpPr>
-          <p:cNvPr id="4" name="標題 3"/>
+          <p:cNvPr id="2" name="標題 1"/>
           <p:cNvSpPr>
             <a:spLocks noGrp="1"/>
           </p:cNvSpPr>
@@ -12893,28 +12855,140 @@
             <p:ph type="title"/>
           </p:nvPr>
         </p:nvSpPr>
-        <p:spPr>
-          <a:xfrm>
-            <a:off x="467544" y="2564904"/>
-            <a:ext cx="8229600" cy="1156990"/>
-          </a:xfrm>
-        </p:spPr>
+        <p:spPr/>
         <p:txBody>
           <a:bodyPr/>
           <a:lstStyle/>
           <a:p>
             <a:r>
               <a:rPr lang="zh-TW" altLang="en-US" dirty="0" smtClean="0"/>
-              <a:t>管理介面</a:t>
+              <a:t>功能介紹</a:t>
+            </a:r>
+            <a:endParaRPr lang="zh-TW" altLang="en-US" dirty="0"/>
+          </a:p>
+        </p:txBody>
+      </p:sp>
+      <p:sp>
+        <p:nvSpPr>
+          <p:cNvPr id="3" name="內容版面配置區 2"/>
+          <p:cNvSpPr>
+            <a:spLocks noGrp="1"/>
+          </p:cNvSpPr>
+          <p:nvPr>
+            <p:ph idx="1"/>
+          </p:nvPr>
+        </p:nvSpPr>
+        <p:spPr/>
+        <p:txBody>
+          <a:bodyPr>
+            <a:normAutofit/>
+          </a:bodyPr>
+          <a:lstStyle/>
+          <a:p>
+            <a:r>
+              <a:rPr lang="zh-TW" altLang="en-US" dirty="0" smtClean="0"/>
+              <a:t>身份驗證以及登入</a:t>
+            </a:r>
+            <a:endParaRPr lang="en-US" altLang="zh-TW" dirty="0" smtClean="0"/>
+          </a:p>
+          <a:p>
+            <a:pPr lvl="1"/>
+            <a:r>
+              <a:rPr lang="zh-TW" altLang="en-US" dirty="0" smtClean="0"/>
+              <a:t>資料庫存取</a:t>
+            </a:r>
+            <a:endParaRPr lang="en-US" altLang="zh-TW" dirty="0" smtClean="0"/>
+          </a:p>
+          <a:p>
+            <a:pPr lvl="1"/>
+            <a:r>
+              <a:rPr lang="en-US" altLang="zh-TW" dirty="0" smtClean="0"/>
+              <a:t>Session </a:t>
+            </a:r>
+            <a:r>
+              <a:rPr lang="zh-TW" altLang="en-US" dirty="0" smtClean="0"/>
+              <a:t>記錄</a:t>
+            </a:r>
+            <a:endParaRPr lang="en-US" altLang="zh-TW" dirty="0" smtClean="0"/>
+          </a:p>
+          <a:p>
+            <a:pPr lvl="1"/>
+            <a:r>
+              <a:rPr lang="zh-TW" altLang="en-US" dirty="0" smtClean="0"/>
+              <a:t>存</a:t>
+            </a:r>
+            <a:r>
+              <a:rPr lang="zh-TW" altLang="en-US" dirty="0"/>
+              <a:t>取控管</a:t>
+            </a:r>
+          </a:p>
+          <a:p>
+            <a:r>
+              <a:rPr lang="zh-TW" altLang="en-US" dirty="0"/>
+              <a:t>管理</a:t>
+            </a:r>
+            <a:r>
+              <a:rPr lang="zh-TW" altLang="en-US" dirty="0" smtClean="0"/>
+              <a:t>介面</a:t>
+            </a:r>
+            <a:endParaRPr lang="en-US" altLang="zh-TW" dirty="0" smtClean="0"/>
+          </a:p>
+          <a:p>
+            <a:pPr lvl="1"/>
+            <a:r>
+              <a:rPr lang="zh-TW" altLang="en-US" dirty="0" smtClean="0"/>
+              <a:t>使用者</a:t>
+            </a:r>
+            <a:endParaRPr lang="en-US" altLang="zh-TW" dirty="0" smtClean="0"/>
+          </a:p>
+          <a:p>
+            <a:pPr lvl="1"/>
+            <a:r>
+              <a:rPr lang="zh-TW" altLang="en-US" dirty="0" smtClean="0"/>
+              <a:t>設定</a:t>
+            </a:r>
+            <a:endParaRPr lang="en-US" altLang="zh-TW" dirty="0" smtClean="0"/>
+          </a:p>
+          <a:p>
+            <a:pPr lvl="1"/>
+            <a:r>
+              <a:rPr lang="zh-TW" altLang="en-US" dirty="0" smtClean="0"/>
+              <a:t>任務</a:t>
+            </a:r>
+            <a:r>
+              <a:rPr lang="zh-TW" altLang="en-US" dirty="0"/>
+              <a:t>管理</a:t>
+            </a:r>
+          </a:p>
+          <a:p>
+            <a:r>
+              <a:rPr lang="zh-TW" altLang="en-US" dirty="0" smtClean="0"/>
+              <a:t>稽核人員介面</a:t>
+            </a:r>
+            <a:endParaRPr lang="en-US" altLang="zh-TW" dirty="0" smtClean="0"/>
+          </a:p>
+          <a:p>
+            <a:pPr lvl="1"/>
+            <a:r>
+              <a:rPr lang="zh-TW" altLang="en-US" dirty="0" smtClean="0"/>
+              <a:t>稽核行事曆</a:t>
             </a:r>
             <a:endParaRPr lang="en-US" altLang="zh-TW" dirty="0"/>
+          </a:p>
+          <a:p>
+            <a:pPr lvl="1"/>
+            <a:r>
+              <a:rPr lang="zh-TW" altLang="en-US" dirty="0" smtClean="0"/>
+              <a:t>稽核報告填寫與暫存</a:t>
+            </a:r>
+            <a:endParaRPr lang="zh-TW" altLang="en-US" dirty="0"/>
           </a:p>
         </p:txBody>
       </p:sp>
     </p:spTree>
     <p:extLst>
       <p:ext uri="{BB962C8B-B14F-4D97-AF65-F5344CB8AC3E}">
-        <p14:creationId xmlns:p14="http://schemas.microsoft.com/office/powerpoint/2010/main" val="1031223462"/>
+        <p14:creationId xmlns:p14="http://schemas.microsoft.com/office/powerpoint/2010/main" val="3227895633"/>
       </p:ext>
     </p:extLst>
   </p:cSld>
@@ -12964,6 +13038,211 @@
           <a:lstStyle/>
           <a:p>
             <a:r>
+              <a:rPr lang="zh-TW" altLang="en-US" dirty="0" smtClean="0"/>
+              <a:t>功能介紹</a:t>
+            </a:r>
+            <a:endParaRPr lang="zh-TW" altLang="en-US" dirty="0"/>
+          </a:p>
+        </p:txBody>
+      </p:sp>
+      <p:sp>
+        <p:nvSpPr>
+          <p:cNvPr id="3" name="內容版面配置區 2"/>
+          <p:cNvSpPr>
+            <a:spLocks noGrp="1"/>
+          </p:cNvSpPr>
+          <p:nvPr>
+            <p:ph idx="1"/>
+          </p:nvPr>
+        </p:nvSpPr>
+        <p:spPr/>
+        <p:txBody>
+          <a:bodyPr>
+            <a:normAutofit/>
+          </a:bodyPr>
+          <a:lstStyle/>
+          <a:p>
+            <a:r>
+              <a:rPr lang="zh-TW" altLang="en-US" dirty="0" smtClean="0"/>
+              <a:t>稽核以及矯正預防報告產生</a:t>
+            </a:r>
+            <a:endParaRPr lang="en-US" altLang="zh-TW" dirty="0" smtClean="0"/>
+          </a:p>
+          <a:p>
+            <a:pPr lvl="1"/>
+            <a:r>
+              <a:rPr lang="en-US" altLang="zh-TW" dirty="0" smtClean="0"/>
+              <a:t>PDF </a:t>
+            </a:r>
+            <a:r>
+              <a:rPr lang="zh-TW" altLang="en-US" dirty="0"/>
+              <a:t>產生器</a:t>
+            </a:r>
+          </a:p>
+          <a:p>
+            <a:r>
+              <a:rPr lang="zh-TW" altLang="en-US" dirty="0" smtClean="0"/>
+              <a:t>單位主管通知簽署</a:t>
+            </a:r>
+            <a:endParaRPr lang="en-US" altLang="zh-TW" dirty="0" smtClean="0"/>
+          </a:p>
+          <a:p>
+            <a:pPr lvl="1"/>
+            <a:r>
+              <a:rPr lang="zh-TW" altLang="en-US" dirty="0" smtClean="0"/>
+              <a:t>藉由信件寄送簽署連結以及稽核</a:t>
+            </a:r>
+            <a:r>
+              <a:rPr lang="zh-TW" altLang="en-US" dirty="0"/>
+              <a:t>報告 </a:t>
+            </a:r>
+            <a:r>
+              <a:rPr lang="en-US" altLang="zh-TW" dirty="0"/>
+              <a:t>PDF </a:t>
+            </a:r>
+            <a:r>
+              <a:rPr lang="zh-TW" altLang="en-US" dirty="0"/>
+              <a:t>給單位主管確認</a:t>
+            </a:r>
+          </a:p>
+          <a:p>
+            <a:r>
+              <a:rPr lang="zh-TW" altLang="en-US" dirty="0" smtClean="0"/>
+              <a:t>受稽單位介面</a:t>
+            </a:r>
+            <a:endParaRPr lang="en-US" altLang="zh-TW" dirty="0" smtClean="0"/>
+          </a:p>
+          <a:p>
+            <a:pPr lvl="1"/>
+            <a:r>
+              <a:rPr lang="zh-TW" altLang="en-US" dirty="0" smtClean="0"/>
+              <a:t>矯正預防報告填寫</a:t>
+            </a:r>
+            <a:r>
+              <a:rPr lang="zh-TW" altLang="en-US" dirty="0"/>
+              <a:t>或指定其他同仁填寫</a:t>
+            </a:r>
+          </a:p>
+        </p:txBody>
+      </p:sp>
+    </p:spTree>
+    <p:extLst>
+      <p:ext uri="{BB962C8B-B14F-4D97-AF65-F5344CB8AC3E}">
+        <p14:creationId xmlns:p14="http://schemas.microsoft.com/office/powerpoint/2010/main" val="950409900"/>
+      </p:ext>
+    </p:extLst>
+  </p:cSld>
+  <p:clrMapOvr>
+    <a:masterClrMapping/>
+  </p:clrMapOvr>
+  <p:timing>
+    <p:tnLst>
+      <p:par>
+        <p:cTn id="1" dur="indefinite" restart="never" nodeType="tmRoot"/>
+      </p:par>
+    </p:tnLst>
+  </p:timing>
+</p:sld>
+</file>
+
+<file path=ppt/slides/slide33.xml><?xml version="1.0" encoding="utf-8"?>
+<p:sld xmlns:a="http://schemas.openxmlformats.org/drawingml/2006/main" xmlns:r="http://schemas.openxmlformats.org/officeDocument/2006/relationships" xmlns:p="http://schemas.openxmlformats.org/presentationml/2006/main">
+  <p:cSld>
+    <p:spTree>
+      <p:nvGrpSpPr>
+        <p:cNvPr id="1" name=""/>
+        <p:cNvGrpSpPr/>
+        <p:nvPr/>
+      </p:nvGrpSpPr>
+      <p:grpSpPr>
+        <a:xfrm>
+          <a:off x="0" y="0"/>
+          <a:ext cx="0" cy="0"/>
+          <a:chOff x="0" y="0"/>
+          <a:chExt cx="0" cy="0"/>
+        </a:xfrm>
+      </p:grpSpPr>
+      <p:sp>
+        <p:nvSpPr>
+          <p:cNvPr id="4" name="標題 3"/>
+          <p:cNvSpPr>
+            <a:spLocks noGrp="1"/>
+          </p:cNvSpPr>
+          <p:nvPr>
+            <p:ph type="title"/>
+          </p:nvPr>
+        </p:nvSpPr>
+        <p:spPr>
+          <a:xfrm>
+            <a:off x="467544" y="2564904"/>
+            <a:ext cx="8229600" cy="1156990"/>
+          </a:xfrm>
+        </p:spPr>
+        <p:txBody>
+          <a:bodyPr/>
+          <a:lstStyle/>
+          <a:p>
+            <a:r>
+              <a:rPr lang="zh-TW" altLang="en-US" dirty="0" smtClean="0"/>
+              <a:t>管理介面</a:t>
+            </a:r>
+            <a:endParaRPr lang="en-US" altLang="zh-TW" dirty="0"/>
+          </a:p>
+        </p:txBody>
+      </p:sp>
+    </p:spTree>
+    <p:extLst>
+      <p:ext uri="{BB962C8B-B14F-4D97-AF65-F5344CB8AC3E}">
+        <p14:creationId xmlns:p14="http://schemas.microsoft.com/office/powerpoint/2010/main" val="1031223462"/>
+      </p:ext>
+    </p:extLst>
+  </p:cSld>
+  <p:clrMapOvr>
+    <a:masterClrMapping/>
+  </p:clrMapOvr>
+  <p:timing>
+    <p:tnLst>
+      <p:par>
+        <p:cTn id="1" dur="indefinite" restart="never" nodeType="tmRoot"/>
+      </p:par>
+    </p:tnLst>
+  </p:timing>
+</p:sld>
+</file>
+
+<file path=ppt/slides/slide34.xml><?xml version="1.0" encoding="utf-8"?>
+<p:sld xmlns:a="http://schemas.openxmlformats.org/drawingml/2006/main" xmlns:r="http://schemas.openxmlformats.org/officeDocument/2006/relationships" xmlns:p="http://schemas.openxmlformats.org/presentationml/2006/main">
+  <p:cSld>
+    <p:spTree>
+      <p:nvGrpSpPr>
+        <p:cNvPr id="1" name=""/>
+        <p:cNvGrpSpPr/>
+        <p:nvPr/>
+      </p:nvGrpSpPr>
+      <p:grpSpPr>
+        <a:xfrm>
+          <a:off x="0" y="0"/>
+          <a:ext cx="0" cy="0"/>
+          <a:chOff x="0" y="0"/>
+          <a:chExt cx="0" cy="0"/>
+        </a:xfrm>
+      </p:grpSpPr>
+      <p:sp>
+        <p:nvSpPr>
+          <p:cNvPr id="2" name="標題 1"/>
+          <p:cNvSpPr>
+            <a:spLocks noGrp="1"/>
+          </p:cNvSpPr>
+          <p:nvPr>
+            <p:ph type="title"/>
+          </p:nvPr>
+        </p:nvSpPr>
+        <p:spPr/>
+        <p:txBody>
+          <a:bodyPr/>
+          <a:lstStyle/>
+          <a:p>
+            <a:r>
               <a:rPr kumimoji="1" lang="zh-TW" altLang="en-US" dirty="0" smtClean="0"/>
               <a:t>行事曆</a:t>
             </a:r>
@@ -13077,7 +13356,7 @@
 </p:sld>
 </file>
 
-<file path=ppt/slides/slide33.xml><?xml version="1.0" encoding="utf-8"?>
+<file path=ppt/slides/slide35.xml><?xml version="1.0" encoding="utf-8"?>
 <p:sld xmlns:a="http://schemas.openxmlformats.org/drawingml/2006/main" xmlns:r="http://schemas.openxmlformats.org/officeDocument/2006/relationships" xmlns:p="http://schemas.openxmlformats.org/presentationml/2006/main">
   <p:cSld>
     <p:spTree>
@@ -13167,7 +13446,7 @@
 </p:sld>
 </file>
 
-<file path=ppt/slides/slide34.xml><?xml version="1.0" encoding="utf-8"?>
+<file path=ppt/slides/slide36.xml><?xml version="1.0" encoding="utf-8"?>
 <p:sld xmlns:a="http://schemas.openxmlformats.org/drawingml/2006/main" xmlns:r="http://schemas.openxmlformats.org/officeDocument/2006/relationships" xmlns:p="http://schemas.openxmlformats.org/presentationml/2006/main">
   <p:cSld>
     <p:spTree>
@@ -13276,303 +13555,6 @@
 </p:sld>
 </file>
 
-<file path=ppt/slides/slide35.xml><?xml version="1.0" encoding="utf-8"?>
-<p:sld xmlns:a="http://schemas.openxmlformats.org/drawingml/2006/main" xmlns:r="http://schemas.openxmlformats.org/officeDocument/2006/relationships" xmlns:p="http://schemas.openxmlformats.org/presentationml/2006/main">
-  <p:cSld>
-    <p:spTree>
-      <p:nvGrpSpPr>
-        <p:cNvPr id="1" name=""/>
-        <p:cNvGrpSpPr/>
-        <p:nvPr/>
-      </p:nvGrpSpPr>
-      <p:grpSpPr>
-        <a:xfrm>
-          <a:off x="0" y="0"/>
-          <a:ext cx="0" cy="0"/>
-          <a:chOff x="0" y="0"/>
-          <a:chExt cx="0" cy="0"/>
-        </a:xfrm>
-      </p:grpSpPr>
-      <p:sp>
-        <p:nvSpPr>
-          <p:cNvPr id="4" name="標題 3"/>
-          <p:cNvSpPr>
-            <a:spLocks noGrp="1"/>
-          </p:cNvSpPr>
-          <p:nvPr>
-            <p:ph type="title"/>
-          </p:nvPr>
-        </p:nvSpPr>
-        <p:spPr>
-          <a:xfrm>
-            <a:off x="467544" y="2564904"/>
-            <a:ext cx="8229600" cy="1156990"/>
-          </a:xfrm>
-        </p:spPr>
-        <p:txBody>
-          <a:bodyPr/>
-          <a:lstStyle/>
-          <a:p>
-            <a:r>
-              <a:rPr lang="zh-TW" altLang="en-US" dirty="0"/>
-              <a:t>稽核以及矯正預防報告產生 </a:t>
-            </a:r>
-            <a:endParaRPr lang="en-US" altLang="zh-TW" dirty="0"/>
-          </a:p>
-        </p:txBody>
-      </p:sp>
-    </p:spTree>
-    <p:extLst>
-      <p:ext uri="{BB962C8B-B14F-4D97-AF65-F5344CB8AC3E}">
-        <p14:creationId xmlns:p14="http://schemas.microsoft.com/office/powerpoint/2010/main" val="1070661113"/>
-      </p:ext>
-    </p:extLst>
-  </p:cSld>
-  <p:clrMapOvr>
-    <a:masterClrMapping/>
-  </p:clrMapOvr>
-  <p:timing>
-    <p:tnLst>
-      <p:par>
-        <p:cTn id="1" dur="indefinite" restart="never" nodeType="tmRoot"/>
-      </p:par>
-    </p:tnLst>
-  </p:timing>
-</p:sld>
-</file>
-
-<file path=ppt/slides/slide36.xml><?xml version="1.0" encoding="utf-8"?>
-<p:sld xmlns:a="http://schemas.openxmlformats.org/drawingml/2006/main" xmlns:r="http://schemas.openxmlformats.org/officeDocument/2006/relationships" xmlns:p="http://schemas.openxmlformats.org/presentationml/2006/main">
-  <p:cSld>
-    <p:spTree>
-      <p:nvGrpSpPr>
-        <p:cNvPr id="1" name=""/>
-        <p:cNvGrpSpPr/>
-        <p:nvPr/>
-      </p:nvGrpSpPr>
-      <p:grpSpPr>
-        <a:xfrm>
-          <a:off x="0" y="0"/>
-          <a:ext cx="0" cy="0"/>
-          <a:chOff x="0" y="0"/>
-          <a:chExt cx="0" cy="0"/>
-        </a:xfrm>
-      </p:grpSpPr>
-      <p:sp>
-        <p:nvSpPr>
-          <p:cNvPr id="2" name="標題 1"/>
-          <p:cNvSpPr>
-            <a:spLocks noGrp="1"/>
-          </p:cNvSpPr>
-          <p:nvPr>
-            <p:ph type="title"/>
-          </p:nvPr>
-        </p:nvSpPr>
-        <p:spPr/>
-        <p:txBody>
-          <a:bodyPr/>
-          <a:lstStyle/>
-          <a:p>
-            <a:r>
-              <a:rPr kumimoji="1" lang="en-US" altLang="zh-Hant" dirty="0"/>
-              <a:t>PDF </a:t>
-            </a:r>
-            <a:r>
-              <a:rPr kumimoji="1" lang="zh-Hant" altLang="en-US" dirty="0"/>
-              <a:t>產生器</a:t>
-            </a:r>
-            <a:endParaRPr kumimoji="1" lang="zh-TW" altLang="en-US" dirty="0"/>
-          </a:p>
-        </p:txBody>
-      </p:sp>
-      <p:sp>
-        <p:nvSpPr>
-          <p:cNvPr id="3" name="內容版面配置區 2"/>
-          <p:cNvSpPr>
-            <a:spLocks noGrp="1"/>
-          </p:cNvSpPr>
-          <p:nvPr>
-            <p:ph idx="1"/>
-          </p:nvPr>
-        </p:nvSpPr>
-        <p:spPr/>
-        <p:txBody>
-          <a:bodyPr/>
-          <a:lstStyle/>
-          <a:p>
-            <a:r>
-              <a:rPr kumimoji="1" lang="en-US" altLang="zh-TW" dirty="0" smtClean="0">
-                <a:latin typeface="Century Gothic"/>
-                <a:cs typeface="Century Gothic"/>
-              </a:rPr>
-              <a:t>WK</a:t>
-            </a:r>
-            <a:r>
-              <a:rPr kumimoji="1" lang="en-US" altLang="zh-TW" b="1" dirty="0" smtClean="0">
-                <a:latin typeface="Courier"/>
-                <a:cs typeface="Courier"/>
-              </a:rPr>
-              <a:t>&lt;html&gt;</a:t>
-            </a:r>
-            <a:r>
-              <a:rPr kumimoji="1" lang="en-US" altLang="zh-TW" dirty="0" err="1" smtClean="0">
-                <a:latin typeface="Century Gothic"/>
-                <a:cs typeface="Century Gothic"/>
-              </a:rPr>
-              <a:t>TO</a:t>
-            </a:r>
-            <a:r>
-              <a:rPr kumimoji="1" lang="en-US" altLang="zh-TW" b="1" dirty="0" err="1" smtClean="0">
-                <a:latin typeface="Cochin"/>
-                <a:cs typeface="Cochin"/>
-              </a:rPr>
-              <a:t>pdf</a:t>
-            </a:r>
-            <a:endParaRPr kumimoji="1" lang="en-US" altLang="zh-TW" dirty="0" smtClean="0">
-              <a:latin typeface="Cochin"/>
-              <a:cs typeface="Cochin"/>
-            </a:endParaRPr>
-          </a:p>
-          <a:p>
-            <a:pPr lvl="1"/>
-            <a:r>
-              <a:rPr kumimoji="1" lang="zh-TW" altLang="en-US" dirty="0" smtClean="0"/>
-              <a:t>利用</a:t>
-            </a:r>
-            <a:r>
-              <a:rPr kumimoji="1" lang="en-US" altLang="zh-TW" dirty="0" smtClean="0"/>
-              <a:t> </a:t>
-            </a:r>
-            <a:r>
-              <a:rPr kumimoji="1" lang="en-US" altLang="zh-TW" dirty="0" err="1"/>
-              <a:t>webkit</a:t>
-            </a:r>
-            <a:r>
-              <a:rPr kumimoji="1" lang="en-US" altLang="zh-TW" dirty="0"/>
-              <a:t> </a:t>
-            </a:r>
-            <a:r>
-              <a:rPr kumimoji="1" lang="zh-TW" altLang="en-US" dirty="0"/>
-              <a:t>作為渲染引擎產生 </a:t>
-            </a:r>
-            <a:r>
-              <a:rPr kumimoji="1" lang="en-US" altLang="zh-TW" dirty="0"/>
-              <a:t>PDF </a:t>
-            </a:r>
-            <a:r>
-              <a:rPr kumimoji="1" lang="zh-TW" altLang="en-US" dirty="0"/>
-              <a:t>的</a:t>
-            </a:r>
-            <a:r>
-              <a:rPr kumimoji="1" lang="zh-TW" altLang="en-US" dirty="0" smtClean="0"/>
-              <a:t>工具</a:t>
-            </a:r>
-            <a:endParaRPr kumimoji="1" lang="en-US" altLang="zh-TW" dirty="0" smtClean="0"/>
-          </a:p>
-          <a:p>
-            <a:pPr lvl="1"/>
-            <a:r>
-              <a:rPr kumimoji="1" lang="zh-TW" altLang="en-US" dirty="0" smtClean="0"/>
-              <a:t>直接將 </a:t>
-            </a:r>
-            <a:r>
-              <a:rPr kumimoji="1" lang="en-US" altLang="zh-TW" dirty="0" smtClean="0"/>
-              <a:t>HTML </a:t>
-            </a:r>
-            <a:r>
-              <a:rPr kumimoji="1" lang="zh-TW" altLang="en-US" dirty="0" smtClean="0"/>
-              <a:t>匯出成 </a:t>
-            </a:r>
-            <a:r>
-              <a:rPr kumimoji="1" lang="en-US" altLang="zh-TW" dirty="0" smtClean="0"/>
-              <a:t>PDF</a:t>
-            </a:r>
-          </a:p>
-          <a:p>
-            <a:pPr lvl="1"/>
-            <a:r>
-              <a:rPr kumimoji="1" lang="zh-TW" altLang="en-US" dirty="0" smtClean="0"/>
-              <a:t>透過 </a:t>
-            </a:r>
-            <a:r>
-              <a:rPr kumimoji="1" lang="en-US" altLang="zh-TW" dirty="0" smtClean="0"/>
-              <a:t>Composer </a:t>
-            </a:r>
-            <a:r>
-              <a:rPr kumimoji="1" lang="zh-TW" altLang="en-US" dirty="0" smtClean="0"/>
-              <a:t>來安裝</a:t>
-            </a:r>
-            <a:endParaRPr kumimoji="1" lang="en-US" altLang="zh-TW" dirty="0"/>
-          </a:p>
-          <a:p>
-            <a:pPr lvl="1"/>
-            <a:endParaRPr kumimoji="1" lang="en-US" altLang="zh-TW" dirty="0" smtClean="0"/>
-          </a:p>
-          <a:p>
-            <a:r>
-              <a:rPr kumimoji="1" lang="zh-TW" altLang="en-US" dirty="0" smtClean="0"/>
-              <a:t>優點</a:t>
-            </a:r>
-            <a:endParaRPr kumimoji="1" lang="en-US" altLang="zh-TW" dirty="0" smtClean="0"/>
-          </a:p>
-          <a:p>
-            <a:pPr lvl="1"/>
-            <a:r>
-              <a:rPr kumimoji="1" lang="zh-TW" altLang="en-US" dirty="0" smtClean="0"/>
-              <a:t>中文支援性良好</a:t>
-            </a:r>
-            <a:endParaRPr kumimoji="1" lang="en-US" altLang="zh-TW" dirty="0"/>
-          </a:p>
-        </p:txBody>
-      </p:sp>
-      <p:pic>
-        <p:nvPicPr>
-          <p:cNvPr id="6" name="圖片 5"/>
-          <p:cNvPicPr>
-            <a:picLocks noChangeAspect="1"/>
-          </p:cNvPicPr>
-          <p:nvPr/>
-        </p:nvPicPr>
-        <p:blipFill>
-          <a:blip r:embed="rId2"/>
-          <a:stretch>
-            <a:fillRect/>
-          </a:stretch>
-        </p:blipFill>
-        <p:spPr>
-          <a:xfrm>
-            <a:off x="899592" y="1628800"/>
-            <a:ext cx="2304256" cy="380202"/>
-          </a:xfrm>
-          <a:prstGeom prst="rect">
-            <a:avLst/>
-          </a:prstGeom>
-          <a:noFill/>
-          <a:ln>
-            <a:noFill/>
-          </a:ln>
-        </p:spPr>
-      </p:pic>
-    </p:spTree>
-    <p:extLst>
-      <p:ext uri="{BB962C8B-B14F-4D97-AF65-F5344CB8AC3E}">
-        <p14:creationId xmlns:p14="http://schemas.microsoft.com/office/powerpoint/2010/main" val="1285971285"/>
-      </p:ext>
-    </p:extLst>
-  </p:cSld>
-  <p:clrMapOvr>
-    <a:masterClrMapping/>
-  </p:clrMapOvr>
-  <p:timing>
-    <p:tnLst>
-      <p:par>
-        <p:cTn id="1" dur="indefinite" restart="never" nodeType="tmRoot"/>
-      </p:par>
-    </p:tnLst>
-  </p:timing>
-</p:sld>
-</file>
-
 <file path=ppt/slides/slide37.xml><?xml version="1.0" encoding="utf-8"?>
 <p:sld xmlns:a="http://schemas.openxmlformats.org/drawingml/2006/main" xmlns:r="http://schemas.openxmlformats.org/officeDocument/2006/relationships" xmlns:p="http://schemas.openxmlformats.org/presentationml/2006/main">
   <p:cSld>
@@ -13612,7 +13594,7 @@
           <a:p>
             <a:r>
               <a:rPr lang="zh-TW" altLang="en-US" dirty="0"/>
-              <a:t>單位主管通知簽署</a:t>
+              <a:t>稽核以及矯正預防報告產生 </a:t>
             </a:r>
             <a:endParaRPr lang="en-US" altLang="zh-TW" dirty="0"/>
           </a:p>
@@ -13621,7 +13603,7 @@
     </p:spTree>
     <p:extLst>
       <p:ext uri="{BB962C8B-B14F-4D97-AF65-F5344CB8AC3E}">
-        <p14:creationId xmlns:p14="http://schemas.microsoft.com/office/powerpoint/2010/main" val="377343677"/>
+        <p14:creationId xmlns:p14="http://schemas.microsoft.com/office/powerpoint/2010/main" val="1070661113"/>
       </p:ext>
     </p:extLst>
   </p:cSld>
@@ -13671,8 +13653,12 @@
           <a:lstStyle/>
           <a:p>
             <a:r>
-              <a:rPr lang="zh-TW" altLang="en-US" dirty="0"/>
-              <a:t>單位主管通知簽署</a:t>
+              <a:rPr kumimoji="1" lang="en-US" altLang="zh-Hant" dirty="0"/>
+              <a:t>PDF </a:t>
+            </a:r>
+            <a:r>
+              <a:rPr kumimoji="1" lang="zh-Hant" altLang="en-US" dirty="0"/>
+              <a:t>產生器</a:t>
             </a:r>
             <a:endParaRPr kumimoji="1" lang="zh-TW" altLang="en-US" dirty="0"/>
           </a:p>
@@ -13690,14 +13676,75 @@
         </p:nvSpPr>
         <p:spPr/>
         <p:txBody>
-          <a:bodyPr>
-            <a:normAutofit/>
-          </a:bodyPr>
+          <a:bodyPr/>
           <a:lstStyle/>
           <a:p>
             <a:r>
+              <a:rPr kumimoji="1" lang="en-US" altLang="zh-TW" dirty="0" smtClean="0">
+                <a:latin typeface="Century Gothic"/>
+                <a:cs typeface="Century Gothic"/>
+              </a:rPr>
+              <a:t>WK</a:t>
+            </a:r>
+            <a:r>
+              <a:rPr kumimoji="1" lang="en-US" altLang="zh-TW" b="1" dirty="0" smtClean="0">
+                <a:latin typeface="Courier"/>
+                <a:cs typeface="Courier"/>
+              </a:rPr>
+              <a:t>&lt;html&gt;</a:t>
+            </a:r>
+            <a:r>
+              <a:rPr kumimoji="1" lang="en-US" altLang="zh-TW" dirty="0" err="1" smtClean="0">
+                <a:latin typeface="Century Gothic"/>
+                <a:cs typeface="Century Gothic"/>
+              </a:rPr>
+              <a:t>TO</a:t>
+            </a:r>
+            <a:r>
+              <a:rPr kumimoji="1" lang="en-US" altLang="zh-TW" b="1" dirty="0" err="1" smtClean="0">
+                <a:latin typeface="Cochin"/>
+                <a:cs typeface="Cochin"/>
+              </a:rPr>
+              <a:t>pdf</a:t>
+            </a:r>
+            <a:endParaRPr kumimoji="1" lang="en-US" altLang="zh-TW" dirty="0" smtClean="0">
+              <a:latin typeface="Cochin"/>
+              <a:cs typeface="Cochin"/>
+            </a:endParaRPr>
+          </a:p>
+          <a:p>
+            <a:pPr lvl="1"/>
+            <a:r>
               <a:rPr kumimoji="1" lang="zh-TW" altLang="en-US" dirty="0" smtClean="0"/>
-              <a:t>問題</a:t>
+              <a:t>利用</a:t>
+            </a:r>
+            <a:r>
+              <a:rPr kumimoji="1" lang="en-US" altLang="zh-TW" dirty="0" smtClean="0"/>
+              <a:t> </a:t>
+            </a:r>
+            <a:r>
+              <a:rPr kumimoji="1" lang="en-US" altLang="zh-TW" dirty="0" err="1"/>
+              <a:t>webkit</a:t>
+            </a:r>
+            <a:r>
+              <a:rPr kumimoji="1" lang="en-US" altLang="zh-TW" dirty="0"/>
+              <a:t> </a:t>
+            </a:r>
+            <a:r>
+              <a:rPr kumimoji="1" lang="zh-TW" altLang="en-US" dirty="0"/>
+              <a:t>作為渲染引擎產生 </a:t>
+            </a:r>
+            <a:r>
+              <a:rPr kumimoji="1" lang="en-US" altLang="zh-TW" dirty="0"/>
+              <a:t>PDF </a:t>
+            </a:r>
+            <a:r>
+              <a:rPr kumimoji="1" lang="zh-TW" altLang="en-US" dirty="0"/>
+              <a:t>的</a:t>
+            </a:r>
+            <a:r>
+              <a:rPr kumimoji="1" lang="zh-TW" altLang="en-US" dirty="0" smtClean="0"/>
+              <a:t>工具</a:t>
             </a:r>
             <a:endParaRPr kumimoji="1" lang="en-US" altLang="zh-TW" dirty="0" smtClean="0"/>
           </a:p>
@@ -13705,17 +13752,36 @@
             <a:pPr lvl="1"/>
             <a:r>
               <a:rPr kumimoji="1" lang="zh-TW" altLang="en-US" dirty="0" smtClean="0"/>
-              <a:t>主管帳號</a:t>
-            </a:r>
-            <a:endParaRPr kumimoji="1" lang="en-US" altLang="zh-TW" dirty="0" smtClean="0"/>
+              <a:t>直接將 </a:t>
+            </a:r>
+            <a:r>
+              <a:rPr kumimoji="1" lang="en-US" altLang="zh-TW" dirty="0" smtClean="0"/>
+              <a:t>HTML </a:t>
+            </a:r>
+            <a:r>
+              <a:rPr kumimoji="1" lang="zh-TW" altLang="en-US" dirty="0" smtClean="0"/>
+              <a:t>匯出成 </a:t>
+            </a:r>
+            <a:r>
+              <a:rPr kumimoji="1" lang="en-US" altLang="zh-TW" dirty="0" smtClean="0"/>
+              <a:t>PDF</a:t>
+            </a:r>
           </a:p>
           <a:p>
             <a:pPr lvl="1"/>
             <a:r>
               <a:rPr kumimoji="1" lang="zh-TW" altLang="en-US" dirty="0" smtClean="0"/>
-              <a:t>要如何讓主管簽署</a:t>
-            </a:r>
-            <a:endParaRPr kumimoji="1" lang="en-US" altLang="zh-TW" dirty="0" smtClean="0"/>
+              <a:t>透過 </a:t>
+            </a:r>
+            <a:r>
+              <a:rPr kumimoji="1" lang="en-US" altLang="zh-TW" dirty="0" smtClean="0"/>
+              <a:t>Composer </a:t>
+            </a:r>
+            <a:r>
+              <a:rPr kumimoji="1" lang="zh-TW" altLang="en-US" dirty="0" smtClean="0"/>
+              <a:t>來安裝</a:t>
+            </a:r>
+            <a:endParaRPr kumimoji="1" lang="en-US" altLang="zh-TW" dirty="0"/>
           </a:p>
           <a:p>
             <a:pPr lvl="1"/>
@@ -13724,7 +13790,7 @@
           <a:p>
             <a:r>
               <a:rPr kumimoji="1" lang="zh-TW" altLang="en-US" dirty="0" smtClean="0"/>
-              <a:t>解決方式</a:t>
+              <a:t>優點</a:t>
             </a:r>
             <a:endParaRPr kumimoji="1" lang="en-US" altLang="zh-TW" dirty="0" smtClean="0"/>
           </a:p>
@@ -13732,30 +13798,44 @@
             <a:pPr lvl="1"/>
             <a:r>
               <a:rPr kumimoji="1" lang="zh-TW" altLang="en-US" dirty="0" smtClean="0"/>
-              <a:t>寄電子郵件通知</a:t>
-            </a:r>
-            <a:endParaRPr kumimoji="1" lang="en-US" altLang="zh-TW" dirty="0" smtClean="0"/>
-          </a:p>
-          <a:p>
-            <a:pPr lvl="1"/>
-            <a:r>
-              <a:rPr kumimoji="1" lang="zh-TW" altLang="en-US" dirty="0" smtClean="0"/>
-              <a:t>透過一次性的簽署連結讓主管完成簽署動作。</a:t>
-            </a:r>
-            <a:endParaRPr kumimoji="1" lang="en-US" altLang="zh-TW" dirty="0" smtClean="0"/>
-          </a:p>
-          <a:p>
+              <a:t>中文支援性良好</a:t>
+            </a:r>
             <a:endParaRPr kumimoji="1" lang="en-US" altLang="zh-TW" dirty="0"/>
-          </a:p>
-          <a:p>
-            <a:endParaRPr kumimoji="1" lang="zh-TW" altLang="en-US" dirty="0"/>
           </a:p>
         </p:txBody>
       </p:sp>
+      <p:pic>
+        <p:nvPicPr>
+          <p:cNvPr id="6" name="圖片 5"/>
+          <p:cNvPicPr>
+            <a:picLocks noChangeAspect="1"/>
+          </p:cNvPicPr>
+          <p:nvPr/>
+        </p:nvPicPr>
+        <p:blipFill>
+          <a:blip r:embed="rId2"/>
+          <a:stretch>
+            <a:fillRect/>
+          </a:stretch>
+        </p:blipFill>
+        <p:spPr>
+          <a:xfrm>
+            <a:off x="899592" y="1628800"/>
+            <a:ext cx="2304256" cy="380202"/>
+          </a:xfrm>
+          <a:prstGeom prst="rect">
+            <a:avLst/>
+          </a:prstGeom>
+          <a:noFill/>
+          <a:ln>
+            <a:noFill/>
+          </a:ln>
+        </p:spPr>
+      </p:pic>
     </p:spTree>
     <p:extLst>
       <p:ext uri="{BB962C8B-B14F-4D97-AF65-F5344CB8AC3E}">
-        <p14:creationId xmlns:p14="http://schemas.microsoft.com/office/powerpoint/2010/main" val="3430539868"/>
+        <p14:creationId xmlns:p14="http://schemas.microsoft.com/office/powerpoint/2010/main" val="1285971285"/>
       </p:ext>
     </p:extLst>
   </p:cSld>
@@ -13811,15 +13891,16 @@
           <a:p>
             <a:r>
               <a:rPr lang="zh-TW" altLang="en-US" dirty="0"/>
-              <a:t>受稽單位介面</a:t>
-            </a:r>
+              <a:t>單位主管通知簽署</a:t>
+            </a:r>
+            <a:endParaRPr lang="en-US" altLang="zh-TW" dirty="0"/>
           </a:p>
         </p:txBody>
       </p:sp>
     </p:spTree>
     <p:extLst>
       <p:ext uri="{BB962C8B-B14F-4D97-AF65-F5344CB8AC3E}">
-        <p14:creationId xmlns:p14="http://schemas.microsoft.com/office/powerpoint/2010/main" val="1814644749"/>
+        <p14:creationId xmlns:p14="http://schemas.microsoft.com/office/powerpoint/2010/main" val="377343677"/>
       </p:ext>
     </p:extLst>
   </p:cSld>
@@ -15899,6 +15980,204 @@
           <a:lstStyle/>
           <a:p>
             <a:r>
+              <a:rPr lang="zh-TW" altLang="en-US" dirty="0"/>
+              <a:t>單位主管通知簽署</a:t>
+            </a:r>
+            <a:endParaRPr kumimoji="1" lang="zh-TW" altLang="en-US" dirty="0"/>
+          </a:p>
+        </p:txBody>
+      </p:sp>
+      <p:sp>
+        <p:nvSpPr>
+          <p:cNvPr id="3" name="內容版面配置區 2"/>
+          <p:cNvSpPr>
+            <a:spLocks noGrp="1"/>
+          </p:cNvSpPr>
+          <p:nvPr>
+            <p:ph idx="1"/>
+          </p:nvPr>
+        </p:nvSpPr>
+        <p:spPr/>
+        <p:txBody>
+          <a:bodyPr>
+            <a:normAutofit/>
+          </a:bodyPr>
+          <a:lstStyle/>
+          <a:p>
+            <a:r>
+              <a:rPr kumimoji="1" lang="zh-TW" altLang="en-US" dirty="0" smtClean="0"/>
+              <a:t>問題</a:t>
+            </a:r>
+            <a:endParaRPr kumimoji="1" lang="en-US" altLang="zh-TW" dirty="0" smtClean="0"/>
+          </a:p>
+          <a:p>
+            <a:pPr lvl="1"/>
+            <a:r>
+              <a:rPr kumimoji="1" lang="zh-TW" altLang="en-US" dirty="0" smtClean="0"/>
+              <a:t>主管帳號</a:t>
+            </a:r>
+            <a:endParaRPr kumimoji="1" lang="en-US" altLang="zh-TW" dirty="0" smtClean="0"/>
+          </a:p>
+          <a:p>
+            <a:pPr lvl="1"/>
+            <a:r>
+              <a:rPr kumimoji="1" lang="zh-TW" altLang="en-US" dirty="0" smtClean="0"/>
+              <a:t>要如何讓主管簽署</a:t>
+            </a:r>
+            <a:endParaRPr kumimoji="1" lang="en-US" altLang="zh-TW" dirty="0" smtClean="0"/>
+          </a:p>
+          <a:p>
+            <a:pPr lvl="1"/>
+            <a:endParaRPr kumimoji="1" lang="en-US" altLang="zh-TW" dirty="0" smtClean="0"/>
+          </a:p>
+          <a:p>
+            <a:r>
+              <a:rPr kumimoji="1" lang="zh-TW" altLang="en-US" dirty="0" smtClean="0"/>
+              <a:t>解決方式</a:t>
+            </a:r>
+            <a:endParaRPr kumimoji="1" lang="en-US" altLang="zh-TW" dirty="0" smtClean="0"/>
+          </a:p>
+          <a:p>
+            <a:pPr lvl="1"/>
+            <a:r>
+              <a:rPr kumimoji="1" lang="zh-TW" altLang="en-US" dirty="0" smtClean="0"/>
+              <a:t>寄電子郵件通知</a:t>
+            </a:r>
+            <a:endParaRPr kumimoji="1" lang="en-US" altLang="zh-TW" dirty="0" smtClean="0"/>
+          </a:p>
+          <a:p>
+            <a:pPr lvl="1"/>
+            <a:r>
+              <a:rPr kumimoji="1" lang="zh-TW" altLang="en-US" dirty="0" smtClean="0"/>
+              <a:t>透過一次性的簽署連結讓主管完成簽署動作。</a:t>
+            </a:r>
+            <a:endParaRPr kumimoji="1" lang="en-US" altLang="zh-TW" dirty="0" smtClean="0"/>
+          </a:p>
+          <a:p>
+            <a:endParaRPr kumimoji="1" lang="en-US" altLang="zh-TW" dirty="0"/>
+          </a:p>
+          <a:p>
+            <a:endParaRPr kumimoji="1" lang="zh-TW" altLang="en-US" dirty="0"/>
+          </a:p>
+        </p:txBody>
+      </p:sp>
+    </p:spTree>
+    <p:extLst>
+      <p:ext uri="{BB962C8B-B14F-4D97-AF65-F5344CB8AC3E}">
+        <p14:creationId xmlns:p14="http://schemas.microsoft.com/office/powerpoint/2010/main" val="3430539868"/>
+      </p:ext>
+    </p:extLst>
+  </p:cSld>
+  <p:clrMapOvr>
+    <a:masterClrMapping/>
+  </p:clrMapOvr>
+  <p:timing>
+    <p:tnLst>
+      <p:par>
+        <p:cTn id="1" dur="indefinite" restart="never" nodeType="tmRoot"/>
+      </p:par>
+    </p:tnLst>
+  </p:timing>
+</p:sld>
+</file>
+
+<file path=ppt/slides/slide41.xml><?xml version="1.0" encoding="utf-8"?>
+<p:sld xmlns:a="http://schemas.openxmlformats.org/drawingml/2006/main" xmlns:r="http://schemas.openxmlformats.org/officeDocument/2006/relationships" xmlns:p="http://schemas.openxmlformats.org/presentationml/2006/main">
+  <p:cSld>
+    <p:spTree>
+      <p:nvGrpSpPr>
+        <p:cNvPr id="1" name=""/>
+        <p:cNvGrpSpPr/>
+        <p:nvPr/>
+      </p:nvGrpSpPr>
+      <p:grpSpPr>
+        <a:xfrm>
+          <a:off x="0" y="0"/>
+          <a:ext cx="0" cy="0"/>
+          <a:chOff x="0" y="0"/>
+          <a:chExt cx="0" cy="0"/>
+        </a:xfrm>
+      </p:grpSpPr>
+      <p:sp>
+        <p:nvSpPr>
+          <p:cNvPr id="4" name="標題 3"/>
+          <p:cNvSpPr>
+            <a:spLocks noGrp="1"/>
+          </p:cNvSpPr>
+          <p:nvPr>
+            <p:ph type="title"/>
+          </p:nvPr>
+        </p:nvSpPr>
+        <p:spPr>
+          <a:xfrm>
+            <a:off x="467544" y="2564904"/>
+            <a:ext cx="8229600" cy="1156990"/>
+          </a:xfrm>
+        </p:spPr>
+        <p:txBody>
+          <a:bodyPr/>
+          <a:lstStyle/>
+          <a:p>
+            <a:r>
+              <a:rPr lang="zh-TW" altLang="en-US" dirty="0"/>
+              <a:t>受稽單位介面</a:t>
+            </a:r>
+          </a:p>
+        </p:txBody>
+      </p:sp>
+    </p:spTree>
+    <p:extLst>
+      <p:ext uri="{BB962C8B-B14F-4D97-AF65-F5344CB8AC3E}">
+        <p14:creationId xmlns:p14="http://schemas.microsoft.com/office/powerpoint/2010/main" val="1814644749"/>
+      </p:ext>
+    </p:extLst>
+  </p:cSld>
+  <p:clrMapOvr>
+    <a:masterClrMapping/>
+  </p:clrMapOvr>
+  <p:timing>
+    <p:tnLst>
+      <p:par>
+        <p:cTn id="1" dur="indefinite" restart="never" nodeType="tmRoot"/>
+      </p:par>
+    </p:tnLst>
+  </p:timing>
+</p:sld>
+</file>
+
+<file path=ppt/slides/slide42.xml><?xml version="1.0" encoding="utf-8"?>
+<p:sld xmlns:a="http://schemas.openxmlformats.org/drawingml/2006/main" xmlns:r="http://schemas.openxmlformats.org/officeDocument/2006/relationships" xmlns:p="http://schemas.openxmlformats.org/presentationml/2006/main">
+  <p:cSld>
+    <p:spTree>
+      <p:nvGrpSpPr>
+        <p:cNvPr id="1" name=""/>
+        <p:cNvGrpSpPr/>
+        <p:nvPr/>
+      </p:nvGrpSpPr>
+      <p:grpSpPr>
+        <a:xfrm>
+          <a:off x="0" y="0"/>
+          <a:ext cx="0" cy="0"/>
+          <a:chOff x="0" y="0"/>
+          <a:chExt cx="0" cy="0"/>
+        </a:xfrm>
+      </p:grpSpPr>
+      <p:sp>
+        <p:nvSpPr>
+          <p:cNvPr id="2" name="標題 1"/>
+          <p:cNvSpPr>
+            <a:spLocks noGrp="1"/>
+          </p:cNvSpPr>
+          <p:nvPr>
+            <p:ph type="title"/>
+          </p:nvPr>
+        </p:nvSpPr>
+        <p:spPr/>
+        <p:txBody>
+          <a:bodyPr/>
+          <a:lstStyle/>
+          <a:p>
+            <a:r>
               <a:rPr kumimoji="1" lang="zh-TW" altLang="en-US" dirty="0" smtClean="0"/>
               <a:t>填寫矯正預防報告</a:t>
             </a:r>
@@ -16004,7 +16283,7 @@
 </p:sld>
 </file>
 
-<file path=ppt/slides/slide41.xml><?xml version="1.0" encoding="utf-8"?>
+<file path=ppt/slides/slide43.xml><?xml version="1.0" encoding="utf-8"?>
 <p:sld xmlns:a="http://schemas.openxmlformats.org/drawingml/2006/main" xmlns:r="http://schemas.openxmlformats.org/officeDocument/2006/relationships" xmlns:p="http://schemas.openxmlformats.org/presentationml/2006/main">
   <p:cSld>
     <p:spTree>

</xml_diff>